<commit_message>
adding content to ppt
</commit_message>
<xml_diff>
--- a/presentations/linear_regression/Linear_regression.pptx
+++ b/presentations/linear_regression/Linear_regression.pptx
@@ -5,7 +5,7 @@
     <p:sldMasterId id="2147483684" r:id="rId1"/>
   </p:sldMasterIdLst>
   <p:notesMasterIdLst>
-    <p:notesMasterId r:id="rId27"/>
+    <p:notesMasterId r:id="rId29"/>
   </p:notesMasterIdLst>
   <p:sldIdLst>
     <p:sldId id="256" r:id="rId2"/>
@@ -19,20 +19,22 @@
     <p:sldId id="302" r:id="rId10"/>
     <p:sldId id="307" r:id="rId11"/>
     <p:sldId id="304" r:id="rId12"/>
-    <p:sldId id="315" r:id="rId13"/>
-    <p:sldId id="316" r:id="rId14"/>
-    <p:sldId id="317" r:id="rId15"/>
-    <p:sldId id="318" r:id="rId16"/>
-    <p:sldId id="319" r:id="rId17"/>
-    <p:sldId id="296" r:id="rId18"/>
-    <p:sldId id="297" r:id="rId19"/>
-    <p:sldId id="310" r:id="rId20"/>
-    <p:sldId id="294" r:id="rId21"/>
-    <p:sldId id="306" r:id="rId22"/>
-    <p:sldId id="320" r:id="rId23"/>
-    <p:sldId id="308" r:id="rId24"/>
-    <p:sldId id="309" r:id="rId25"/>
-    <p:sldId id="311" r:id="rId26"/>
+    <p:sldId id="322" r:id="rId13"/>
+    <p:sldId id="315" r:id="rId14"/>
+    <p:sldId id="316" r:id="rId15"/>
+    <p:sldId id="317" r:id="rId16"/>
+    <p:sldId id="318" r:id="rId17"/>
+    <p:sldId id="319" r:id="rId18"/>
+    <p:sldId id="296" r:id="rId19"/>
+    <p:sldId id="297" r:id="rId20"/>
+    <p:sldId id="310" r:id="rId21"/>
+    <p:sldId id="294" r:id="rId22"/>
+    <p:sldId id="306" r:id="rId23"/>
+    <p:sldId id="320" r:id="rId24"/>
+    <p:sldId id="308" r:id="rId25"/>
+    <p:sldId id="309" r:id="rId26"/>
+    <p:sldId id="321" r:id="rId27"/>
+    <p:sldId id="311" r:id="rId28"/>
   </p:sldIdLst>
   <p:sldSz cx="9144000" cy="6858000" type="screen4x3"/>
   <p:notesSz cx="6858000" cy="9144000"/>
@@ -232,7 +234,7 @@
           <a:p>
             <a:fld id="{2793983C-EFA1-41D2-8DCF-4CEF34100D6A}" type="datetimeFigureOut">
               <a:rPr lang="en-US" smtClean="0"/>
-              <a:t>2/9/2016</a:t>
+              <a:t>2/10/2016</a:t>
             </a:fld>
             <a:endParaRPr lang="en-US"/>
           </a:p>
@@ -630,9 +632,17 @@
           <a:p>
             <a:r>
               <a:rPr lang="en-US" dirty="0" smtClean="0"/>
-              <a:t>Unlike the other plots, this time patterns are not relevant. We watch out for outlying values at the upper right corner or at the lower right corner. Those spots are the places where cases can be influential against a regression line. Look for cases outside of a dashed line, Cook’s distance. When cases are outside of the Cook’s distance (meaning they have high Cook’s distance scores), the cases are influential to the regression results. The regression results will be altered if we exclude those cases.</a:t>
-            </a:r>
-            <a:endParaRPr lang="en-US" dirty="0"/>
+              <a:t>This plot shows if residuals are spread equally along the ranges of predictors. This is how you can check the assumption of equal variance (homoscedasticity). It’s good if you see a horizontal line with equally (randomly) spread points. </a:t>
+            </a:r>
+            <a:r>
+              <a:rPr lang="en-US" b="1" dirty="0" smtClean="0"/>
+              <a:t>What</a:t>
+            </a:r>
+            <a:r>
+              <a:rPr lang="en-US" b="1" baseline="0" dirty="0" smtClean="0"/>
+              <a:t> does this plot tell you?</a:t>
+            </a:r>
+            <a:endParaRPr lang="en-US" b="1" dirty="0"/>
           </a:p>
         </p:txBody>
       </p:sp>
@@ -662,7 +672,7 @@
     </p:spTree>
     <p:extLst>
       <p:ext uri="{BB962C8B-B14F-4D97-AF65-F5344CB8AC3E}">
-        <p14:creationId xmlns:p14="http://schemas.microsoft.com/office/powerpoint/2010/main" val="1761964469"/>
+        <p14:creationId xmlns:p14="http://schemas.microsoft.com/office/powerpoint/2010/main" val="2228989618"/>
       </p:ext>
     </p:extLst>
   </p:cSld>
@@ -718,11 +728,11 @@
           <a:p>
             <a:r>
               <a:rPr lang="en-US" dirty="0" smtClean="0"/>
-              <a:t>As with all models,</a:t>
-            </a:r>
-            <a:r>
-              <a:rPr lang="en-US" baseline="0" dirty="0" smtClean="0"/>
-              <a:t> it is important to remember that correlation does not imply causation. Always remember to look at the variables you have – do they make sense that they would be good predictors of the response variable? </a:t>
+              <a:t>Unlike the other plots, this time patterns are </a:t>
+            </a:r>
+            <a:r>
+              <a:rPr lang="en-US" dirty="0" smtClean="0"/>
+              <a:t>irrelevant. </a:t>
             </a:r>
             <a:endParaRPr lang="en-US" dirty="0"/>
           </a:p>
@@ -745,7 +755,7 @@
           <a:p>
             <a:fld id="{CC5A1FCD-79C7-4337-B79E-A51417706FB1}" type="slidenum">
               <a:rPr lang="en-US" smtClean="0"/>
-              <a:t>18</a:t>
+              <a:t>17</a:t>
             </a:fld>
             <a:endParaRPr lang="en-US"/>
           </a:p>
@@ -754,7 +764,7 @@
     </p:spTree>
     <p:extLst>
       <p:ext uri="{BB962C8B-B14F-4D97-AF65-F5344CB8AC3E}">
-        <p14:creationId xmlns:p14="http://schemas.microsoft.com/office/powerpoint/2010/main" val="2506501427"/>
+        <p14:creationId xmlns:p14="http://schemas.microsoft.com/office/powerpoint/2010/main" val="1761964469"/>
       </p:ext>
     </p:extLst>
   </p:cSld>
@@ -808,6 +818,14 @@
           <a:bodyPr/>
           <a:lstStyle/>
           <a:p>
+            <a:r>
+              <a:rPr lang="en-US" dirty="0" smtClean="0"/>
+              <a:t>As with all models,</a:t>
+            </a:r>
+            <a:r>
+              <a:rPr lang="en-US" baseline="0" dirty="0" smtClean="0"/>
+              <a:t> it is important to remember that correlation does not imply causation. Always remember to look at the variables you have – do they make sense that they would be good predictors of the response variable? </a:t>
+            </a:r>
             <a:endParaRPr lang="en-US" dirty="0"/>
           </a:p>
         </p:txBody>
@@ -829,7 +847,7 @@
           <a:p>
             <a:fld id="{CC5A1FCD-79C7-4337-B79E-A51417706FB1}" type="slidenum">
               <a:rPr lang="en-US" smtClean="0"/>
-              <a:t>22</a:t>
+              <a:t>19</a:t>
             </a:fld>
             <a:endParaRPr lang="en-US"/>
           </a:p>
@@ -838,7 +856,7 @@
     </p:spTree>
     <p:extLst>
       <p:ext uri="{BB962C8B-B14F-4D97-AF65-F5344CB8AC3E}">
-        <p14:creationId xmlns:p14="http://schemas.microsoft.com/office/powerpoint/2010/main" val="2613395863"/>
+        <p14:creationId xmlns:p14="http://schemas.microsoft.com/office/powerpoint/2010/main" val="2506501427"/>
       </p:ext>
     </p:extLst>
   </p:cSld>
@@ -892,70 +910,7 @@
           <a:bodyPr/>
           <a:lstStyle/>
           <a:p>
-            <a:pPr marL="0" marR="0" indent="0" algn="l" defTabSz="914400" rtl="0" eaLnBrk="1" fontAlgn="auto" latinLnBrk="0" hangingPunct="1">
-              <a:lnSpc>
-                <a:spcPct val="100000"/>
-              </a:lnSpc>
-              <a:spcBef>
-                <a:spcPts val="0"/>
-              </a:spcBef>
-              <a:spcAft>
-                <a:spcPts val="0"/>
-              </a:spcAft>
-              <a:buClrTx/>
-              <a:buSzTx/>
-              <a:buFontTx/>
-              <a:buNone/>
-              <a:tabLst/>
-              <a:defRPr/>
-            </a:pPr>
-            <a:r>
-              <a:rPr lang="en-US" altLang="en-US" b="0" dirty="0" smtClean="0"/>
-              <a:t>The Sum of Squares Regression (SSR) is the sum of the squared differences between the prediction for each observation and the population mean. (explained</a:t>
-            </a:r>
-            <a:r>
-              <a:rPr lang="en-US" altLang="en-US" b="0" baseline="0" dirty="0" smtClean="0"/>
-              <a:t> variation)</a:t>
-            </a:r>
-            <a:endParaRPr lang="en-US" altLang="en-US" b="0" dirty="0" smtClean="0"/>
-          </a:p>
-          <a:p>
-            <a:endParaRPr lang="en-US" b="0" dirty="0" smtClean="0"/>
-          </a:p>
-          <a:p>
-            <a:pPr eaLnBrk="1" hangingPunct="1">
-              <a:spcBef>
-                <a:spcPct val="50000"/>
-              </a:spcBef>
-            </a:pPr>
-            <a:r>
-              <a:rPr lang="en-US" altLang="en-US" b="0" dirty="0" smtClean="0"/>
-              <a:t>A least squares regression selects the line with the lowest total sum of squared prediction errors or SSE</a:t>
-            </a:r>
-            <a:r>
-              <a:rPr lang="en-US" altLang="en-US" b="0" baseline="0" dirty="0" smtClean="0"/>
-              <a:t> (unexplained variation)</a:t>
-            </a:r>
-          </a:p>
-          <a:p>
-            <a:pPr eaLnBrk="1" hangingPunct="1">
-              <a:spcBef>
-                <a:spcPct val="50000"/>
-              </a:spcBef>
-            </a:pPr>
-            <a:endParaRPr lang="en-US" altLang="en-US" b="0" baseline="0" dirty="0" smtClean="0"/>
-          </a:p>
-          <a:p>
-            <a:pPr eaLnBrk="1" hangingPunct="1">
-              <a:spcBef>
-                <a:spcPct val="50000"/>
-              </a:spcBef>
-            </a:pPr>
-            <a:r>
-              <a:rPr lang="en-US" altLang="en-US" b="0" baseline="0" dirty="0" smtClean="0"/>
-              <a:t>SST (total variation in y)</a:t>
-            </a:r>
-            <a:endParaRPr lang="en-US" altLang="en-US" b="0" dirty="0" smtClean="0"/>
+            <a:endParaRPr lang="en-US" dirty="0"/>
           </a:p>
         </p:txBody>
       </p:sp>
@@ -985,7 +940,7 @@
     </p:spTree>
     <p:extLst>
       <p:ext uri="{BB962C8B-B14F-4D97-AF65-F5344CB8AC3E}">
-        <p14:creationId xmlns:p14="http://schemas.microsoft.com/office/powerpoint/2010/main" val="975952257"/>
+        <p14:creationId xmlns:p14="http://schemas.microsoft.com/office/powerpoint/2010/main" val="2613395863"/>
       </p:ext>
     </p:extLst>
   </p:cSld>
@@ -1039,7 +994,70 @@
           <a:bodyPr/>
           <a:lstStyle/>
           <a:p>
-            <a:endParaRPr lang="en-US" b="0" baseline="0" dirty="0" smtClean="0"/>
+            <a:pPr marL="0" marR="0" indent="0" algn="l" defTabSz="914400" rtl="0" eaLnBrk="1" fontAlgn="auto" latinLnBrk="0" hangingPunct="1">
+              <a:lnSpc>
+                <a:spcPct val="100000"/>
+              </a:lnSpc>
+              <a:spcBef>
+                <a:spcPts val="0"/>
+              </a:spcBef>
+              <a:spcAft>
+                <a:spcPts val="0"/>
+              </a:spcAft>
+              <a:buClrTx/>
+              <a:buSzTx/>
+              <a:buFontTx/>
+              <a:buNone/>
+              <a:tabLst/>
+              <a:defRPr/>
+            </a:pPr>
+            <a:r>
+              <a:rPr lang="en-US" altLang="en-US" b="0" dirty="0" smtClean="0"/>
+              <a:t>The Sum of Squares Regression (SSR) is the sum of the squared differences between the prediction for each observation and the population mean. (explained</a:t>
+            </a:r>
+            <a:r>
+              <a:rPr lang="en-US" altLang="en-US" b="0" baseline="0" dirty="0" smtClean="0"/>
+              <a:t> variation)</a:t>
+            </a:r>
+            <a:endParaRPr lang="en-US" altLang="en-US" b="0" dirty="0" smtClean="0"/>
+          </a:p>
+          <a:p>
+            <a:endParaRPr lang="en-US" b="0" dirty="0" smtClean="0"/>
+          </a:p>
+          <a:p>
+            <a:pPr eaLnBrk="1" hangingPunct="1">
+              <a:spcBef>
+                <a:spcPct val="50000"/>
+              </a:spcBef>
+            </a:pPr>
+            <a:r>
+              <a:rPr lang="en-US" altLang="en-US" b="0" dirty="0" smtClean="0"/>
+              <a:t>A least squares regression selects the line with the lowest total sum of squared prediction errors or SSE</a:t>
+            </a:r>
+            <a:r>
+              <a:rPr lang="en-US" altLang="en-US" b="0" baseline="0" dirty="0" smtClean="0"/>
+              <a:t> (unexplained variation)</a:t>
+            </a:r>
+          </a:p>
+          <a:p>
+            <a:pPr eaLnBrk="1" hangingPunct="1">
+              <a:spcBef>
+                <a:spcPct val="50000"/>
+              </a:spcBef>
+            </a:pPr>
+            <a:endParaRPr lang="en-US" altLang="en-US" b="0" baseline="0" dirty="0" smtClean="0"/>
+          </a:p>
+          <a:p>
+            <a:pPr eaLnBrk="1" hangingPunct="1">
+              <a:spcBef>
+                <a:spcPct val="50000"/>
+              </a:spcBef>
+            </a:pPr>
+            <a:r>
+              <a:rPr lang="en-US" altLang="en-US" b="0" baseline="0" dirty="0" smtClean="0"/>
+              <a:t>SST (total variation in y)</a:t>
+            </a:r>
+            <a:endParaRPr lang="en-US" altLang="en-US" b="0" dirty="0" smtClean="0"/>
           </a:p>
         </p:txBody>
       </p:sp>
@@ -1069,7 +1087,175 @@
     </p:spTree>
     <p:extLst>
       <p:ext uri="{BB962C8B-B14F-4D97-AF65-F5344CB8AC3E}">
+        <p14:creationId xmlns:p14="http://schemas.microsoft.com/office/powerpoint/2010/main" val="975952257"/>
+      </p:ext>
+    </p:extLst>
+  </p:cSld>
+  <p:clrMapOvr>
+    <a:masterClrMapping/>
+  </p:clrMapOvr>
+</p:notes>
+</file>
+
+<file path=ppt/notesSlides/notesSlide15.xml><?xml version="1.0" encoding="utf-8"?>
+<p:notes xmlns:a="http://schemas.openxmlformats.org/drawingml/2006/main" xmlns:r="http://schemas.openxmlformats.org/officeDocument/2006/relationships" xmlns:p="http://schemas.openxmlformats.org/presentationml/2006/main">
+  <p:cSld>
+    <p:spTree>
+      <p:nvGrpSpPr>
+        <p:cNvPr id="1" name=""/>
+        <p:cNvGrpSpPr/>
+        <p:nvPr/>
+      </p:nvGrpSpPr>
+      <p:grpSpPr>
+        <a:xfrm>
+          <a:off x="0" y="0"/>
+          <a:ext cx="0" cy="0"/>
+          <a:chOff x="0" y="0"/>
+          <a:chExt cx="0" cy="0"/>
+        </a:xfrm>
+      </p:grpSpPr>
+      <p:sp>
+        <p:nvSpPr>
+          <p:cNvPr id="2" name="Slide Image Placeholder 1"/>
+          <p:cNvSpPr>
+            <a:spLocks noGrp="1" noRot="1" noChangeAspect="1"/>
+          </p:cNvSpPr>
+          <p:nvPr>
+            <p:ph type="sldImg"/>
+          </p:nvPr>
+        </p:nvSpPr>
+        <p:spPr/>
+      </p:sp>
+      <p:sp>
+        <p:nvSpPr>
+          <p:cNvPr id="3" name="Notes Placeholder 2"/>
+          <p:cNvSpPr>
+            <a:spLocks noGrp="1"/>
+          </p:cNvSpPr>
+          <p:nvPr>
+            <p:ph type="body" idx="1"/>
+          </p:nvPr>
+        </p:nvSpPr>
+        <p:spPr/>
+        <p:txBody>
+          <a:bodyPr/>
+          <a:lstStyle/>
+          <a:p>
+            <a:endParaRPr lang="en-US" b="0" baseline="0" dirty="0" smtClean="0"/>
+          </a:p>
+        </p:txBody>
+      </p:sp>
+      <p:sp>
+        <p:nvSpPr>
+          <p:cNvPr id="4" name="Slide Number Placeholder 3"/>
+          <p:cNvSpPr>
+            <a:spLocks noGrp="1"/>
+          </p:cNvSpPr>
+          <p:nvPr>
+            <p:ph type="sldNum" sz="quarter" idx="10"/>
+          </p:nvPr>
+        </p:nvSpPr>
+        <p:spPr/>
+        <p:txBody>
+          <a:bodyPr/>
+          <a:lstStyle/>
+          <a:p>
+            <a:fld id="{CC5A1FCD-79C7-4337-B79E-A51417706FB1}" type="slidenum">
+              <a:rPr lang="en-US" smtClean="0"/>
+              <a:t>25</a:t>
+            </a:fld>
+            <a:endParaRPr lang="en-US"/>
+          </a:p>
+        </p:txBody>
+      </p:sp>
+    </p:spTree>
+    <p:extLst>
+      <p:ext uri="{BB962C8B-B14F-4D97-AF65-F5344CB8AC3E}">
         <p14:creationId xmlns:p14="http://schemas.microsoft.com/office/powerpoint/2010/main" val="229642298"/>
+      </p:ext>
+    </p:extLst>
+  </p:cSld>
+  <p:clrMapOvr>
+    <a:masterClrMapping/>
+  </p:clrMapOvr>
+</p:notes>
+</file>
+
+<file path=ppt/notesSlides/notesSlide16.xml><?xml version="1.0" encoding="utf-8"?>
+<p:notes xmlns:a="http://schemas.openxmlformats.org/drawingml/2006/main" xmlns:r="http://schemas.openxmlformats.org/officeDocument/2006/relationships" xmlns:p="http://schemas.openxmlformats.org/presentationml/2006/main">
+  <p:cSld>
+    <p:spTree>
+      <p:nvGrpSpPr>
+        <p:cNvPr id="1" name=""/>
+        <p:cNvGrpSpPr/>
+        <p:nvPr/>
+      </p:nvGrpSpPr>
+      <p:grpSpPr>
+        <a:xfrm>
+          <a:off x="0" y="0"/>
+          <a:ext cx="0" cy="0"/>
+          <a:chOff x="0" y="0"/>
+          <a:chExt cx="0" cy="0"/>
+        </a:xfrm>
+      </p:grpSpPr>
+      <p:sp>
+        <p:nvSpPr>
+          <p:cNvPr id="2" name="Slide Image Placeholder 1"/>
+          <p:cNvSpPr>
+            <a:spLocks noGrp="1" noRot="1" noChangeAspect="1"/>
+          </p:cNvSpPr>
+          <p:nvPr>
+            <p:ph type="sldImg"/>
+          </p:nvPr>
+        </p:nvSpPr>
+        <p:spPr/>
+      </p:sp>
+      <p:sp>
+        <p:nvSpPr>
+          <p:cNvPr id="3" name="Notes Placeholder 2"/>
+          <p:cNvSpPr>
+            <a:spLocks noGrp="1"/>
+          </p:cNvSpPr>
+          <p:nvPr>
+            <p:ph type="body" idx="1"/>
+          </p:nvPr>
+        </p:nvSpPr>
+        <p:spPr/>
+        <p:txBody>
+          <a:bodyPr/>
+          <a:lstStyle/>
+          <a:p>
+            <a:endParaRPr lang="en-US" b="0" baseline="0" dirty="0" smtClean="0"/>
+          </a:p>
+        </p:txBody>
+      </p:sp>
+      <p:sp>
+        <p:nvSpPr>
+          <p:cNvPr id="4" name="Slide Number Placeholder 3"/>
+          <p:cNvSpPr>
+            <a:spLocks noGrp="1"/>
+          </p:cNvSpPr>
+          <p:nvPr>
+            <p:ph type="sldNum" sz="quarter" idx="10"/>
+          </p:nvPr>
+        </p:nvSpPr>
+        <p:spPr/>
+        <p:txBody>
+          <a:bodyPr/>
+          <a:lstStyle/>
+          <a:p>
+            <a:fld id="{CC5A1FCD-79C7-4337-B79E-A51417706FB1}" type="slidenum">
+              <a:rPr lang="en-US" smtClean="0"/>
+              <a:t>26</a:t>
+            </a:fld>
+            <a:endParaRPr lang="en-US"/>
+          </a:p>
+        </p:txBody>
+      </p:sp>
+    </p:spTree>
+    <p:extLst>
+      <p:ext uri="{BB962C8B-B14F-4D97-AF65-F5344CB8AC3E}">
+        <p14:creationId xmlns:p14="http://schemas.microsoft.com/office/powerpoint/2010/main" val="1345662450"/>
       </p:ext>
     </p:extLst>
   </p:cSld>
@@ -1216,43 +1402,6 @@
           <a:lstStyle/>
           <a:p>
             <a:r>
-              <a:rPr lang="en-US" sz="1200" kern="1200" dirty="0" smtClean="0">
-                <a:solidFill>
-                  <a:schemeClr val="tx1"/>
-                </a:solidFill>
-                <a:effectLst/>
-                <a:latin typeface="+mn-lt"/>
-                <a:ea typeface="+mn-ea"/>
-                <a:cs typeface="+mn-cs"/>
-              </a:rPr>
-              <a:t>For simple linear regression, R2 is the same as the correlation coefficient, r </a:t>
-            </a:r>
-            <a:r>
-              <a:rPr lang="en-US" sz="1200" kern="1200" dirty="0" smtClean="0">
-                <a:solidFill>
-                  <a:schemeClr val="tx1"/>
-                </a:solidFill>
-                <a:effectLst/>
-                <a:latin typeface="+mn-lt"/>
-                <a:ea typeface="+mn-ea"/>
-                <a:cs typeface="+mn-cs"/>
-              </a:rPr>
-              <a:t>squared</a:t>
-            </a:r>
-          </a:p>
-          <a:p>
-            <a:endParaRPr lang="en-US" sz="1200" kern="1200" dirty="0" smtClean="0">
-              <a:solidFill>
-                <a:schemeClr val="tx1"/>
-              </a:solidFill>
-              <a:effectLst/>
-              <a:latin typeface="+mn-lt"/>
-              <a:ea typeface="+mn-ea"/>
-              <a:cs typeface="+mn-cs"/>
-            </a:endParaRPr>
-          </a:p>
-          <a:p>
-            <a:r>
               <a:rPr lang="en-US" sz="1200" b="1" kern="1200" dirty="0" smtClean="0">
                 <a:solidFill>
                   <a:schemeClr val="tx1"/>
@@ -1262,7 +1411,19 @@
                 <a:ea typeface="+mn-ea"/>
                 <a:cs typeface="+mn-cs"/>
               </a:rPr>
-              <a:t>Can anyone provide an</a:t>
+              <a:t>Can </a:t>
+            </a:r>
+            <a:r>
+              <a:rPr lang="en-US" sz="1200" b="1" kern="1200" dirty="0" smtClean="0">
+                <a:solidFill>
+                  <a:schemeClr val="tx1"/>
+                </a:solidFill>
+                <a:effectLst/>
+                <a:latin typeface="+mn-lt"/>
+                <a:ea typeface="+mn-ea"/>
+                <a:cs typeface="+mn-cs"/>
+              </a:rPr>
+              <a:t>anyone provide an</a:t>
             </a:r>
             <a:r>
               <a:rPr lang="en-US" sz="1200" b="1" kern="1200" baseline="0" dirty="0" smtClean="0">
@@ -1288,15 +1449,6 @@
               </a:rPr>
               <a:t>example of how regression has been used in the natural resources field?</a:t>
             </a:r>
-            <a:endParaRPr lang="en-US" sz="1200" b="1" kern="1200" dirty="0" smtClean="0">
-              <a:solidFill>
-                <a:schemeClr val="tx1"/>
-              </a:solidFill>
-              <a:effectLst/>
-              <a:latin typeface="+mn-lt"/>
-              <a:ea typeface="+mn-ea"/>
-              <a:cs typeface="+mn-cs"/>
-            </a:endParaRPr>
           </a:p>
           <a:p>
             <a:endParaRPr lang="en-US" dirty="0"/>
@@ -2046,22 +2198,18 @@
           <a:bodyPr/>
           <a:lstStyle/>
           <a:p>
-            <a:r>
-              <a:rPr lang="en-US" dirty="0" err="1" smtClean="0"/>
-              <a:t>Thsi</a:t>
-            </a:r>
-            <a:r>
-              <a:rPr lang="en-US" dirty="0" smtClean="0"/>
-              <a:t> plot is used to detect non-linearity, unequal error variances, and outliers. In</a:t>
-            </a:r>
-            <a:r>
-              <a:rPr lang="en-US" baseline="0" dirty="0" smtClean="0"/>
-              <a:t> a perfect world, the observations would be equally spread around a horizontal line without any distinct patterns.  Do you see a linear trend? What about their variances? Are there any outliers? –click- what about this model?</a:t>
-            </a:r>
-            <a:endParaRPr lang="en-US" dirty="0" smtClean="0"/>
-          </a:p>
-          <a:p>
-            <a:endParaRPr lang="en-US" dirty="0" smtClean="0"/>
+            <a:pPr marL="0" indent="0">
+              <a:buNone/>
+            </a:pPr>
+            <a:r>
+              <a:rPr lang="en-US" b="1" dirty="0" smtClean="0"/>
+              <a:t>What can you conclude from this regression</a:t>
+            </a:r>
+            <a:r>
+              <a:rPr lang="en-US" b="1" baseline="0" dirty="0" smtClean="0"/>
+              <a:t> summary?</a:t>
+            </a:r>
+            <a:endParaRPr lang="en-US" b="1" dirty="0"/>
           </a:p>
         </p:txBody>
       </p:sp>
@@ -2082,7 +2230,7 @@
           <a:p>
             <a:fld id="{CC5A1FCD-79C7-4337-B79E-A51417706FB1}" type="slidenum">
               <a:rPr lang="en-US" smtClean="0"/>
-              <a:t>13</a:t>
+              <a:t>12</a:t>
             </a:fld>
             <a:endParaRPr lang="en-US"/>
           </a:p>
@@ -2091,7 +2239,7 @@
     </p:spTree>
     <p:extLst>
       <p:ext uri="{BB962C8B-B14F-4D97-AF65-F5344CB8AC3E}">
-        <p14:creationId xmlns:p14="http://schemas.microsoft.com/office/powerpoint/2010/main" val="3028999263"/>
+        <p14:creationId xmlns:p14="http://schemas.microsoft.com/office/powerpoint/2010/main" val="1503954145"/>
       </p:ext>
     </p:extLst>
   </p:cSld>
@@ -2147,13 +2295,32 @@
           <a:p>
             <a:r>
               <a:rPr lang="en-US" dirty="0" smtClean="0"/>
-              <a:t>Normality---notice the same outliers in this</a:t>
+              <a:t>This </a:t>
+            </a:r>
+            <a:r>
+              <a:rPr lang="en-US" dirty="0" smtClean="0"/>
+              <a:t>plot is used to detect non-linearity, unequal error variances, and outliers. In</a:t>
             </a:r>
             <a:r>
               <a:rPr lang="en-US" baseline="0" dirty="0" smtClean="0"/>
-              <a:t> plot as the last. </a:t>
-            </a:r>
-            <a:endParaRPr lang="en-US" dirty="0"/>
+              <a:t> a perfect world, the observations would be equally spread around a horizontal line without any distinct patterns.  </a:t>
+            </a:r>
+            <a:r>
+              <a:rPr lang="en-US" b="1" baseline="0" dirty="0" smtClean="0"/>
+              <a:t>Do you see a linear trend? What about their variances? Are there any outliers? </a:t>
+            </a:r>
+            <a:r>
+              <a:rPr lang="en-US" baseline="0" dirty="0" smtClean="0"/>
+              <a:t>–click- </a:t>
+            </a:r>
+            <a:r>
+              <a:rPr lang="en-US" b="1" baseline="0" dirty="0" smtClean="0"/>
+              <a:t>what about this model?</a:t>
+            </a:r>
+            <a:endParaRPr lang="en-US" b="1" dirty="0" smtClean="0"/>
+          </a:p>
+          <a:p>
+            <a:endParaRPr lang="en-US" dirty="0" smtClean="0"/>
           </a:p>
         </p:txBody>
       </p:sp>
@@ -2183,7 +2350,7 @@
     </p:spTree>
     <p:extLst>
       <p:ext uri="{BB962C8B-B14F-4D97-AF65-F5344CB8AC3E}">
-        <p14:creationId xmlns:p14="http://schemas.microsoft.com/office/powerpoint/2010/main" val="1425745574"/>
+        <p14:creationId xmlns:p14="http://schemas.microsoft.com/office/powerpoint/2010/main" val="3028999263"/>
       </p:ext>
     </p:extLst>
   </p:cSld>
@@ -2239,11 +2406,43 @@
           <a:p>
             <a:r>
               <a:rPr lang="en-US" dirty="0" smtClean="0"/>
-              <a:t>This plot shows if residuals are spread equally along the ranges of predictors. This is how you can check the assumption of equal variance (homoscedasticity). It’s good if you see a horizontal line with equally (randomly) spread points. What</a:t>
+              <a:t>Quantile</a:t>
             </a:r>
             <a:r>
               <a:rPr lang="en-US" baseline="0" dirty="0" smtClean="0"/>
-              <a:t> does this plot tell you?</a:t>
+              <a:t> plot is a probability plot that can be used to compare the shapes of the data vs theoretical distribution, </a:t>
+            </a:r>
+            <a:r>
+              <a:rPr lang="en-US" baseline="0" dirty="0" err="1" smtClean="0"/>
+              <a:t>ie</a:t>
+            </a:r>
+            <a:r>
+              <a:rPr lang="en-US" baseline="0" dirty="0" smtClean="0"/>
+              <a:t>: location, scale, and skewness . If the quantiles of the theoretical and data distributions agree, observations will plot on the line shown in the figure above. </a:t>
+            </a:r>
+            <a:r>
+              <a:rPr lang="en-US" b="1" baseline="0" dirty="0" smtClean="0"/>
+              <a:t>What do you notice about the tails of this distribution? </a:t>
+            </a:r>
+            <a:r>
+              <a:rPr lang="en-US" dirty="0" smtClean="0"/>
+              <a:t>The tails </a:t>
+            </a:r>
+            <a:r>
+              <a:rPr lang="en-US" baseline="0" dirty="0" smtClean="0"/>
+              <a:t>are positively skewed and there are a few outliers denoted by the observations labels--</a:t>
+            </a:r>
+            <a:r>
+              <a:rPr lang="en-US" dirty="0" smtClean="0"/>
+              <a:t>same </a:t>
+            </a:r>
+            <a:r>
+              <a:rPr lang="en-US" dirty="0" smtClean="0"/>
+              <a:t>outliers in this</a:t>
+            </a:r>
+            <a:r>
+              <a:rPr lang="en-US" baseline="0" dirty="0" smtClean="0"/>
+              <a:t> plot as the last. </a:t>
             </a:r>
             <a:endParaRPr lang="en-US" dirty="0"/>
           </a:p>
@@ -2275,7 +2474,7 @@
     </p:spTree>
     <p:extLst>
       <p:ext uri="{BB962C8B-B14F-4D97-AF65-F5344CB8AC3E}">
-        <p14:creationId xmlns:p14="http://schemas.microsoft.com/office/powerpoint/2010/main" val="2228989618"/>
+        <p14:creationId xmlns:p14="http://schemas.microsoft.com/office/powerpoint/2010/main" val="1425745574"/>
       </p:ext>
     </p:extLst>
   </p:cSld>
@@ -2492,7 +2691,7 @@
           <a:p>
             <a:fld id="{97CFF939-70E9-4E47-9899-4E3DA2789027}" type="datetimeFigureOut">
               <a:rPr lang="en-US" smtClean="0"/>
-              <a:t>2/9/2016</a:t>
+              <a:t>2/10/2016</a:t>
             </a:fld>
             <a:endParaRPr lang="en-US"/>
           </a:p>
@@ -2684,7 +2883,7 @@
           <a:p>
             <a:fld id="{97CFF939-70E9-4E47-9899-4E3DA2789027}" type="datetimeFigureOut">
               <a:rPr lang="en-US" smtClean="0"/>
-              <a:t>2/9/2016</a:t>
+              <a:t>2/10/2016</a:t>
             </a:fld>
             <a:endParaRPr lang="en-US"/>
           </a:p>
@@ -2864,7 +3063,7 @@
           <a:p>
             <a:fld id="{97CFF939-70E9-4E47-9899-4E3DA2789027}" type="datetimeFigureOut">
               <a:rPr lang="en-US" smtClean="0"/>
-              <a:t>2/9/2016</a:t>
+              <a:t>2/10/2016</a:t>
             </a:fld>
             <a:endParaRPr lang="en-US"/>
           </a:p>
@@ -3034,7 +3233,7 @@
           <a:p>
             <a:fld id="{97CFF939-70E9-4E47-9899-4E3DA2789027}" type="datetimeFigureOut">
               <a:rPr lang="en-US" smtClean="0"/>
-              <a:t>2/9/2016</a:t>
+              <a:t>2/10/2016</a:t>
             </a:fld>
             <a:endParaRPr lang="en-US"/>
           </a:p>
@@ -3288,7 +3487,7 @@
           <a:p>
             <a:fld id="{97CFF939-70E9-4E47-9899-4E3DA2789027}" type="datetimeFigureOut">
               <a:rPr lang="en-US" smtClean="0"/>
-              <a:t>2/9/2016</a:t>
+              <a:t>2/10/2016</a:t>
             </a:fld>
             <a:endParaRPr lang="en-US"/>
           </a:p>
@@ -3614,7 +3813,7 @@
           <a:p>
             <a:fld id="{97CFF939-70E9-4E47-9899-4E3DA2789027}" type="datetimeFigureOut">
               <a:rPr lang="en-US" smtClean="0"/>
-              <a:t>2/9/2016</a:t>
+              <a:t>2/10/2016</a:t>
             </a:fld>
             <a:endParaRPr lang="en-US"/>
           </a:p>
@@ -4034,7 +4233,7 @@
           <a:p>
             <a:fld id="{97CFF939-70E9-4E47-9899-4E3DA2789027}" type="datetimeFigureOut">
               <a:rPr lang="en-US" smtClean="0"/>
-              <a:t>2/9/2016</a:t>
+              <a:t>2/10/2016</a:t>
             </a:fld>
             <a:endParaRPr lang="en-US"/>
           </a:p>
@@ -4152,7 +4351,7 @@
           <a:p>
             <a:fld id="{97CFF939-70E9-4E47-9899-4E3DA2789027}" type="datetimeFigureOut">
               <a:rPr lang="en-US" smtClean="0"/>
-              <a:t>2/9/2016</a:t>
+              <a:t>2/10/2016</a:t>
             </a:fld>
             <a:endParaRPr lang="en-US"/>
           </a:p>
@@ -4247,7 +4446,7 @@
           <a:p>
             <a:fld id="{97CFF939-70E9-4E47-9899-4E3DA2789027}" type="datetimeFigureOut">
               <a:rPr lang="en-US" smtClean="0"/>
-              <a:t>2/9/2016</a:t>
+              <a:t>2/10/2016</a:t>
             </a:fld>
             <a:endParaRPr lang="en-US"/>
           </a:p>
@@ -4534,7 +4733,7 @@
           <a:p>
             <a:fld id="{97CFF939-70E9-4E47-9899-4E3DA2789027}" type="datetimeFigureOut">
               <a:rPr lang="en-US" smtClean="0"/>
-              <a:t>2/9/2016</a:t>
+              <a:t>2/10/2016</a:t>
             </a:fld>
             <a:endParaRPr lang="en-US"/>
           </a:p>
@@ -4856,7 +5055,7 @@
           <a:p>
             <a:fld id="{97CFF939-70E9-4E47-9899-4E3DA2789027}" type="datetimeFigureOut">
               <a:rPr lang="en-US" smtClean="0"/>
-              <a:t>2/9/2016</a:t>
+              <a:t>2/10/2016</a:t>
             </a:fld>
             <a:endParaRPr lang="en-US"/>
           </a:p>
@@ -5110,7 +5309,7 @@
           <a:p>
             <a:fld id="{97CFF939-70E9-4E47-9899-4E3DA2789027}" type="datetimeFigureOut">
               <a:rPr lang="en-US" smtClean="0"/>
-              <a:t>2/9/2016</a:t>
+              <a:t>2/10/2016</a:t>
             </a:fld>
             <a:endParaRPr lang="en-US"/>
           </a:p>
@@ -7016,6 +7215,144 @@
           <a:chExt cx="0" cy="0"/>
         </a:xfrm>
       </p:grpSpPr>
+      <p:pic>
+        <p:nvPicPr>
+          <p:cNvPr id="21" name="Picture 20"/>
+          <p:cNvPicPr>
+            <a:picLocks noChangeAspect="1"/>
+          </p:cNvPicPr>
+          <p:nvPr/>
+        </p:nvPicPr>
+        <p:blipFill rotWithShape="1">
+          <a:blip r:embed="rId3"/>
+          <a:srcRect l="839" t="55103" r="65661" b="42915"/>
+          <a:stretch/>
+        </p:blipFill>
+        <p:spPr>
+          <a:xfrm>
+            <a:off x="918328" y="2057399"/>
+            <a:ext cx="6867762" cy="228601"/>
+          </a:xfrm>
+          <a:prstGeom prst="rect">
+            <a:avLst/>
+          </a:prstGeom>
+        </p:spPr>
+      </p:pic>
+      <p:sp>
+        <p:nvSpPr>
+          <p:cNvPr id="2" name="Title 1"/>
+          <p:cNvSpPr>
+            <a:spLocks noGrp="1"/>
+          </p:cNvSpPr>
+          <p:nvPr>
+            <p:ph type="title"/>
+          </p:nvPr>
+        </p:nvSpPr>
+        <p:spPr/>
+        <p:txBody>
+          <a:bodyPr/>
+          <a:lstStyle/>
+          <a:p>
+            <a:r>
+              <a:rPr lang="en-US" dirty="0" smtClean="0"/>
+              <a:t>EXERCISE: Interpreting </a:t>
+            </a:r>
+            <a:r>
+              <a:rPr lang="en-US" dirty="0" smtClean="0"/>
+              <a:t>Model Results</a:t>
+            </a:r>
+            <a:endParaRPr lang="en-US" dirty="0"/>
+          </a:p>
+        </p:txBody>
+      </p:sp>
+      <p:pic>
+        <p:nvPicPr>
+          <p:cNvPr id="16" name="Picture 15"/>
+          <p:cNvPicPr>
+            <a:picLocks noChangeAspect="1"/>
+          </p:cNvPicPr>
+          <p:nvPr/>
+        </p:nvPicPr>
+        <p:blipFill rotWithShape="1">
+          <a:blip r:embed="rId4"/>
+          <a:srcRect l="23500" t="27036" r="24000" b="6444"/>
+          <a:stretch/>
+        </p:blipFill>
+        <p:spPr>
+          <a:xfrm>
+            <a:off x="918328" y="2438399"/>
+            <a:ext cx="6244472" cy="3897555"/>
+          </a:xfrm>
+          <a:prstGeom prst="rect">
+            <a:avLst/>
+          </a:prstGeom>
+        </p:spPr>
+      </p:pic>
+      <p:sp>
+        <p:nvSpPr>
+          <p:cNvPr id="6" name="Rectangle 5"/>
+          <p:cNvSpPr/>
+          <p:nvPr/>
+        </p:nvSpPr>
+        <p:spPr>
+          <a:xfrm>
+            <a:off x="0" y="6642556"/>
+            <a:ext cx="6396872" cy="215444"/>
+          </a:xfrm>
+          <a:prstGeom prst="rect">
+            <a:avLst/>
+          </a:prstGeom>
+        </p:spPr>
+        <p:txBody>
+          <a:bodyPr wrap="square">
+            <a:spAutoFit/>
+          </a:bodyPr>
+          <a:lstStyle/>
+          <a:p>
+            <a:r>
+              <a:rPr lang="en-US" sz="800" dirty="0"/>
+              <a:t>http://www.montana.edu/screel/Webpages/conservation%20biology/Interpreting%20Regression%20Coefficients.html#/24</a:t>
+            </a:r>
+          </a:p>
+        </p:txBody>
+      </p:sp>
+    </p:spTree>
+    <p:extLst>
+      <p:ext uri="{BB962C8B-B14F-4D97-AF65-F5344CB8AC3E}">
+        <p14:creationId xmlns:p14="http://schemas.microsoft.com/office/powerpoint/2010/main" val="2820414751"/>
+      </p:ext>
+    </p:extLst>
+  </p:cSld>
+  <p:clrMapOvr>
+    <a:masterClrMapping/>
+  </p:clrMapOvr>
+  <p:timing>
+    <p:tnLst>
+      <p:par>
+        <p:cTn id="1" dur="indefinite" restart="never" nodeType="tmRoot"/>
+      </p:par>
+    </p:tnLst>
+  </p:timing>
+</p:sld>
+</file>
+
+<file path=ppt/slides/slide13.xml><?xml version="1.0" encoding="utf-8"?>
+<p:sld xmlns:a="http://schemas.openxmlformats.org/drawingml/2006/main" xmlns:r="http://schemas.openxmlformats.org/officeDocument/2006/relationships" xmlns:p="http://schemas.openxmlformats.org/presentationml/2006/main">
+  <p:cSld>
+    <p:spTree>
+      <p:nvGrpSpPr>
+        <p:cNvPr id="1" name=""/>
+        <p:cNvGrpSpPr/>
+        <p:nvPr/>
+      </p:nvGrpSpPr>
+      <p:grpSpPr>
+        <a:xfrm>
+          <a:off x="0" y="0"/>
+          <a:ext cx="0" cy="0"/>
+          <a:chOff x="0" y="0"/>
+          <a:chExt cx="0" cy="0"/>
+        </a:xfrm>
+      </p:grpSpPr>
       <p:sp>
         <p:nvSpPr>
           <p:cNvPr id="2" name="Title 1"/>
@@ -7087,7 +7424,7 @@
 </p:sld>
 </file>
 
-<file path=ppt/slides/slide13.xml><?xml version="1.0" encoding="utf-8"?>
+<file path=ppt/slides/slide14.xml><?xml version="1.0" encoding="utf-8"?>
 <p:sld xmlns:a="http://schemas.openxmlformats.org/drawingml/2006/main" xmlns:r="http://schemas.openxmlformats.org/officeDocument/2006/relationships" xmlns:p="http://schemas.openxmlformats.org/presentationml/2006/main">
   <p:cSld>
     <p:spTree>
@@ -7326,7 +7663,7 @@
 </p:sld>
 </file>
 
-<file path=ppt/slides/slide14.xml><?xml version="1.0" encoding="utf-8"?>
+<file path=ppt/slides/slide15.xml><?xml version="1.0" encoding="utf-8"?>
 <p:sld xmlns:a="http://schemas.openxmlformats.org/drawingml/2006/main" xmlns:r="http://schemas.openxmlformats.org/officeDocument/2006/relationships" xmlns:p="http://schemas.openxmlformats.org/presentationml/2006/main">
   <p:cSld>
     <p:spTree>
@@ -7415,7 +7752,7 @@
 </p:sld>
 </file>
 
-<file path=ppt/slides/slide15.xml><?xml version="1.0" encoding="utf-8"?>
+<file path=ppt/slides/slide16.xml><?xml version="1.0" encoding="utf-8"?>
 <p:sld xmlns:a="http://schemas.openxmlformats.org/drawingml/2006/main" xmlns:r="http://schemas.openxmlformats.org/officeDocument/2006/relationships" xmlns:p="http://schemas.openxmlformats.org/presentationml/2006/main">
   <p:cSld>
     <p:spTree>
@@ -7504,7 +7841,7 @@
 </p:sld>
 </file>
 
-<file path=ppt/slides/slide16.xml><?xml version="1.0" encoding="utf-8"?>
+<file path=ppt/slides/slide17.xml><?xml version="1.0" encoding="utf-8"?>
 <p:sld xmlns:a="http://schemas.openxmlformats.org/drawingml/2006/main" xmlns:r="http://schemas.openxmlformats.org/officeDocument/2006/relationships" xmlns:p="http://schemas.openxmlformats.org/presentationml/2006/main">
   <p:cSld>
     <p:spTree>
@@ -7593,92 +7930,6 @@
 </p:sld>
 </file>
 
-<file path=ppt/slides/slide17.xml><?xml version="1.0" encoding="utf-8"?>
-<p:sld xmlns:a="http://schemas.openxmlformats.org/drawingml/2006/main" xmlns:r="http://schemas.openxmlformats.org/officeDocument/2006/relationships" xmlns:p="http://schemas.openxmlformats.org/presentationml/2006/main">
-  <p:cSld>
-    <p:spTree>
-      <p:nvGrpSpPr>
-        <p:cNvPr id="1" name=""/>
-        <p:cNvGrpSpPr/>
-        <p:nvPr/>
-      </p:nvGrpSpPr>
-      <p:grpSpPr>
-        <a:xfrm>
-          <a:off x="0" y="0"/>
-          <a:ext cx="0" cy="0"/>
-          <a:chOff x="0" y="0"/>
-          <a:chExt cx="0" cy="0"/>
-        </a:xfrm>
-      </p:grpSpPr>
-      <p:sp>
-        <p:nvSpPr>
-          <p:cNvPr id="2" name="Title 1"/>
-          <p:cNvSpPr>
-            <a:spLocks noGrp="1"/>
-          </p:cNvSpPr>
-          <p:nvPr>
-            <p:ph type="title"/>
-          </p:nvPr>
-        </p:nvSpPr>
-        <p:spPr/>
-        <p:txBody>
-          <a:bodyPr/>
-          <a:lstStyle/>
-          <a:p>
-            <a:r>
-              <a:rPr lang="en-US" dirty="0" smtClean="0"/>
-              <a:t>EXERCISE: Linear Regression</a:t>
-            </a:r>
-            <a:endParaRPr lang="en-US" dirty="0"/>
-          </a:p>
-        </p:txBody>
-      </p:sp>
-      <p:sp>
-        <p:nvSpPr>
-          <p:cNvPr id="3" name="Content Placeholder 2"/>
-          <p:cNvSpPr>
-            <a:spLocks noGrp="1"/>
-          </p:cNvSpPr>
-          <p:nvPr>
-            <p:ph idx="1"/>
-          </p:nvPr>
-        </p:nvSpPr>
-        <p:spPr/>
-        <p:txBody>
-          <a:bodyPr/>
-          <a:lstStyle/>
-          <a:p>
-            <a:pPr marL="0" indent="0">
-              <a:buNone/>
-            </a:pPr>
-            <a:r>
-              <a:rPr lang="en-US" dirty="0" smtClean="0"/>
-              <a:t>****INSERT LINK TO LINEAR REGRESSION .RMD FILE****</a:t>
-            </a:r>
-            <a:endParaRPr lang="en-US" dirty="0"/>
-          </a:p>
-        </p:txBody>
-      </p:sp>
-    </p:spTree>
-    <p:extLst>
-      <p:ext uri="{BB962C8B-B14F-4D97-AF65-F5344CB8AC3E}">
-        <p14:creationId xmlns:p14="http://schemas.microsoft.com/office/powerpoint/2010/main" val="3530076183"/>
-      </p:ext>
-    </p:extLst>
-  </p:cSld>
-  <p:clrMapOvr>
-    <a:masterClrMapping/>
-  </p:clrMapOvr>
-  <p:timing>
-    <p:tnLst>
-      <p:par>
-        <p:cTn id="1" dur="indefinite" restart="never" nodeType="tmRoot"/>
-      </p:par>
-    </p:tnLst>
-  </p:timing>
-</p:sld>
-</file>
-
 <file path=ppt/slides/slide18.xml><?xml version="1.0" encoding="utf-8"?>
 <p:sld xmlns:a="http://schemas.openxmlformats.org/drawingml/2006/main" xmlns:r="http://schemas.openxmlformats.org/officeDocument/2006/relationships" xmlns:p="http://schemas.openxmlformats.org/presentationml/2006/main">
   <p:cSld>
@@ -7713,102 +7964,42 @@
           <a:p>
             <a:r>
               <a:rPr lang="en-US" dirty="0" smtClean="0"/>
-              <a:t>Summary</a:t>
+              <a:t>EXERCISE: Linear Regression</a:t>
             </a:r>
             <a:endParaRPr lang="en-US" dirty="0"/>
           </a:p>
         </p:txBody>
       </p:sp>
-      <p:pic>
-        <p:nvPicPr>
-          <p:cNvPr id="4" name="Content Placeholder 3"/>
-          <p:cNvPicPr>
-            <a:picLocks noChangeAspect="1"/>
-          </p:cNvPicPr>
-          <p:nvPr/>
-        </p:nvPicPr>
-        <p:blipFill>
-          <a:blip r:embed="rId3">
-            <a:extLst>
-              <a:ext uri="{28A0092B-C50C-407E-A947-70E740481C1C}">
-                <a14:useLocalDpi xmlns:a14="http://schemas.microsoft.com/office/drawing/2010/main" val="0"/>
-              </a:ext>
-            </a:extLst>
-          </a:blip>
-          <a:stretch>
-            <a:fillRect/>
-          </a:stretch>
-        </p:blipFill>
-        <p:spPr>
-          <a:xfrm>
-            <a:off x="786765" y="1777032"/>
-            <a:ext cx="6765798" cy="4329524"/>
-          </a:xfrm>
-          <a:prstGeom prst="rect">
-            <a:avLst/>
-          </a:prstGeom>
-        </p:spPr>
-      </p:pic>
-      <p:sp>
-        <p:nvSpPr>
-          <p:cNvPr id="5" name="Rectangle 4"/>
-          <p:cNvSpPr/>
-          <p:nvPr/>
-        </p:nvSpPr>
-        <p:spPr>
-          <a:xfrm>
-            <a:off x="0" y="6642556"/>
-            <a:ext cx="1140056" cy="215444"/>
-          </a:xfrm>
-          <a:prstGeom prst="rect">
-            <a:avLst/>
-          </a:prstGeom>
-        </p:spPr>
+      <p:sp>
+        <p:nvSpPr>
+          <p:cNvPr id="3" name="Content Placeholder 2"/>
+          <p:cNvSpPr>
+            <a:spLocks noGrp="1"/>
+          </p:cNvSpPr>
+          <p:nvPr>
+            <p:ph idx="1"/>
+          </p:nvPr>
+        </p:nvSpPr>
+        <p:spPr/>
         <p:txBody>
-          <a:bodyPr wrap="none">
-            <a:spAutoFit/>
-          </a:bodyPr>
+          <a:bodyPr/>
           <a:lstStyle/>
           <a:p>
-            <a:r>
-              <a:rPr lang="en-US" sz="800" dirty="0"/>
-              <a:t>http://xkcd.com/833/</a:t>
-            </a:r>
-          </a:p>
-        </p:txBody>
-      </p:sp>
-      <p:sp>
-        <p:nvSpPr>
-          <p:cNvPr id="6" name="Rectangle 5"/>
-          <p:cNvSpPr/>
-          <p:nvPr/>
-        </p:nvSpPr>
-        <p:spPr>
-          <a:xfrm>
-            <a:off x="1959764" y="6106556"/>
-            <a:ext cx="4419800" cy="369332"/>
-          </a:xfrm>
-          <a:prstGeom prst="rect">
-            <a:avLst/>
-          </a:prstGeom>
-        </p:spPr>
-        <p:txBody>
-          <a:bodyPr wrap="none">
-            <a:spAutoFit/>
-          </a:bodyPr>
-          <a:lstStyle/>
-          <a:p>
-            <a:r>
-              <a:rPr lang="en-US" dirty="0"/>
-              <a:t>Correlation does NOT imply Causation!</a:t>
-            </a:r>
+            <a:pPr marL="0" indent="0">
+              <a:buNone/>
+            </a:pPr>
+            <a:r>
+              <a:rPr lang="en-US" dirty="0" smtClean="0"/>
+              <a:t>****INSERT LINK TO LINEAR REGRESSION .RMD FILE****</a:t>
+            </a:r>
+            <a:endParaRPr lang="en-US" dirty="0"/>
           </a:p>
         </p:txBody>
       </p:sp>
     </p:spTree>
     <p:extLst>
       <p:ext uri="{BB962C8B-B14F-4D97-AF65-F5344CB8AC3E}">
-        <p14:creationId xmlns:p14="http://schemas.microsoft.com/office/powerpoint/2010/main" val="2719573860"/>
+        <p14:creationId xmlns:p14="http://schemas.microsoft.com/office/powerpoint/2010/main" val="3530076183"/>
       </p:ext>
     </p:extLst>
   </p:cSld>
@@ -7865,6 +8056,152 @@
           </a:p>
         </p:txBody>
       </p:sp>
+      <p:pic>
+        <p:nvPicPr>
+          <p:cNvPr id="4" name="Content Placeholder 3"/>
+          <p:cNvPicPr>
+            <a:picLocks noChangeAspect="1"/>
+          </p:cNvPicPr>
+          <p:nvPr/>
+        </p:nvPicPr>
+        <p:blipFill>
+          <a:blip r:embed="rId3">
+            <a:extLst>
+              <a:ext uri="{28A0092B-C50C-407E-A947-70E740481C1C}">
+                <a14:useLocalDpi xmlns:a14="http://schemas.microsoft.com/office/drawing/2010/main" val="0"/>
+              </a:ext>
+            </a:extLst>
+          </a:blip>
+          <a:stretch>
+            <a:fillRect/>
+          </a:stretch>
+        </p:blipFill>
+        <p:spPr>
+          <a:xfrm>
+            <a:off x="786765" y="1777032"/>
+            <a:ext cx="6765798" cy="4329524"/>
+          </a:xfrm>
+          <a:prstGeom prst="rect">
+            <a:avLst/>
+          </a:prstGeom>
+        </p:spPr>
+      </p:pic>
+      <p:sp>
+        <p:nvSpPr>
+          <p:cNvPr id="5" name="Rectangle 4"/>
+          <p:cNvSpPr/>
+          <p:nvPr/>
+        </p:nvSpPr>
+        <p:spPr>
+          <a:xfrm>
+            <a:off x="0" y="6642556"/>
+            <a:ext cx="1140056" cy="215444"/>
+          </a:xfrm>
+          <a:prstGeom prst="rect">
+            <a:avLst/>
+          </a:prstGeom>
+        </p:spPr>
+        <p:txBody>
+          <a:bodyPr wrap="none">
+            <a:spAutoFit/>
+          </a:bodyPr>
+          <a:lstStyle/>
+          <a:p>
+            <a:r>
+              <a:rPr lang="en-US" sz="800" dirty="0"/>
+              <a:t>http://xkcd.com/833/</a:t>
+            </a:r>
+          </a:p>
+        </p:txBody>
+      </p:sp>
+      <p:sp>
+        <p:nvSpPr>
+          <p:cNvPr id="6" name="Rectangle 5"/>
+          <p:cNvSpPr/>
+          <p:nvPr/>
+        </p:nvSpPr>
+        <p:spPr>
+          <a:xfrm>
+            <a:off x="1959764" y="6106556"/>
+            <a:ext cx="4419800" cy="369332"/>
+          </a:xfrm>
+          <a:prstGeom prst="rect">
+            <a:avLst/>
+          </a:prstGeom>
+        </p:spPr>
+        <p:txBody>
+          <a:bodyPr wrap="none">
+            <a:spAutoFit/>
+          </a:bodyPr>
+          <a:lstStyle/>
+          <a:p>
+            <a:r>
+              <a:rPr lang="en-US" dirty="0"/>
+              <a:t>Correlation does NOT imply Causation!</a:t>
+            </a:r>
+          </a:p>
+        </p:txBody>
+      </p:sp>
+    </p:spTree>
+    <p:extLst>
+      <p:ext uri="{BB962C8B-B14F-4D97-AF65-F5344CB8AC3E}">
+        <p14:creationId xmlns:p14="http://schemas.microsoft.com/office/powerpoint/2010/main" val="2719573860"/>
+      </p:ext>
+    </p:extLst>
+  </p:cSld>
+  <p:clrMapOvr>
+    <a:masterClrMapping/>
+  </p:clrMapOvr>
+  <p:timing>
+    <p:tnLst>
+      <p:par>
+        <p:cTn id="1" dur="indefinite" restart="never" nodeType="tmRoot"/>
+      </p:par>
+    </p:tnLst>
+  </p:timing>
+</p:sld>
+</file>
+
+<file path=ppt/slides/slide2.xml><?xml version="1.0" encoding="utf-8"?>
+<p:sld xmlns:a="http://schemas.openxmlformats.org/drawingml/2006/main" xmlns:r="http://schemas.openxmlformats.org/officeDocument/2006/relationships" xmlns:p="http://schemas.openxmlformats.org/presentationml/2006/main">
+  <p:cSld>
+    <p:spTree>
+      <p:nvGrpSpPr>
+        <p:cNvPr id="1" name=""/>
+        <p:cNvGrpSpPr/>
+        <p:nvPr/>
+      </p:nvGrpSpPr>
+      <p:grpSpPr>
+        <a:xfrm>
+          <a:off x="0" y="0"/>
+          <a:ext cx="0" cy="0"/>
+          <a:chOff x="0" y="0"/>
+          <a:chExt cx="0" cy="0"/>
+        </a:xfrm>
+      </p:grpSpPr>
+      <p:sp>
+        <p:nvSpPr>
+          <p:cNvPr id="2" name="Title 1"/>
+          <p:cNvSpPr>
+            <a:spLocks noGrp="1"/>
+          </p:cNvSpPr>
+          <p:nvPr>
+            <p:ph type="title"/>
+          </p:nvPr>
+        </p:nvSpPr>
+        <p:spPr/>
+        <p:txBody>
+          <a:bodyPr/>
+          <a:lstStyle/>
+          <a:p>
+            <a:r>
+              <a:rPr lang="en-US" dirty="0" smtClean="0"/>
+              <a:t>Objectives</a:t>
+            </a:r>
+            <a:endParaRPr lang="en-US" dirty="0"/>
+          </a:p>
+        </p:txBody>
+      </p:sp>
       <p:sp>
         <p:nvSpPr>
           <p:cNvPr id="3" name="Content Placeholder 2"/>
@@ -7877,10 +8214,101 @@
         </p:nvSpPr>
         <p:spPr/>
         <p:txBody>
+          <a:bodyPr>
+            <a:normAutofit/>
+          </a:bodyPr>
+          <a:lstStyle/>
+          <a:p>
+            <a:pPr lvl="0"/>
+            <a:r>
+              <a:rPr lang="en-US" sz="2400" dirty="0"/>
+              <a:t>Compute and interpret coefficients in a linear regression analysis in R.</a:t>
+            </a:r>
+          </a:p>
+          <a:p>
+            <a:r>
+              <a:rPr lang="en-US" sz="2400" dirty="0"/>
+              <a:t>Interpolate regression model in R to produce a raster layer.</a:t>
+            </a:r>
+          </a:p>
+        </p:txBody>
+      </p:sp>
+    </p:spTree>
+    <p:extLst>
+      <p:ext uri="{BB962C8B-B14F-4D97-AF65-F5344CB8AC3E}">
+        <p14:creationId xmlns:p14="http://schemas.microsoft.com/office/powerpoint/2010/main" val="625797011"/>
+      </p:ext>
+    </p:extLst>
+  </p:cSld>
+  <p:clrMapOvr>
+    <a:masterClrMapping/>
+  </p:clrMapOvr>
+  <p:timing>
+    <p:tnLst>
+      <p:par>
+        <p:cTn id="1" dur="indefinite" restart="never" nodeType="tmRoot"/>
+      </p:par>
+    </p:tnLst>
+  </p:timing>
+</p:sld>
+</file>
+
+<file path=ppt/slides/slide20.xml><?xml version="1.0" encoding="utf-8"?>
+<p:sld xmlns:a="http://schemas.openxmlformats.org/drawingml/2006/main" xmlns:r="http://schemas.openxmlformats.org/officeDocument/2006/relationships" xmlns:p="http://schemas.openxmlformats.org/presentationml/2006/main">
+  <p:cSld>
+    <p:spTree>
+      <p:nvGrpSpPr>
+        <p:cNvPr id="1" name=""/>
+        <p:cNvGrpSpPr/>
+        <p:nvPr/>
+      </p:nvGrpSpPr>
+      <p:grpSpPr>
+        <a:xfrm>
+          <a:off x="0" y="0"/>
+          <a:ext cx="0" cy="0"/>
+          <a:chOff x="0" y="0"/>
+          <a:chExt cx="0" cy="0"/>
+        </a:xfrm>
+      </p:grpSpPr>
+      <p:sp>
+        <p:nvSpPr>
+          <p:cNvPr id="2" name="Title 1"/>
+          <p:cNvSpPr>
+            <a:spLocks noGrp="1"/>
+          </p:cNvSpPr>
+          <p:nvPr>
+            <p:ph type="title"/>
+          </p:nvPr>
+        </p:nvSpPr>
+        <p:spPr/>
+        <p:txBody>
           <a:bodyPr/>
           <a:lstStyle/>
           <a:p>
             <a:r>
+              <a:rPr lang="en-US" dirty="0" smtClean="0"/>
+              <a:t>Summary</a:t>
+            </a:r>
+            <a:endParaRPr lang="en-US" dirty="0"/>
+          </a:p>
+        </p:txBody>
+      </p:sp>
+      <p:sp>
+        <p:nvSpPr>
+          <p:cNvPr id="3" name="Content Placeholder 2"/>
+          <p:cNvSpPr>
+            <a:spLocks noGrp="1"/>
+          </p:cNvSpPr>
+          <p:nvPr>
+            <p:ph idx="1"/>
+          </p:nvPr>
+        </p:nvSpPr>
+        <p:spPr/>
+        <p:txBody>
+          <a:bodyPr/>
+          <a:lstStyle/>
+          <a:p>
+            <a:r>
               <a:rPr lang="en-US" sz="2000" dirty="0" smtClean="0"/>
               <a:t>Linear regression models are intuitive, quick to execute, and easy to interpret, making them useful for NASIS calculations and </a:t>
             </a:r>
@@ -7896,7 +8324,15 @@
           <a:p>
             <a:r>
               <a:rPr lang="en-US" sz="2000" dirty="0" smtClean="0"/>
-              <a:t>Due to the non-linear nature of environmental data, data transformations or deletions are often needed to confine to model assumptions. </a:t>
+              <a:t>Due to the non-linear nature of environmental data, data transformations or deletions are often needed to </a:t>
+            </a:r>
+            <a:r>
+              <a:rPr lang="en-US" sz="2000" dirty="0" smtClean="0"/>
+              <a:t>meet model </a:t>
+            </a:r>
+            <a:r>
+              <a:rPr lang="en-US" sz="2000" dirty="0" smtClean="0"/>
+              <a:t>assumptions. </a:t>
             </a:r>
           </a:p>
           <a:p>
@@ -8073,99 +8509,7 @@
 </p:sld>
 </file>
 
-<file path=ppt/slides/slide2.xml><?xml version="1.0" encoding="utf-8"?>
-<p:sld xmlns:a="http://schemas.openxmlformats.org/drawingml/2006/main" xmlns:r="http://schemas.openxmlformats.org/officeDocument/2006/relationships" xmlns:p="http://schemas.openxmlformats.org/presentationml/2006/main">
-  <p:cSld>
-    <p:spTree>
-      <p:nvGrpSpPr>
-        <p:cNvPr id="1" name=""/>
-        <p:cNvGrpSpPr/>
-        <p:nvPr/>
-      </p:nvGrpSpPr>
-      <p:grpSpPr>
-        <a:xfrm>
-          <a:off x="0" y="0"/>
-          <a:ext cx="0" cy="0"/>
-          <a:chOff x="0" y="0"/>
-          <a:chExt cx="0" cy="0"/>
-        </a:xfrm>
-      </p:grpSpPr>
-      <p:sp>
-        <p:nvSpPr>
-          <p:cNvPr id="2" name="Title 1"/>
-          <p:cNvSpPr>
-            <a:spLocks noGrp="1"/>
-          </p:cNvSpPr>
-          <p:nvPr>
-            <p:ph type="title"/>
-          </p:nvPr>
-        </p:nvSpPr>
-        <p:spPr/>
-        <p:txBody>
-          <a:bodyPr/>
-          <a:lstStyle/>
-          <a:p>
-            <a:r>
-              <a:rPr lang="en-US" dirty="0" smtClean="0"/>
-              <a:t>Objectives</a:t>
-            </a:r>
-            <a:endParaRPr lang="en-US" dirty="0"/>
-          </a:p>
-        </p:txBody>
-      </p:sp>
-      <p:sp>
-        <p:nvSpPr>
-          <p:cNvPr id="3" name="Content Placeholder 2"/>
-          <p:cNvSpPr>
-            <a:spLocks noGrp="1"/>
-          </p:cNvSpPr>
-          <p:nvPr>
-            <p:ph idx="1"/>
-          </p:nvPr>
-        </p:nvSpPr>
-        <p:spPr/>
-        <p:txBody>
-          <a:bodyPr>
-            <a:normAutofit/>
-          </a:bodyPr>
-          <a:lstStyle/>
-          <a:p>
-            <a:pPr lvl="0"/>
-            <a:r>
-              <a:rPr lang="en-US" sz="2400" dirty="0"/>
-              <a:t>Compute and interpret coefficients in a linear regression analysis in R.</a:t>
-            </a:r>
-          </a:p>
-          <a:p>
-            <a:r>
-              <a:rPr lang="en-US" sz="2400" dirty="0"/>
-              <a:t>Interpolate regression model in R to produce a raster layer.</a:t>
-            </a:r>
-            <a:endParaRPr lang="en-US" sz="2400" dirty="0"/>
-          </a:p>
-        </p:txBody>
-      </p:sp>
-    </p:spTree>
-    <p:extLst>
-      <p:ext uri="{BB962C8B-B14F-4D97-AF65-F5344CB8AC3E}">
-        <p14:creationId xmlns:p14="http://schemas.microsoft.com/office/powerpoint/2010/main" val="625797011"/>
-      </p:ext>
-    </p:extLst>
-  </p:cSld>
-  <p:clrMapOvr>
-    <a:masterClrMapping/>
-  </p:clrMapOvr>
-  <p:timing>
-    <p:tnLst>
-      <p:par>
-        <p:cTn id="1" dur="indefinite" restart="never" nodeType="tmRoot"/>
-      </p:par>
-    </p:tnLst>
-  </p:timing>
-</p:sld>
-</file>
-
-<file path=ppt/slides/slide20.xml><?xml version="1.0" encoding="utf-8"?>
+<file path=ppt/slides/slide21.xml><?xml version="1.0" encoding="utf-8"?>
 <p:sld xmlns:a="http://schemas.openxmlformats.org/drawingml/2006/main" xmlns:r="http://schemas.openxmlformats.org/officeDocument/2006/relationships" xmlns:p="http://schemas.openxmlformats.org/presentationml/2006/main">
   <p:cSld>
     <p:spTree>
@@ -8612,7 +8956,7 @@
 </p:sld>
 </file>
 
-<file path=ppt/slides/slide21.xml><?xml version="1.0" encoding="utf-8"?>
+<file path=ppt/slides/slide22.xml><?xml version="1.0" encoding="utf-8"?>
 <p:sld xmlns:a="http://schemas.openxmlformats.org/drawingml/2006/main" xmlns:r="http://schemas.openxmlformats.org/officeDocument/2006/relationships" xmlns:p="http://schemas.openxmlformats.org/presentationml/2006/main">
   <p:cSld>
     <p:spTree>
@@ -9064,7 +9408,7 @@
 </p:sld>
 </file>
 
-<file path=ppt/slides/slide22.xml><?xml version="1.0" encoding="utf-8"?>
+<file path=ppt/slides/slide23.xml><?xml version="1.0" encoding="utf-8"?>
 <p:sld xmlns:a="http://schemas.openxmlformats.org/drawingml/2006/main" xmlns:r="http://schemas.openxmlformats.org/officeDocument/2006/relationships" xmlns:p="http://schemas.openxmlformats.org/presentationml/2006/main">
   <p:cSld>
     <p:spTree>
@@ -10385,7 +10729,7 @@
 </p:sld>
 </file>
 
-<file path=ppt/slides/slide23.xml><?xml version="1.0" encoding="utf-8"?>
+<file path=ppt/slides/slide24.xml><?xml version="1.0" encoding="utf-8"?>
 <p:sld xmlns:a="http://schemas.openxmlformats.org/drawingml/2006/main" xmlns:r="http://schemas.openxmlformats.org/officeDocument/2006/relationships" xmlns:p="http://schemas.openxmlformats.org/presentationml/2006/main">
   <p:cSld>
     <p:spTree>
@@ -11007,7 +11351,7 @@
 </p:sld>
 </file>
 
-<file path=ppt/slides/slide24.xml><?xml version="1.0" encoding="utf-8"?>
+<file path=ppt/slides/slide25.xml><?xml version="1.0" encoding="utf-8"?>
 <p:sld xmlns:a="http://schemas.openxmlformats.org/drawingml/2006/main" xmlns:r="http://schemas.openxmlformats.org/officeDocument/2006/relationships" xmlns:p="http://schemas.openxmlformats.org/presentationml/2006/main">
   <p:cSld>
     <p:spTree>
@@ -11047,8 +11391,8 @@
           </a:p>
         </p:txBody>
       </p:sp>
-      <mc:AlternateContent xmlns:mc="http://schemas.openxmlformats.org/markup-compatibility/2006" xmlns:a14="http://schemas.microsoft.com/office/drawing/2010/main">
-        <mc:Choice Requires="a14">
+      <mc:AlternateContent xmlns:mc="http://schemas.openxmlformats.org/markup-compatibility/2006">
+        <mc:Choice xmlns:a14="http://schemas.microsoft.com/office/drawing/2010/main" Requires="a14">
           <p:sp>
             <p:nvSpPr>
               <p:cNvPr id="3" name="Content Placeholder 2"/>
@@ -11077,9 +11421,22 @@
                   </a:spcBef>
                   <a:buNone/>
                 </a:pPr>
+                <a:endParaRPr lang="en-US" altLang="en-US" sz="800" dirty="0" smtClean="0"/>
+              </a:p>
+              <a:p>
+                <a:pPr marL="0" indent="0">
+                  <a:spcBef>
+                    <a:spcPct val="50000"/>
+                  </a:spcBef>
+                  <a:buNone/>
+                </a:pPr>
                 <a:r>
                   <a:rPr lang="en-US" altLang="en-US" sz="2200" dirty="0" smtClean="0"/>
-                  <a:t>Mean Square Error (MSE) =</a:t>
+                  <a:t>Mean </a:t>
+                </a:r>
+                <a:r>
+                  <a:rPr lang="en-US" altLang="en-US" sz="2200" dirty="0" smtClean="0"/>
+                  <a:t>Square Error (MSE) =</a:t>
                 </a:r>
                 <a:endParaRPr lang="en-US" altLang="en-US" sz="2200" dirty="0"/>
               </a:p>
@@ -11101,7 +11458,11 @@
                 </a:pPr>
                 <a:r>
                   <a:rPr lang="en-US" altLang="en-US" sz="2200" dirty="0" smtClean="0"/>
-                  <a:t>Root Mean Square Error = </a:t>
+                  <a:t>Root </a:t>
+                </a:r>
+                <a:r>
+                  <a:rPr lang="en-US" altLang="en-US" sz="2200" dirty="0" smtClean="0"/>
+                  <a:t>Mean Square Error = </a:t>
                 </a:r>
               </a:p>
               <a:p>
@@ -11279,41 +11640,12 @@
                     </m:f>
                   </m:oMath>
                 </a14:m>
-                <a:endParaRPr lang="en-US" altLang="en-US" sz="2200" b="1" dirty="0" smtClean="0"/>
-              </a:p>
-              <a:p>
-                <a:pPr marL="0" indent="0">
-                  <a:spcBef>
-                    <a:spcPct val="50000"/>
-                  </a:spcBef>
-                  <a:buNone/>
-                </a:pPr>
-                <a:r>
-                  <a:rPr lang="en-US" altLang="en-US" sz="2200" dirty="0" smtClean="0"/>
-                  <a:t>Residual Standard Error = </a:t>
-                </a:r>
-              </a:p>
-              <a:p>
-                <a:pPr>
-                  <a:spcBef>
-                    <a:spcPct val="50000"/>
-                  </a:spcBef>
-                </a:pPr>
-                <a:endParaRPr lang="en-US" altLang="en-US" b="1" dirty="0"/>
-              </a:p>
-              <a:p>
-                <a:pPr marL="0" indent="0">
-                  <a:spcBef>
-                    <a:spcPct val="50000"/>
-                  </a:spcBef>
-                  <a:buNone/>
-                </a:pPr>
                 <a:endParaRPr lang="en-US" altLang="en-US" sz="1600" b="1" dirty="0"/>
               </a:p>
             </p:txBody>
           </p:sp>
         </mc:Choice>
-        <mc:Fallback xmlns="">
+        <mc:Fallback>
           <p:sp>
             <p:nvSpPr>
               <p:cNvPr id="3" name="Content Placeholder 2"/>
@@ -11332,7 +11664,7 @@
               <a:blipFill rotWithShape="0">
                 <a:blip r:embed="rId3"/>
                 <a:stretch>
-                  <a:fillRect l="-1090" t="-1269"/>
+                  <a:fillRect l="-1090"/>
                 </a:stretch>
               </a:blipFill>
             </p:spPr>
@@ -11351,8 +11683,8 @@
           </p:sp>
         </mc:Fallback>
       </mc:AlternateContent>
-      <mc:AlternateContent xmlns:mc="http://schemas.openxmlformats.org/markup-compatibility/2006" xmlns:a14="http://schemas.microsoft.com/office/drawing/2010/main">
-        <mc:Choice Requires="a14">
+      <mc:AlternateContent xmlns:mc="http://schemas.openxmlformats.org/markup-compatibility/2006">
+        <mc:Choice xmlns:a14="http://schemas.microsoft.com/office/drawing/2010/main" Requires="a14">
           <p:sp>
             <p:nvSpPr>
               <p:cNvPr id="9" name="Content Placeholder 2"/>
@@ -11363,7 +11695,7 @@
             </p:nvSpPr>
             <p:spPr>
               <a:xfrm>
-                <a:off x="3943496" y="1670864"/>
+                <a:off x="3933455" y="2012977"/>
                 <a:ext cx="2993898" cy="707603"/>
               </a:xfrm>
               <a:prstGeom prst="rect">
@@ -11688,7 +12020,7 @@
             </p:txBody>
           </p:sp>
         </mc:Choice>
-        <mc:Fallback xmlns="">
+        <mc:Fallback>
           <p:sp>
             <p:nvSpPr>
               <p:cNvPr id="9" name="Content Placeholder 2"/>
@@ -11699,7 +12031,7 @@
             </p:nvSpPr>
             <p:spPr>
               <a:xfrm>
-                <a:off x="3943496" y="1670864"/>
+                <a:off x="3933455" y="2012977"/>
                 <a:ext cx="2993898" cy="707603"/>
               </a:xfrm>
               <a:prstGeom prst="rect">
@@ -11727,8 +12059,8 @@
           </p:sp>
         </mc:Fallback>
       </mc:AlternateContent>
-      <mc:AlternateContent xmlns:mc="http://schemas.openxmlformats.org/markup-compatibility/2006" xmlns:a14="http://schemas.microsoft.com/office/drawing/2010/main">
-        <mc:Choice Requires="a14">
+      <mc:AlternateContent xmlns:mc="http://schemas.openxmlformats.org/markup-compatibility/2006">
+        <mc:Choice xmlns:a14="http://schemas.microsoft.com/office/drawing/2010/main" Requires="a14">
           <p:sp>
             <p:nvSpPr>
               <p:cNvPr id="4" name="Rectangle 3"/>
@@ -11737,7 +12069,7 @@
             </p:nvSpPr>
             <p:spPr>
               <a:xfrm>
-                <a:off x="4544857" y="2522088"/>
+                <a:off x="4419600" y="2847008"/>
                 <a:ext cx="1160619" cy="470835"/>
               </a:xfrm>
               <a:prstGeom prst="rect">
@@ -11784,7 +12116,7 @@
             </p:txBody>
           </p:sp>
         </mc:Choice>
-        <mc:Fallback xmlns="">
+        <mc:Fallback>
           <p:sp>
             <p:nvSpPr>
               <p:cNvPr id="4" name="Rectangle 3"/>
@@ -11795,7 +12127,7 @@
             </p:nvSpPr>
             <p:spPr>
               <a:xfrm>
-                <a:off x="4544857" y="2522088"/>
+                <a:off x="4419600" y="2847008"/>
                 <a:ext cx="1160619" cy="470835"/>
               </a:xfrm>
               <a:prstGeom prst="rect">
@@ -11823,8 +12155,8 @@
           </p:sp>
         </mc:Fallback>
       </mc:AlternateContent>
-      <mc:AlternateContent xmlns:mc="http://schemas.openxmlformats.org/markup-compatibility/2006" xmlns:a14="http://schemas.microsoft.com/office/drawing/2010/main">
-        <mc:Choice Requires="a14">
+      <mc:AlternateContent xmlns:mc="http://schemas.openxmlformats.org/markup-compatibility/2006">
+        <mc:Choice xmlns:a14="http://schemas.microsoft.com/office/drawing/2010/main" Requires="a14">
           <p:sp>
             <p:nvSpPr>
               <p:cNvPr id="18" name="Rectangle 17"/>
@@ -11833,7 +12165,7 @@
             </p:nvSpPr>
             <p:spPr>
               <a:xfrm>
-                <a:off x="1371600" y="3113136"/>
+                <a:off x="1371600" y="3424507"/>
                 <a:ext cx="1160619" cy="728341"/>
               </a:xfrm>
               <a:prstGeom prst="rect">
@@ -11886,7 +12218,7 @@
             </p:txBody>
           </p:sp>
         </mc:Choice>
-        <mc:Fallback xmlns="">
+        <mc:Fallback>
           <p:sp>
             <p:nvSpPr>
               <p:cNvPr id="18" name="Rectangle 17"/>
@@ -11897,7 +12229,7 @@
             </p:nvSpPr>
             <p:spPr>
               <a:xfrm>
-                <a:off x="1371600" y="3113136"/>
+                <a:off x="1371600" y="3424507"/>
                 <a:ext cx="1160619" cy="728341"/>
               </a:xfrm>
               <a:prstGeom prst="rect">
@@ -11925,8 +12257,269 @@
           </p:sp>
         </mc:Fallback>
       </mc:AlternateContent>
-      <mc:AlternateContent xmlns:mc="http://schemas.openxmlformats.org/markup-compatibility/2006" xmlns:a14="http://schemas.microsoft.com/office/drawing/2010/main">
-        <mc:Choice Requires="a14">
+      <p:sp>
+        <p:nvSpPr>
+          <p:cNvPr id="6" name="Rectangle 5"/>
+          <p:cNvSpPr/>
+          <p:nvPr/>
+        </p:nvSpPr>
+        <p:spPr>
+          <a:xfrm>
+            <a:off x="946404" y="5317667"/>
+            <a:ext cx="7733538" cy="861774"/>
+          </a:xfrm>
+          <a:prstGeom prst="rect">
+            <a:avLst/>
+          </a:prstGeom>
+          <a:ln w="28575">
+            <a:noFill/>
+          </a:ln>
+        </p:spPr>
+        <p:txBody>
+          <a:bodyPr wrap="square">
+            <a:spAutoFit/>
+          </a:bodyPr>
+          <a:lstStyle/>
+          <a:p>
+            <a:pPr>
+              <a:spcBef>
+                <a:spcPct val="50000"/>
+              </a:spcBef>
+            </a:pPr>
+            <a:r>
+              <a:rPr lang="en-US" altLang="en-US" sz="2000" dirty="0"/>
+              <a:t>w</a:t>
+            </a:r>
+            <a:r>
+              <a:rPr lang="en-US" altLang="en-US" sz="2000" dirty="0" smtClean="0"/>
+              <a:t>here</a:t>
+            </a:r>
+          </a:p>
+          <a:p>
+            <a:pPr>
+              <a:spcBef>
+                <a:spcPct val="50000"/>
+              </a:spcBef>
+            </a:pPr>
+            <a:r>
+              <a:rPr lang="en-US" altLang="en-US" sz="2000" dirty="0"/>
+              <a:t> </a:t>
+            </a:r>
+            <a:r>
+              <a:rPr lang="en-US" altLang="en-US" sz="2000" dirty="0" smtClean="0"/>
+              <a:t>     n = observations        p = variables</a:t>
+            </a:r>
+            <a:endParaRPr lang="en-US" altLang="en-US" sz="2000" dirty="0"/>
+          </a:p>
+        </p:txBody>
+      </p:sp>
+    </p:spTree>
+    <p:extLst>
+      <p:ext uri="{BB962C8B-B14F-4D97-AF65-F5344CB8AC3E}">
+        <p14:creationId xmlns:p14="http://schemas.microsoft.com/office/powerpoint/2010/main" val="3036598996"/>
+      </p:ext>
+    </p:extLst>
+  </p:cSld>
+  <p:clrMapOvr>
+    <a:masterClrMapping/>
+  </p:clrMapOvr>
+  <p:timing>
+    <p:tnLst>
+      <p:par>
+        <p:cTn id="1" dur="indefinite" restart="never" nodeType="tmRoot"/>
+      </p:par>
+    </p:tnLst>
+  </p:timing>
+</p:sld>
+</file>
+
+<file path=ppt/slides/slide26.xml><?xml version="1.0" encoding="utf-8"?>
+<p:sld xmlns:a="http://schemas.openxmlformats.org/drawingml/2006/main" xmlns:r="http://schemas.openxmlformats.org/officeDocument/2006/relationships" xmlns:p="http://schemas.openxmlformats.org/presentationml/2006/main">
+  <p:cSld>
+    <p:spTree>
+      <p:nvGrpSpPr>
+        <p:cNvPr id="1" name=""/>
+        <p:cNvGrpSpPr/>
+        <p:nvPr/>
+      </p:nvGrpSpPr>
+      <p:grpSpPr>
+        <a:xfrm>
+          <a:off x="0" y="0"/>
+          <a:ext cx="0" cy="0"/>
+          <a:chOff x="0" y="0"/>
+          <a:chExt cx="0" cy="0"/>
+        </a:xfrm>
+      </p:grpSpPr>
+      <p:sp>
+        <p:nvSpPr>
+          <p:cNvPr id="2" name="Title 1"/>
+          <p:cNvSpPr>
+            <a:spLocks noGrp="1"/>
+          </p:cNvSpPr>
+          <p:nvPr>
+            <p:ph type="title"/>
+          </p:nvPr>
+        </p:nvSpPr>
+        <p:spPr/>
+        <p:txBody>
+          <a:bodyPr/>
+          <a:lstStyle/>
+          <a:p>
+            <a:r>
+              <a:rPr lang="en-US" dirty="0" smtClean="0"/>
+              <a:t>Additional Resources</a:t>
+            </a:r>
+            <a:endParaRPr lang="en-US" dirty="0"/>
+          </a:p>
+        </p:txBody>
+      </p:sp>
+      <mc:AlternateContent xmlns:mc="http://schemas.openxmlformats.org/markup-compatibility/2006">
+        <mc:Choice xmlns:a14="http://schemas.microsoft.com/office/drawing/2010/main" Requires="a14">
+          <p:sp>
+            <p:nvSpPr>
+              <p:cNvPr id="3" name="Content Placeholder 2"/>
+              <p:cNvSpPr>
+                <a:spLocks noGrp="1"/>
+              </p:cNvSpPr>
+              <p:nvPr>
+                <p:ph idx="1"/>
+              </p:nvPr>
+            </p:nvSpPr>
+            <p:spPr>
+              <a:xfrm>
+                <a:off x="946404" y="1828801"/>
+                <a:ext cx="7269480" cy="4800599"/>
+              </a:xfrm>
+            </p:spPr>
+            <p:txBody>
+              <a:bodyPr>
+                <a:normAutofit/>
+              </a:bodyPr>
+              <a:lstStyle/>
+              <a:p>
+                <a:pPr marL="0" indent="0">
+                  <a:spcBef>
+                    <a:spcPct val="50000"/>
+                  </a:spcBef>
+                  <a:buNone/>
+                </a:pPr>
+                <a:r>
+                  <a:rPr lang="en-US" altLang="en-US" sz="2200" dirty="0" smtClean="0"/>
+                  <a:t>t = </a:t>
+                </a:r>
+                <a14:m>
+                  <m:oMath xmlns:m="http://schemas.openxmlformats.org/officeDocument/2006/math">
+                    <m:f>
+                      <m:fPr>
+                        <m:ctrlPr>
+                          <a:rPr lang="el-GR" sz="3200" b="1" i="1" dirty="0" smtClean="0">
+                            <a:latin typeface="Cambria Math" panose="02040503050406030204" pitchFamily="18" charset="0"/>
+                          </a:rPr>
+                        </m:ctrlPr>
+                      </m:fPr>
+                      <m:num>
+                        <m:r>
+                          <a:rPr lang="el-GR" sz="3200" b="1" i="1" dirty="0">
+                            <a:latin typeface="Cambria Math" panose="02040503050406030204" pitchFamily="18" charset="0"/>
+                          </a:rPr>
+                          <m:t>𝜷</m:t>
+                        </m:r>
+                      </m:num>
+                      <m:den>
+                        <m:r>
+                          <a:rPr lang="en-US" sz="3200" b="1" i="1" dirty="0" smtClean="0">
+                            <a:latin typeface="Cambria Math" panose="02040503050406030204" pitchFamily="18" charset="0"/>
+                          </a:rPr>
+                          <m:t>𝑺𝑬</m:t>
+                        </m:r>
+                        <m:r>
+                          <a:rPr lang="el-GR" sz="3200" b="1" i="1" baseline="-25000" dirty="0">
+                            <a:latin typeface="Cambria Math" panose="02040503050406030204" pitchFamily="18" charset="0"/>
+                          </a:rPr>
+                          <m:t>𝜷</m:t>
+                        </m:r>
+                      </m:den>
+                    </m:f>
+                  </m:oMath>
+                </a14:m>
+                <a:r>
+                  <a:rPr lang="en-US" altLang="en-US" sz="2200" dirty="0" smtClean="0"/>
+                  <a:t> </a:t>
+                </a:r>
+              </a:p>
+              <a:p>
+                <a:pPr marL="0" indent="0">
+                  <a:spcBef>
+                    <a:spcPct val="50000"/>
+                  </a:spcBef>
+                  <a:buNone/>
+                </a:pPr>
+                <a:endParaRPr lang="en-US" altLang="en-US" sz="900" b="1" dirty="0" smtClean="0"/>
+              </a:p>
+              <a:p>
+                <a:pPr marL="0" indent="0">
+                  <a:spcBef>
+                    <a:spcPct val="50000"/>
+                  </a:spcBef>
+                  <a:buNone/>
+                </a:pPr>
+                <a:r>
+                  <a:rPr lang="en-US" altLang="en-US" sz="2200" dirty="0"/>
+                  <a:t>Residual Standard Error = </a:t>
+                </a:r>
+              </a:p>
+              <a:p>
+                <a:pPr marL="0" indent="0">
+                  <a:spcBef>
+                    <a:spcPct val="50000"/>
+                  </a:spcBef>
+                  <a:buNone/>
+                </a:pPr>
+                <a:endParaRPr lang="en-US" altLang="en-US" sz="1600" b="1" dirty="0"/>
+              </a:p>
+            </p:txBody>
+          </p:sp>
+        </mc:Choice>
+        <mc:Fallback>
+          <p:sp>
+            <p:nvSpPr>
+              <p:cNvPr id="3" name="Content Placeholder 2"/>
+              <p:cNvSpPr>
+                <a:spLocks noGrp="1" noRot="1" noChangeAspect="1" noMove="1" noResize="1" noEditPoints="1" noAdjustHandles="1" noChangeArrowheads="1" noChangeShapeType="1" noTextEdit="1"/>
+              </p:cNvSpPr>
+              <p:nvPr>
+                <p:ph idx="1"/>
+              </p:nvPr>
+            </p:nvSpPr>
+            <p:spPr>
+              <a:xfrm>
+                <a:off x="946404" y="1828801"/>
+                <a:ext cx="7269480" cy="4800599"/>
+              </a:xfrm>
+              <a:blipFill rotWithShape="0">
+                <a:blip r:embed="rId3"/>
+                <a:stretch>
+                  <a:fillRect l="-1090"/>
+                </a:stretch>
+              </a:blipFill>
+            </p:spPr>
+            <p:txBody>
+              <a:bodyPr/>
+              <a:lstStyle/>
+              <a:p>
+                <a:r>
+                  <a:rPr lang="en-US">
+                    <a:noFill/>
+                  </a:rPr>
+                  <a:t> </a:t>
+                </a:r>
+              </a:p>
+            </p:txBody>
+          </p:sp>
+        </mc:Fallback>
+      </mc:AlternateContent>
+      <mc:AlternateContent xmlns:mc="http://schemas.openxmlformats.org/markup-compatibility/2006">
+        <mc:Choice xmlns:a14="http://schemas.microsoft.com/office/drawing/2010/main" Requires="a14">
           <p:sp>
             <p:nvSpPr>
               <p:cNvPr id="5" name="TextBox 4"/>
@@ -11935,7 +12528,7 @@
             </p:nvSpPr>
             <p:spPr>
               <a:xfrm>
-                <a:off x="4419600" y="4185049"/>
+                <a:off x="4343400" y="2538167"/>
                 <a:ext cx="1168589" cy="1092671"/>
               </a:xfrm>
               <a:prstGeom prst="rect">
@@ -12014,7 +12607,7 @@
             </p:txBody>
           </p:sp>
         </mc:Choice>
-        <mc:Fallback xmlns="">
+        <mc:Fallback>
           <p:sp>
             <p:nvSpPr>
               <p:cNvPr id="5" name="TextBox 4"/>
@@ -12025,14 +12618,14 @@
             </p:nvSpPr>
             <p:spPr>
               <a:xfrm>
-                <a:off x="4419600" y="4185049"/>
+                <a:off x="4343400" y="2538167"/>
                 <a:ext cx="1168589" cy="1092671"/>
               </a:xfrm>
               <a:prstGeom prst="rect">
                 <a:avLst/>
               </a:prstGeom>
               <a:blipFill rotWithShape="0">
-                <a:blip r:embed="rId7"/>
+                <a:blip r:embed="rId4"/>
                 <a:stretch>
                   <a:fillRect/>
                 </a:stretch>
@@ -12061,7 +12654,7 @@
         </p:nvSpPr>
         <p:spPr>
           <a:xfrm>
-            <a:off x="946404" y="5415199"/>
+            <a:off x="946404" y="4340204"/>
             <a:ext cx="7733538" cy="861774"/>
           </a:xfrm>
           <a:prstGeom prst="rect">
@@ -12103,7 +12696,11 @@
             </a:r>
             <a:r>
               <a:rPr lang="en-US" altLang="en-US" sz="2000" dirty="0" smtClean="0"/>
-              <a:t>     n = observations        p = variables</a:t>
+              <a:t>     n = </a:t>
+            </a:r>
+            <a:r>
+              <a:rPr lang="en-US" altLang="en-US" sz="2000" dirty="0" smtClean="0"/>
+              <a:t>observations</a:t>
             </a:r>
             <a:endParaRPr lang="en-US" altLang="en-US" sz="2000" dirty="0"/>
           </a:p>
@@ -12112,7 +12709,7 @@
     </p:spTree>
     <p:extLst>
       <p:ext uri="{BB962C8B-B14F-4D97-AF65-F5344CB8AC3E}">
-        <p14:creationId xmlns:p14="http://schemas.microsoft.com/office/powerpoint/2010/main" val="3036598996"/>
+        <p14:creationId xmlns:p14="http://schemas.microsoft.com/office/powerpoint/2010/main" val="1725947081"/>
       </p:ext>
     </p:extLst>
   </p:cSld>
@@ -12129,7 +12726,7 @@
 </p:sld>
 </file>
 
-<file path=ppt/slides/slide25.xml><?xml version="1.0" encoding="utf-8"?>
+<file path=ppt/slides/slide27.xml><?xml version="1.0" encoding="utf-8"?>
 <p:sld xmlns:a="http://schemas.openxmlformats.org/drawingml/2006/main" xmlns:r="http://schemas.openxmlformats.org/officeDocument/2006/relationships" xmlns:p="http://schemas.openxmlformats.org/presentationml/2006/main">
   <p:cSld>
     <p:spTree>
@@ -15767,157 +16364,91 @@
           </a:bodyPr>
           <a:lstStyle/>
           <a:p>
-            <a:pPr marL="0" indent="0">
+            <a:pPr marL="182563" lvl="1" indent="-182563"/>
+            <a:r>
+              <a:rPr lang="en-US" sz="2200" dirty="0" smtClean="0"/>
+              <a:t>Simple linear regression (SLR): Y is </a:t>
+            </a:r>
+            <a:r>
+              <a:rPr lang="en-US" sz="2200" dirty="0" smtClean="0"/>
+              <a:t>predicted from </a:t>
+            </a:r>
+            <a:r>
+              <a:rPr lang="en-US" sz="2200" b="1" u="sng" dirty="0" smtClean="0"/>
+              <a:t>one</a:t>
+            </a:r>
+            <a:r>
+              <a:rPr lang="en-US" sz="2200" dirty="0" smtClean="0"/>
+              <a:t> independent variable (X</a:t>
+            </a:r>
+            <a:r>
+              <a:rPr lang="en-US" sz="2200" dirty="0" smtClean="0"/>
+              <a:t>). </a:t>
+            </a:r>
+          </a:p>
+          <a:p>
+            <a:pPr marL="182563" lvl="1" indent="-182563"/>
+            <a:r>
+              <a:rPr lang="en-US" sz="2200" dirty="0" smtClean="0"/>
+              <a:t>Multiple linear regression (MLR): Y is</a:t>
+            </a:r>
+            <a:r>
+              <a:rPr lang="en-US" sz="2200" dirty="0" smtClean="0"/>
+              <a:t> </a:t>
+            </a:r>
+            <a:r>
+              <a:rPr lang="en-US" sz="2200" dirty="0"/>
+              <a:t>predicted from </a:t>
+            </a:r>
+            <a:r>
+              <a:rPr lang="en-US" sz="2200" b="1" u="sng" dirty="0" smtClean="0"/>
+              <a:t>two or more </a:t>
+            </a:r>
+            <a:r>
+              <a:rPr lang="en-US" sz="2200" dirty="0" smtClean="0"/>
+              <a:t>independent variables (X</a:t>
+            </a:r>
+            <a:r>
+              <a:rPr lang="en-US" sz="2200" baseline="-25000" dirty="0" smtClean="0"/>
+              <a:t>1</a:t>
+            </a:r>
+            <a:r>
+              <a:rPr lang="en-US" sz="2200" dirty="0" smtClean="0"/>
+              <a:t>, X</a:t>
+            </a:r>
+            <a:r>
+              <a:rPr lang="en-US" sz="2200" baseline="-25000" dirty="0" smtClean="0"/>
+              <a:t>2</a:t>
+            </a:r>
+            <a:r>
+              <a:rPr lang="en-US" sz="2200" dirty="0" smtClean="0"/>
+              <a:t>, </a:t>
+            </a:r>
+            <a:r>
+              <a:rPr lang="en-US" sz="2200" dirty="0" err="1" smtClean="0"/>
+              <a:t>X</a:t>
+            </a:r>
+            <a:r>
+              <a:rPr lang="en-US" sz="2200" baseline="-25000" dirty="0" err="1" smtClean="0"/>
+              <a:t>k</a:t>
+            </a:r>
+            <a:r>
+              <a:rPr lang="en-US" sz="2200" dirty="0" smtClean="0"/>
+              <a:t>). </a:t>
+            </a:r>
+          </a:p>
+          <a:p>
+            <a:pPr marL="182563" lvl="1" indent="-182563"/>
+            <a:endParaRPr lang="en-US" sz="2200" dirty="0" smtClean="0"/>
+          </a:p>
+          <a:p>
+            <a:pPr marL="182563" lvl="1" indent="-182563"/>
+            <a:endParaRPr lang="en-US" sz="2000" dirty="0"/>
+          </a:p>
+          <a:p>
+            <a:pPr marL="274320" lvl="1" indent="0">
               <a:buNone/>
             </a:pPr>
-            <a:r>
-              <a:rPr lang="en-US" sz="2200" u="sng" dirty="0" smtClean="0"/>
-              <a:t>Simple</a:t>
-            </a:r>
-          </a:p>
-          <a:p>
-            <a:pPr lvl="1"/>
-            <a:r>
-              <a:rPr lang="en-US" sz="2000" dirty="0" smtClean="0"/>
-              <a:t>One continuous dependent variable (Y) predicted from </a:t>
-            </a:r>
-            <a:r>
-              <a:rPr lang="en-US" sz="2000" b="1" u="sng" dirty="0" smtClean="0"/>
-              <a:t>one</a:t>
-            </a:r>
-            <a:r>
-              <a:rPr lang="en-US" sz="2000" dirty="0" smtClean="0"/>
-              <a:t> independent variable (X)</a:t>
-            </a:r>
-          </a:p>
-          <a:p>
-            <a:pPr lvl="1"/>
-            <a:r>
-              <a:rPr lang="en-US" sz="2000" b="1" u="sng" dirty="0" smtClean="0"/>
-              <a:t>r</a:t>
-            </a:r>
-            <a:r>
-              <a:rPr lang="en-US" sz="2000" b="1" u="sng" baseline="30000" dirty="0" smtClean="0"/>
-              <a:t>2</a:t>
-            </a:r>
-            <a:r>
-              <a:rPr lang="en-US" sz="2000" dirty="0" smtClean="0"/>
-              <a:t> = proportion of variation in dependent variable Y explained by X</a:t>
-            </a:r>
-            <a:endParaRPr lang="en-US" dirty="0"/>
-          </a:p>
-          <a:p>
-            <a:pPr marL="0" indent="0">
-              <a:buNone/>
-            </a:pPr>
-            <a:r>
-              <a:rPr lang="en-US" sz="2200" u="sng" dirty="0" smtClean="0"/>
-              <a:t>Multiple</a:t>
-            </a:r>
-            <a:endParaRPr lang="en-US" sz="2200" u="sng" dirty="0"/>
-          </a:p>
-          <a:p>
-            <a:pPr lvl="1"/>
-            <a:r>
-              <a:rPr lang="en-US" sz="2000" dirty="0"/>
-              <a:t>One </a:t>
-            </a:r>
-            <a:r>
-              <a:rPr lang="en-US" sz="2000" dirty="0" smtClean="0"/>
-              <a:t>continuous dependent </a:t>
-            </a:r>
-            <a:r>
-              <a:rPr lang="en-US" sz="2000" dirty="0"/>
-              <a:t>variable (Y) predicted from </a:t>
-            </a:r>
-            <a:r>
-              <a:rPr lang="en-US" sz="2000" b="1" u="sng" dirty="0" smtClean="0"/>
-              <a:t>two or more </a:t>
-            </a:r>
-            <a:r>
-              <a:rPr lang="en-US" sz="2000" dirty="0" smtClean="0"/>
-              <a:t>independent variables (X</a:t>
-            </a:r>
-            <a:r>
-              <a:rPr lang="en-US" sz="2000" baseline="-25000" dirty="0" smtClean="0"/>
-              <a:t>1</a:t>
-            </a:r>
-            <a:r>
-              <a:rPr lang="en-US" sz="2000" dirty="0" smtClean="0"/>
-              <a:t>, X</a:t>
-            </a:r>
-            <a:r>
-              <a:rPr lang="en-US" sz="2000" baseline="-25000" dirty="0" smtClean="0"/>
-              <a:t>2</a:t>
-            </a:r>
-            <a:r>
-              <a:rPr lang="en-US" sz="2000" dirty="0" smtClean="0"/>
-              <a:t>, X</a:t>
-            </a:r>
-            <a:r>
-              <a:rPr lang="en-US" sz="2000" baseline="-25000" dirty="0" smtClean="0"/>
-              <a:t>k</a:t>
-            </a:r>
-            <a:r>
-              <a:rPr lang="en-US" sz="2000" dirty="0" smtClean="0"/>
-              <a:t>)</a:t>
-            </a:r>
-            <a:endParaRPr lang="en-US" sz="2000" dirty="0"/>
-          </a:p>
-          <a:p>
-            <a:pPr lvl="1"/>
-            <a:r>
-              <a:rPr lang="en-US" sz="2000" b="1" u="sng" dirty="0"/>
-              <a:t>R</a:t>
-            </a:r>
-            <a:r>
-              <a:rPr lang="en-US" sz="2000" b="1" u="sng" baseline="30000" dirty="0" smtClean="0"/>
-              <a:t>2</a:t>
-            </a:r>
-            <a:r>
-              <a:rPr lang="en-US" sz="2000" dirty="0" smtClean="0"/>
-              <a:t> </a:t>
-            </a:r>
-            <a:r>
-              <a:rPr lang="en-US" sz="2000" dirty="0"/>
-              <a:t>= proportion of variation in dependent variable Y explained by </a:t>
-            </a:r>
-            <a:r>
-              <a:rPr lang="en-US" sz="2000" dirty="0" smtClean="0"/>
-              <a:t>a set of independent variables (</a:t>
-            </a:r>
-            <a:r>
-              <a:rPr lang="en-US" sz="2000" dirty="0"/>
-              <a:t>X</a:t>
-            </a:r>
-            <a:r>
-              <a:rPr lang="en-US" sz="2000" baseline="-25000" dirty="0"/>
-              <a:t>1</a:t>
-            </a:r>
-            <a:r>
-              <a:rPr lang="en-US" sz="2000" dirty="0"/>
-              <a:t>, X</a:t>
-            </a:r>
-            <a:r>
-              <a:rPr lang="en-US" sz="2000" baseline="-25000" dirty="0"/>
-              <a:t>2</a:t>
-            </a:r>
-            <a:r>
-              <a:rPr lang="en-US" sz="2000" dirty="0"/>
-              <a:t>, X</a:t>
-            </a:r>
-            <a:r>
-              <a:rPr lang="en-US" sz="2000" baseline="-25000" dirty="0"/>
-              <a:t>k</a:t>
-            </a:r>
-            <a:r>
-              <a:rPr lang="en-US" sz="2000" dirty="0" smtClean="0"/>
-              <a:t>)</a:t>
-            </a:r>
-            <a:endParaRPr lang="en-US" sz="2000" dirty="0"/>
-          </a:p>
-          <a:p>
-            <a:pPr lvl="1"/>
             <a:endParaRPr lang="en-US" dirty="0" smtClean="0"/>
           </a:p>
           <a:p>
@@ -15974,7 +16505,7 @@
                                         <p:tgtEl>
                                           <p:spTgt spid="3">
                                             <p:txEl>
-                                              <p:pRg st="1" end="1"/>
+                                              <p:pRg st="0" end="0"/>
                                             </p:txEl>
                                           </p:spTgt>
                                         </p:tgtEl>
@@ -15992,7 +16523,7 @@
                                         <p:tgtEl>
                                           <p:spTgt spid="3">
                                             <p:txEl>
-                                              <p:pRg st="1" end="1"/>
+                                              <p:pRg st="0" end="0"/>
                                             </p:txEl>
                                           </p:spTgt>
                                         </p:tgtEl>
@@ -16035,7 +16566,7 @@
                                         <p:tgtEl>
                                           <p:spTgt spid="3">
                                             <p:txEl>
-                                              <p:pRg st="4" end="4"/>
+                                              <p:pRg st="1" end="1"/>
                                             </p:txEl>
                                           </p:spTgt>
                                         </p:tgtEl>
@@ -16053,129 +16584,7 @@
                                         <p:tgtEl>
                                           <p:spTgt spid="3">
                                             <p:txEl>
-                                              <p:pRg st="4" end="4"/>
-                                            </p:txEl>
-                                          </p:spTgt>
-                                        </p:tgtEl>
-                                      </p:cBhvr>
-                                    </p:animEffect>
-                                  </p:childTnLst>
-                                </p:cTn>
-                              </p:par>
-                            </p:childTnLst>
-                          </p:cTn>
-                        </p:par>
-                      </p:childTnLst>
-                    </p:cTn>
-                  </p:par>
-                  <p:par>
-                    <p:cTn id="13" fill="hold">
-                      <p:stCondLst>
-                        <p:cond delay="indefinite"/>
-                      </p:stCondLst>
-                      <p:childTnLst>
-                        <p:par>
-                          <p:cTn id="14" fill="hold">
-                            <p:stCondLst>
-                              <p:cond delay="0"/>
-                            </p:stCondLst>
-                            <p:childTnLst>
-                              <p:par>
-                                <p:cTn id="15" presetID="10" presetClass="entr" presetSubtype="0" fill="hold" nodeType="clickEffect">
-                                  <p:stCondLst>
-                                    <p:cond delay="0"/>
-                                  </p:stCondLst>
-                                  <p:childTnLst>
-                                    <p:set>
-                                      <p:cBhvr>
-                                        <p:cTn id="16" dur="1" fill="hold">
-                                          <p:stCondLst>
-                                            <p:cond delay="0"/>
-                                          </p:stCondLst>
-                                        </p:cTn>
-                                        <p:tgtEl>
-                                          <p:spTgt spid="3">
-                                            <p:txEl>
-                                              <p:pRg st="5" end="5"/>
-                                            </p:txEl>
-                                          </p:spTgt>
-                                        </p:tgtEl>
-                                        <p:attrNameLst>
-                                          <p:attrName>style.visibility</p:attrName>
-                                        </p:attrNameLst>
-                                      </p:cBhvr>
-                                      <p:to>
-                                        <p:strVal val="visible"/>
-                                      </p:to>
-                                    </p:set>
-                                    <p:animEffect transition="in" filter="fade">
-                                      <p:cBhvr>
-                                        <p:cTn id="17" dur="500"/>
-                                        <p:tgtEl>
-                                          <p:spTgt spid="3">
-                                            <p:txEl>
-                                              <p:pRg st="5" end="5"/>
-                                            </p:txEl>
-                                          </p:spTgt>
-                                        </p:tgtEl>
-                                      </p:cBhvr>
-                                    </p:animEffect>
-                                  </p:childTnLst>
-                                </p:cTn>
-                              </p:par>
-                            </p:childTnLst>
-                          </p:cTn>
-                        </p:par>
-                      </p:childTnLst>
-                    </p:cTn>
-                  </p:par>
-                  <p:par>
-                    <p:cTn id="18" fill="hold">
-                      <p:stCondLst>
-                        <p:cond delay="indefinite"/>
-                      </p:stCondLst>
-                      <p:childTnLst>
-                        <p:par>
-                          <p:cTn id="19" fill="hold">
-                            <p:stCondLst>
-                              <p:cond delay="0"/>
-                            </p:stCondLst>
-                            <p:childTnLst>
-                              <p:par>
-                                <p:cTn id="20" presetID="10" presetClass="entr" presetSubtype="0" fill="hold" nodeType="clickEffect">
-                                  <p:stCondLst>
-                                    <p:cond delay="0"/>
-                                  </p:stCondLst>
-                                  <p:childTnLst>
-                                    <p:set>
-                                      <p:cBhvr>
-                                        <p:cTn id="21" dur="1" fill="hold">
-                                          <p:stCondLst>
-                                            <p:cond delay="0"/>
-                                          </p:stCondLst>
-                                        </p:cTn>
-                                        <p:tgtEl>
-                                          <p:spTgt spid="3">
-                                            <p:txEl>
-                                              <p:pRg st="2" end="2"/>
-                                            </p:txEl>
-                                          </p:spTgt>
-                                        </p:tgtEl>
-                                        <p:attrNameLst>
-                                          <p:attrName>style.visibility</p:attrName>
-                                        </p:attrNameLst>
-                                      </p:cBhvr>
-                                      <p:to>
-                                        <p:strVal val="visible"/>
-                                      </p:to>
-                                    </p:set>
-                                    <p:animEffect transition="in" filter="fade">
-                                      <p:cBhvr>
-                                        <p:cTn id="22" dur="500"/>
-                                        <p:tgtEl>
-                                          <p:spTgt spid="3">
-                                            <p:txEl>
-                                              <p:pRg st="2" end="2"/>
+                                              <p:pRg st="1" end="1"/>
                                             </p:txEl>
                                           </p:spTgt>
                                         </p:tgtEl>
@@ -16984,6 +17393,45 @@
           <a:chExt cx="0" cy="0"/>
         </a:xfrm>
       </p:grpSpPr>
+      <p:pic>
+        <p:nvPicPr>
+          <p:cNvPr id="8" name="Picture 2" descr="https://mathcoachblog.files.wordpress.com/2014/10/paranormal.jpg"/>
+          <p:cNvPicPr>
+            <a:picLocks noChangeAspect="1" noChangeArrowheads="1"/>
+          </p:cNvPicPr>
+          <p:nvPr/>
+        </p:nvPicPr>
+        <p:blipFill rotWithShape="1">
+          <a:blip r:embed="rId2">
+            <a:extLst>
+              <a:ext uri="{28A0092B-C50C-407E-A947-70E740481C1C}">
+                <a14:useLocalDpi xmlns:a14="http://schemas.microsoft.com/office/drawing/2010/main" val="0"/>
+              </a:ext>
+            </a:extLst>
+          </a:blip>
+          <a:srcRect l="14500" t="46712" r="13625" b="6413"/>
+          <a:stretch/>
+        </p:blipFill>
+        <p:spPr bwMode="auto">
+          <a:xfrm>
+            <a:off x="4464856" y="4046890"/>
+            <a:ext cx="3505200" cy="2286000"/>
+          </a:xfrm>
+          <a:prstGeom prst="rect">
+            <a:avLst/>
+          </a:prstGeom>
+          <a:noFill/>
+          <a:extLst>
+            <a:ext uri="{909E8E84-426E-40DD-AFC4-6F175D3DCCD1}">
+              <a14:hiddenFill xmlns:a14="http://schemas.microsoft.com/office/drawing/2010/main">
+                <a:solidFill>
+                  <a:srgbClr val="FFFFFF"/>
+                </a:solidFill>
+              </a14:hiddenFill>
+            </a:ext>
+          </a:extLst>
+        </p:spPr>
+      </p:pic>
       <p:sp>
         <p:nvSpPr>
           <p:cNvPr id="2" name="Title 1"/>
@@ -17030,36 +17478,9 @@
             </a:pPr>
             <a:r>
               <a:rPr lang="en-US" altLang="en-US" sz="2200" dirty="0" smtClean="0"/>
-              <a:t>Model errors follow a </a:t>
-            </a:r>
-            <a:r>
-              <a:rPr lang="en-US" altLang="en-US" sz="2200" b="1" u="sng" dirty="0" smtClean="0"/>
-              <a:t>normal distribution </a:t>
-            </a:r>
-            <a:r>
-              <a:rPr lang="en-US" altLang="en-US" sz="2200" dirty="0" smtClean="0"/>
-              <a:t>(</a:t>
-            </a:r>
-            <a:r>
-              <a:rPr lang="el-GR" altLang="en-US" sz="2200" dirty="0" smtClean="0"/>
-              <a:t>μ</a:t>
-            </a:r>
-            <a:r>
-              <a:rPr lang="en-US" altLang="en-US" sz="2200" dirty="0" smtClean="0"/>
-              <a:t>=0) with a </a:t>
-            </a:r>
-            <a:r>
-              <a:rPr lang="en-US" altLang="en-US" sz="2200" b="1" u="sng" dirty="0" smtClean="0"/>
-              <a:t>common variance</a:t>
-            </a:r>
-            <a:r>
-              <a:rPr lang="en-US" altLang="en-US" sz="2200" dirty="0" smtClean="0"/>
-              <a:t> (h</a:t>
-            </a:r>
-            <a:r>
-              <a:rPr lang="en-US" sz="2200" dirty="0" smtClean="0"/>
-              <a:t>omoscedasticity). </a:t>
-            </a:r>
+              <a:t>Observations are representative of the population.</a:t>
+            </a:r>
+            <a:endParaRPr lang="en-US" altLang="en-US" sz="2200" dirty="0" smtClean="0"/>
           </a:p>
           <a:p>
             <a:pPr marL="457200" indent="-457200">
@@ -17067,6 +17488,48 @@
               <a:buAutoNum type="arabicPeriod"/>
             </a:pPr>
             <a:r>
+              <a:rPr lang="en-US" altLang="en-US" sz="2200" dirty="0" smtClean="0"/>
+              <a:t>Model </a:t>
+            </a:r>
+            <a:r>
+              <a:rPr lang="en-US" altLang="en-US" sz="2200" dirty="0" smtClean="0"/>
+              <a:t>errors follow a </a:t>
+            </a:r>
+            <a:r>
+              <a:rPr lang="en-US" altLang="en-US" sz="2200" b="1" u="sng" dirty="0" smtClean="0"/>
+              <a:t>normal distribution </a:t>
+            </a:r>
+            <a:r>
+              <a:rPr lang="en-US" altLang="en-US" sz="2200" dirty="0" smtClean="0"/>
+              <a:t>(</a:t>
+            </a:r>
+            <a:r>
+              <a:rPr lang="el-GR" altLang="en-US" sz="2200" dirty="0" smtClean="0"/>
+              <a:t>μ</a:t>
+            </a:r>
+            <a:r>
+              <a:rPr lang="en-US" altLang="en-US" sz="2200" dirty="0" smtClean="0"/>
+              <a:t>=0) with a </a:t>
+            </a:r>
+            <a:r>
+              <a:rPr lang="en-US" altLang="en-US" sz="2200" b="1" u="sng" dirty="0" smtClean="0"/>
+              <a:t>common variance</a:t>
+            </a:r>
+            <a:r>
+              <a:rPr lang="en-US" altLang="en-US" sz="2200" dirty="0" smtClean="0"/>
+              <a:t> (h</a:t>
+            </a:r>
+            <a:r>
+              <a:rPr lang="en-US" sz="2200" dirty="0" smtClean="0"/>
+              <a:t>omoscedasticity). </a:t>
+            </a:r>
+          </a:p>
+          <a:p>
+            <a:pPr marL="457200" indent="-457200">
+              <a:buFont typeface="+mj-lt"/>
+              <a:buAutoNum type="arabicPeriod"/>
+            </a:pPr>
+            <a:r>
               <a:rPr lang="en-US" sz="2200" dirty="0" smtClean="0"/>
               <a:t>Model errors are </a:t>
             </a:r>
@@ -17076,7 +17539,23 @@
             </a:r>
             <a:r>
               <a:rPr lang="en-US" sz="2200" dirty="0" smtClean="0"/>
-              <a:t> of one another.</a:t>
+              <a:t> of </a:t>
+            </a:r>
+            <a:r>
+              <a:rPr lang="en-US" sz="2200" dirty="0" smtClean="0"/>
+              <a:t>            o</a:t>
+            </a:r>
+            <a:r>
+              <a:rPr lang="en-US" sz="2200" dirty="0" smtClean="0"/>
+              <a:t>ne </a:t>
+            </a:r>
+            <a:r>
+              <a:rPr lang="en-US" sz="2200" dirty="0" smtClean="0"/>
+              <a:t>another</a:t>
+            </a:r>
+            <a:r>
+              <a:rPr lang="en-US" sz="2200" dirty="0" smtClean="0"/>
+              <a:t>.</a:t>
             </a:r>
           </a:p>
           <a:p>
@@ -17084,6 +17563,149 @@
               <a:buNone/>
             </a:pPr>
             <a:endParaRPr lang="en-US" sz="2200" dirty="0"/>
+          </a:p>
+        </p:txBody>
+      </p:sp>
+      <p:pic>
+        <p:nvPicPr>
+          <p:cNvPr id="1026" name="Picture 2" descr="https://mathcoachblog.files.wordpress.com/2014/10/paranormal.jpg"/>
+          <p:cNvPicPr>
+            <a:picLocks noChangeAspect="1" noChangeArrowheads="1"/>
+          </p:cNvPicPr>
+          <p:nvPr/>
+        </p:nvPicPr>
+        <p:blipFill rotWithShape="1">
+          <a:blip r:embed="rId2">
+            <a:extLst>
+              <a:ext uri="{28A0092B-C50C-407E-A947-70E740481C1C}">
+                <a14:useLocalDpi xmlns:a14="http://schemas.microsoft.com/office/drawing/2010/main" val="0"/>
+              </a:ext>
+            </a:extLst>
+          </a:blip>
+          <a:srcRect l="14500" t="6087" r="13625" b="57975"/>
+          <a:stretch/>
+        </p:blipFill>
+        <p:spPr bwMode="auto">
+          <a:xfrm>
+            <a:off x="943091" y="4580290"/>
+            <a:ext cx="3505200" cy="1752600"/>
+          </a:xfrm>
+          <a:prstGeom prst="rect">
+            <a:avLst/>
+          </a:prstGeom>
+          <a:noFill/>
+          <a:extLst>
+            <a:ext uri="{909E8E84-426E-40DD-AFC4-6F175D3DCCD1}">
+              <a14:hiddenFill xmlns:a14="http://schemas.microsoft.com/office/drawing/2010/main">
+                <a:solidFill>
+                  <a:srgbClr val="FFFFFF"/>
+                </a:solidFill>
+              </a14:hiddenFill>
+            </a:ext>
+          </a:extLst>
+        </p:spPr>
+      </p:pic>
+      <p:sp>
+        <p:nvSpPr>
+          <p:cNvPr id="6" name="Rectangle 5"/>
+          <p:cNvSpPr/>
+          <p:nvPr/>
+        </p:nvSpPr>
+        <p:spPr>
+          <a:xfrm>
+            <a:off x="-23191" y="6642556"/>
+            <a:ext cx="4572000" cy="215444"/>
+          </a:xfrm>
+          <a:prstGeom prst="rect">
+            <a:avLst/>
+          </a:prstGeom>
+        </p:spPr>
+        <p:txBody>
+          <a:bodyPr>
+            <a:spAutoFit/>
+          </a:bodyPr>
+          <a:lstStyle/>
+          <a:p>
+            <a:r>
+              <a:rPr lang="en-US" sz="800" dirty="0"/>
+              <a:t>https://mathcoachblog.files.wordpress.com/2014/10/paranormal.jpg</a:t>
+            </a:r>
+          </a:p>
+        </p:txBody>
+      </p:sp>
+      <p:sp>
+        <p:nvSpPr>
+          <p:cNvPr id="7" name="TextBox 6"/>
+          <p:cNvSpPr txBox="1"/>
+          <p:nvPr/>
+        </p:nvSpPr>
+        <p:spPr>
+          <a:xfrm>
+            <a:off x="926526" y="4580290"/>
+            <a:ext cx="954107" cy="369332"/>
+          </a:xfrm>
+          <a:prstGeom prst="rect">
+            <a:avLst/>
+          </a:prstGeom>
+          <a:noFill/>
+        </p:spPr>
+        <p:txBody>
+          <a:bodyPr wrap="none" rtlCol="0">
+            <a:spAutoFit/>
+          </a:bodyPr>
+          <a:lstStyle/>
+          <a:p>
+            <a:r>
+              <a:rPr lang="en-US" b="1" dirty="0" smtClean="0">
+                <a:solidFill>
+                  <a:srgbClr val="00B050"/>
+                </a:solidFill>
+              </a:rPr>
+              <a:t>GOOD</a:t>
+            </a:r>
+            <a:endParaRPr lang="en-US" b="1" dirty="0">
+              <a:solidFill>
+                <a:srgbClr val="00B050"/>
+              </a:solidFill>
+            </a:endParaRPr>
+          </a:p>
+        </p:txBody>
+      </p:sp>
+      <p:sp>
+        <p:nvSpPr>
+          <p:cNvPr id="10" name="TextBox 9"/>
+          <p:cNvSpPr txBox="1"/>
+          <p:nvPr/>
+        </p:nvSpPr>
+        <p:spPr>
+          <a:xfrm>
+            <a:off x="4554640" y="4580290"/>
+            <a:ext cx="731290" cy="369332"/>
+          </a:xfrm>
+          <a:prstGeom prst="rect">
+            <a:avLst/>
+          </a:prstGeom>
+          <a:noFill/>
+        </p:spPr>
+        <p:txBody>
+          <a:bodyPr wrap="none" rtlCol="0">
+            <a:spAutoFit/>
+          </a:bodyPr>
+          <a:lstStyle/>
+          <a:p>
+            <a:r>
+              <a:rPr lang="en-US" b="1" dirty="0" smtClean="0">
+                <a:solidFill>
+                  <a:srgbClr val="FF0000"/>
+                </a:solidFill>
+              </a:rPr>
+              <a:t>BAD</a:t>
+            </a:r>
+            <a:endParaRPr lang="en-US" b="1" dirty="0">
+              <a:solidFill>
+                <a:srgbClr val="FF0000"/>
+              </a:solidFill>
+            </a:endParaRPr>
           </a:p>
         </p:txBody>
       </p:sp>
@@ -17166,6 +17788,243 @@
                       </p:childTnLst>
                     </p:cTn>
                   </p:par>
+                  <p:par>
+                    <p:cTn id="8" fill="hold">
+                      <p:stCondLst>
+                        <p:cond delay="indefinite"/>
+                      </p:stCondLst>
+                      <p:childTnLst>
+                        <p:par>
+                          <p:cTn id="9" fill="hold">
+                            <p:stCondLst>
+                              <p:cond delay="0"/>
+                            </p:stCondLst>
+                            <p:childTnLst>
+                              <p:par>
+                                <p:cTn id="10" presetID="10" presetClass="entr" presetSubtype="0" fill="hold" nodeType="clickEffect">
+                                  <p:stCondLst>
+                                    <p:cond delay="0"/>
+                                  </p:stCondLst>
+                                  <p:childTnLst>
+                                    <p:set>
+                                      <p:cBhvr>
+                                        <p:cTn id="11" dur="1" fill="hold">
+                                          <p:stCondLst>
+                                            <p:cond delay="0"/>
+                                          </p:stCondLst>
+                                        </p:cTn>
+                                        <p:tgtEl>
+                                          <p:spTgt spid="3">
+                                            <p:txEl>
+                                              <p:pRg st="2" end="2"/>
+                                            </p:txEl>
+                                          </p:spTgt>
+                                        </p:tgtEl>
+                                        <p:attrNameLst>
+                                          <p:attrName>style.visibility</p:attrName>
+                                        </p:attrNameLst>
+                                      </p:cBhvr>
+                                      <p:to>
+                                        <p:strVal val="visible"/>
+                                      </p:to>
+                                    </p:set>
+                                    <p:animEffect transition="in" filter="fade">
+                                      <p:cBhvr>
+                                        <p:cTn id="12" dur="500"/>
+                                        <p:tgtEl>
+                                          <p:spTgt spid="3">
+                                            <p:txEl>
+                                              <p:pRg st="2" end="2"/>
+                                            </p:txEl>
+                                          </p:spTgt>
+                                        </p:tgtEl>
+                                      </p:cBhvr>
+                                    </p:animEffect>
+                                  </p:childTnLst>
+                                </p:cTn>
+                              </p:par>
+                            </p:childTnLst>
+                          </p:cTn>
+                        </p:par>
+                      </p:childTnLst>
+                    </p:cTn>
+                  </p:par>
+                  <p:par>
+                    <p:cTn id="13" fill="hold">
+                      <p:stCondLst>
+                        <p:cond delay="indefinite"/>
+                      </p:stCondLst>
+                      <p:childTnLst>
+                        <p:par>
+                          <p:cTn id="14" fill="hold">
+                            <p:stCondLst>
+                              <p:cond delay="0"/>
+                            </p:stCondLst>
+                            <p:childTnLst>
+                              <p:par>
+                                <p:cTn id="15" presetID="10" presetClass="entr" presetSubtype="0" fill="hold" nodeType="clickEffect">
+                                  <p:stCondLst>
+                                    <p:cond delay="0"/>
+                                  </p:stCondLst>
+                                  <p:childTnLst>
+                                    <p:set>
+                                      <p:cBhvr>
+                                        <p:cTn id="16" dur="1" fill="hold">
+                                          <p:stCondLst>
+                                            <p:cond delay="0"/>
+                                          </p:stCondLst>
+                                        </p:cTn>
+                                        <p:tgtEl>
+                                          <p:spTgt spid="1026"/>
+                                        </p:tgtEl>
+                                        <p:attrNameLst>
+                                          <p:attrName>style.visibility</p:attrName>
+                                        </p:attrNameLst>
+                                      </p:cBhvr>
+                                      <p:to>
+                                        <p:strVal val="visible"/>
+                                      </p:to>
+                                    </p:set>
+                                    <p:animEffect transition="in" filter="fade">
+                                      <p:cBhvr>
+                                        <p:cTn id="17" dur="500"/>
+                                        <p:tgtEl>
+                                          <p:spTgt spid="1026"/>
+                                        </p:tgtEl>
+                                      </p:cBhvr>
+                                    </p:animEffect>
+                                  </p:childTnLst>
+                                </p:cTn>
+                              </p:par>
+                              <p:par>
+                                <p:cTn id="18" presetID="10" presetClass="entr" presetSubtype="0" fill="hold" grpId="0" nodeType="withEffect">
+                                  <p:stCondLst>
+                                    <p:cond delay="0"/>
+                                  </p:stCondLst>
+                                  <p:childTnLst>
+                                    <p:set>
+                                      <p:cBhvr>
+                                        <p:cTn id="19" dur="1" fill="hold">
+                                          <p:stCondLst>
+                                            <p:cond delay="0"/>
+                                          </p:stCondLst>
+                                        </p:cTn>
+                                        <p:tgtEl>
+                                          <p:spTgt spid="7"/>
+                                        </p:tgtEl>
+                                        <p:attrNameLst>
+                                          <p:attrName>style.visibility</p:attrName>
+                                        </p:attrNameLst>
+                                      </p:cBhvr>
+                                      <p:to>
+                                        <p:strVal val="visible"/>
+                                      </p:to>
+                                    </p:set>
+                                    <p:animEffect transition="in" filter="fade">
+                                      <p:cBhvr>
+                                        <p:cTn id="20" dur="500"/>
+                                        <p:tgtEl>
+                                          <p:spTgt spid="7"/>
+                                        </p:tgtEl>
+                                      </p:cBhvr>
+                                    </p:animEffect>
+                                  </p:childTnLst>
+                                </p:cTn>
+                              </p:par>
+                            </p:childTnLst>
+                          </p:cTn>
+                        </p:par>
+                      </p:childTnLst>
+                    </p:cTn>
+                  </p:par>
+                  <p:par>
+                    <p:cTn id="21" fill="hold">
+                      <p:stCondLst>
+                        <p:cond delay="indefinite"/>
+                      </p:stCondLst>
+                      <p:childTnLst>
+                        <p:par>
+                          <p:cTn id="22" fill="hold">
+                            <p:stCondLst>
+                              <p:cond delay="0"/>
+                            </p:stCondLst>
+                            <p:childTnLst>
+                              <p:par>
+                                <p:cTn id="23" presetID="10" presetClass="entr" presetSubtype="0" fill="hold" nodeType="clickEffect">
+                                  <p:stCondLst>
+                                    <p:cond delay="0"/>
+                                  </p:stCondLst>
+                                  <p:childTnLst>
+                                    <p:set>
+                                      <p:cBhvr>
+                                        <p:cTn id="24" dur="1" fill="hold">
+                                          <p:stCondLst>
+                                            <p:cond delay="0"/>
+                                          </p:stCondLst>
+                                        </p:cTn>
+                                        <p:tgtEl>
+                                          <p:spTgt spid="8"/>
+                                        </p:tgtEl>
+                                        <p:attrNameLst>
+                                          <p:attrName>style.visibility</p:attrName>
+                                        </p:attrNameLst>
+                                      </p:cBhvr>
+                                      <p:to>
+                                        <p:strVal val="visible"/>
+                                      </p:to>
+                                    </p:set>
+                                    <p:animEffect transition="in" filter="fade">
+                                      <p:cBhvr>
+                                        <p:cTn id="25" dur="500"/>
+                                        <p:tgtEl>
+                                          <p:spTgt spid="8"/>
+                                        </p:tgtEl>
+                                      </p:cBhvr>
+                                    </p:animEffect>
+                                  </p:childTnLst>
+                                </p:cTn>
+                              </p:par>
+                              <p:par>
+                                <p:cTn id="26" presetID="10" presetClass="entr" presetSubtype="0" fill="hold" grpId="0" nodeType="withEffect">
+                                  <p:stCondLst>
+                                    <p:cond delay="0"/>
+                                  </p:stCondLst>
+                                  <p:childTnLst>
+                                    <p:set>
+                                      <p:cBhvr>
+                                        <p:cTn id="27" dur="1" fill="hold">
+                                          <p:stCondLst>
+                                            <p:cond delay="0"/>
+                                          </p:stCondLst>
+                                        </p:cTn>
+                                        <p:tgtEl>
+                                          <p:spTgt spid="10"/>
+                                        </p:tgtEl>
+                                        <p:attrNameLst>
+                                          <p:attrName>style.visibility</p:attrName>
+                                        </p:attrNameLst>
+                                      </p:cBhvr>
+                                      <p:to>
+                                        <p:strVal val="visible"/>
+                                      </p:to>
+                                    </p:set>
+                                    <p:animEffect transition="in" filter="fade">
+                                      <p:cBhvr>
+                                        <p:cTn id="28" dur="500"/>
+                                        <p:tgtEl>
+                                          <p:spTgt spid="10"/>
+                                        </p:tgtEl>
+                                      </p:cBhvr>
+                                    </p:animEffect>
+                                  </p:childTnLst>
+                                </p:cTn>
+                              </p:par>
+                            </p:childTnLst>
+                          </p:cTn>
+                        </p:par>
+                      </p:childTnLst>
+                    </p:cTn>
+                  </p:par>
                 </p:childTnLst>
               </p:cTn>
               <p:prevCondLst>
@@ -17187,6 +18046,10 @@
         </p:cTn>
       </p:par>
     </p:tnLst>
+    <p:bldLst>
+      <p:bldP spid="7" grpId="0"/>
+      <p:bldP spid="10" grpId="0"/>
+    </p:bldLst>
   </p:timing>
 </p:sld>
 </file>

</xml_diff>

<commit_message>
adding content to linear regression ppt
</commit_message>
<xml_diff>
--- a/presentations/linear_regression/Linear_regression.pptx
+++ b/presentations/linear_regression/Linear_regression.pptx
@@ -5,7 +5,7 @@
     <p:sldMasterId id="2147483684" r:id="rId1"/>
   </p:sldMasterIdLst>
   <p:notesMasterIdLst>
-    <p:notesMasterId r:id="rId30"/>
+    <p:notesMasterId r:id="rId31"/>
   </p:notesMasterIdLst>
   <p:sldIdLst>
     <p:sldId id="256" r:id="rId2"/>
@@ -31,11 +31,12 @@
     <p:sldId id="310" r:id="rId22"/>
     <p:sldId id="294" r:id="rId23"/>
     <p:sldId id="306" r:id="rId24"/>
-    <p:sldId id="320" r:id="rId25"/>
-    <p:sldId id="308" r:id="rId26"/>
-    <p:sldId id="324" r:id="rId27"/>
-    <p:sldId id="309" r:id="rId28"/>
-    <p:sldId id="311" r:id="rId29"/>
+    <p:sldId id="325" r:id="rId25"/>
+    <p:sldId id="320" r:id="rId26"/>
+    <p:sldId id="308" r:id="rId27"/>
+    <p:sldId id="324" r:id="rId28"/>
+    <p:sldId id="309" r:id="rId29"/>
+    <p:sldId id="311" r:id="rId30"/>
   </p:sldIdLst>
   <p:sldSz cx="9144000" cy="6858000" type="screen4x3"/>
   <p:notesSz cx="6858000" cy="9144000"/>
@@ -235,7 +236,7 @@
           <a:p>
             <a:fld id="{2793983C-EFA1-41D2-8DCF-4CEF34100D6A}" type="datetimeFigureOut">
               <a:rPr lang="en-US" smtClean="0"/>
-              <a:t>2/10/2016</a:t>
+              <a:t>2/12/2016</a:t>
             </a:fld>
             <a:endParaRPr lang="en-US"/>
           </a:p>
@@ -1048,7 +1049,7 @@
           <a:p>
             <a:fld id="{CC5A1FCD-79C7-4337-B79E-A51417706FB1}" type="slidenum">
               <a:rPr lang="en-US" smtClean="0"/>
-              <a:t>24</a:t>
+              <a:t>25</a:t>
             </a:fld>
             <a:endParaRPr lang="en-US"/>
           </a:p>
@@ -1195,7 +1196,7 @@
           <a:p>
             <a:fld id="{CC5A1FCD-79C7-4337-B79E-A51417706FB1}" type="slidenum">
               <a:rPr lang="en-US" smtClean="0"/>
-              <a:t>25</a:t>
+              <a:t>26</a:t>
             </a:fld>
             <a:endParaRPr lang="en-US"/>
           </a:p>
@@ -1279,7 +1280,7 @@
           <a:p>
             <a:fld id="{CC5A1FCD-79C7-4337-B79E-A51417706FB1}" type="slidenum">
               <a:rPr lang="en-US" smtClean="0"/>
-              <a:t>26</a:t>
+              <a:t>27</a:t>
             </a:fld>
             <a:endParaRPr lang="en-US"/>
           </a:p>
@@ -1363,7 +1364,7 @@
           <a:p>
             <a:fld id="{CC5A1FCD-79C7-4337-B79E-A51417706FB1}" type="slidenum">
               <a:rPr lang="en-US" smtClean="0"/>
-              <a:t>27</a:t>
+              <a:t>28</a:t>
             </a:fld>
             <a:endParaRPr lang="en-US"/>
           </a:p>
@@ -2772,7 +2773,7 @@
           <a:p>
             <a:fld id="{97CFF939-70E9-4E47-9899-4E3DA2789027}" type="datetimeFigureOut">
               <a:rPr lang="en-US" smtClean="0"/>
-              <a:t>2/10/2016</a:t>
+              <a:t>2/12/2016</a:t>
             </a:fld>
             <a:endParaRPr lang="en-US"/>
           </a:p>
@@ -2964,7 +2965,7 @@
           <a:p>
             <a:fld id="{97CFF939-70E9-4E47-9899-4E3DA2789027}" type="datetimeFigureOut">
               <a:rPr lang="en-US" smtClean="0"/>
-              <a:t>2/10/2016</a:t>
+              <a:t>2/12/2016</a:t>
             </a:fld>
             <a:endParaRPr lang="en-US"/>
           </a:p>
@@ -3144,7 +3145,7 @@
           <a:p>
             <a:fld id="{97CFF939-70E9-4E47-9899-4E3DA2789027}" type="datetimeFigureOut">
               <a:rPr lang="en-US" smtClean="0"/>
-              <a:t>2/10/2016</a:t>
+              <a:t>2/12/2016</a:t>
             </a:fld>
             <a:endParaRPr lang="en-US"/>
           </a:p>
@@ -3314,7 +3315,7 @@
           <a:p>
             <a:fld id="{97CFF939-70E9-4E47-9899-4E3DA2789027}" type="datetimeFigureOut">
               <a:rPr lang="en-US" smtClean="0"/>
-              <a:t>2/10/2016</a:t>
+              <a:t>2/12/2016</a:t>
             </a:fld>
             <a:endParaRPr lang="en-US"/>
           </a:p>
@@ -3568,7 +3569,7 @@
           <a:p>
             <a:fld id="{97CFF939-70E9-4E47-9899-4E3DA2789027}" type="datetimeFigureOut">
               <a:rPr lang="en-US" smtClean="0"/>
-              <a:t>2/10/2016</a:t>
+              <a:t>2/12/2016</a:t>
             </a:fld>
             <a:endParaRPr lang="en-US"/>
           </a:p>
@@ -3894,7 +3895,7 @@
           <a:p>
             <a:fld id="{97CFF939-70E9-4E47-9899-4E3DA2789027}" type="datetimeFigureOut">
               <a:rPr lang="en-US" smtClean="0"/>
-              <a:t>2/10/2016</a:t>
+              <a:t>2/12/2016</a:t>
             </a:fld>
             <a:endParaRPr lang="en-US"/>
           </a:p>
@@ -4314,7 +4315,7 @@
           <a:p>
             <a:fld id="{97CFF939-70E9-4E47-9899-4E3DA2789027}" type="datetimeFigureOut">
               <a:rPr lang="en-US" smtClean="0"/>
-              <a:t>2/10/2016</a:t>
+              <a:t>2/12/2016</a:t>
             </a:fld>
             <a:endParaRPr lang="en-US"/>
           </a:p>
@@ -4432,7 +4433,7 @@
           <a:p>
             <a:fld id="{97CFF939-70E9-4E47-9899-4E3DA2789027}" type="datetimeFigureOut">
               <a:rPr lang="en-US" smtClean="0"/>
-              <a:t>2/10/2016</a:t>
+              <a:t>2/12/2016</a:t>
             </a:fld>
             <a:endParaRPr lang="en-US"/>
           </a:p>
@@ -4527,7 +4528,7 @@
           <a:p>
             <a:fld id="{97CFF939-70E9-4E47-9899-4E3DA2789027}" type="datetimeFigureOut">
               <a:rPr lang="en-US" smtClean="0"/>
-              <a:t>2/10/2016</a:t>
+              <a:t>2/12/2016</a:t>
             </a:fld>
             <a:endParaRPr lang="en-US"/>
           </a:p>
@@ -4814,7 +4815,7 @@
           <a:p>
             <a:fld id="{97CFF939-70E9-4E47-9899-4E3DA2789027}" type="datetimeFigureOut">
               <a:rPr lang="en-US" smtClean="0"/>
-              <a:t>2/10/2016</a:t>
+              <a:t>2/12/2016</a:t>
             </a:fld>
             <a:endParaRPr lang="en-US"/>
           </a:p>
@@ -5136,7 +5137,7 @@
           <a:p>
             <a:fld id="{97CFF939-70E9-4E47-9899-4E3DA2789027}" type="datetimeFigureOut">
               <a:rPr lang="en-US" smtClean="0"/>
-              <a:t>2/10/2016</a:t>
+              <a:t>2/12/2016</a:t>
             </a:fld>
             <a:endParaRPr lang="en-US"/>
           </a:p>
@@ -5390,7 +5391,7 @@
           <a:p>
             <a:fld id="{97CFF939-70E9-4E47-9899-4E3DA2789027}" type="datetimeFigureOut">
               <a:rPr lang="en-US" smtClean="0"/>
-              <a:t>2/10/2016</a:t>
+              <a:t>2/12/2016</a:t>
             </a:fld>
             <a:endParaRPr lang="en-US"/>
           </a:p>
@@ -10704,6 +10705,110 @@
           <a:p>
             <a:r>
               <a:rPr lang="en-US" dirty="0" smtClean="0"/>
+              <a:t>Other Types of Regression</a:t>
+            </a:r>
+            <a:endParaRPr lang="en-US" dirty="0"/>
+          </a:p>
+        </p:txBody>
+      </p:sp>
+      <p:sp>
+        <p:nvSpPr>
+          <p:cNvPr id="3" name="Content Placeholder 2"/>
+          <p:cNvSpPr>
+            <a:spLocks noGrp="1"/>
+          </p:cNvSpPr>
+          <p:nvPr>
+            <p:ph idx="1"/>
+          </p:nvPr>
+        </p:nvSpPr>
+        <p:spPr/>
+        <p:txBody>
+          <a:bodyPr/>
+          <a:lstStyle/>
+          <a:p>
+            <a:r>
+              <a:rPr lang="en-US" sz="2400" b="1" dirty="0" smtClean="0"/>
+              <a:t>Step-wise regression - </a:t>
+            </a:r>
+          </a:p>
+          <a:p>
+            <a:r>
+              <a:rPr lang="en-US" sz="2400" b="1" dirty="0"/>
+              <a:t>Logistic regression </a:t>
+            </a:r>
+            <a:r>
+              <a:rPr lang="en-US" b="1" dirty="0"/>
+              <a:t>-</a:t>
+            </a:r>
+            <a:r>
+              <a:rPr lang="en-US" dirty="0"/>
+              <a:t> </a:t>
+            </a:r>
+            <a:r>
+              <a:rPr lang="en-US" sz="2000" dirty="0"/>
+              <a:t>useful when you are predicting a binary outcome from a set of continuous predictor variables.</a:t>
+            </a:r>
+            <a:endParaRPr lang="en-US" sz="2000" dirty="0" smtClean="0"/>
+          </a:p>
+          <a:p>
+            <a:endParaRPr lang="en-US" dirty="0"/>
+          </a:p>
+        </p:txBody>
+      </p:sp>
+    </p:spTree>
+    <p:extLst>
+      <p:ext uri="{BB962C8B-B14F-4D97-AF65-F5344CB8AC3E}">
+        <p14:creationId xmlns:p14="http://schemas.microsoft.com/office/powerpoint/2010/main" val="2329092583"/>
+      </p:ext>
+    </p:extLst>
+  </p:cSld>
+  <p:clrMapOvr>
+    <a:masterClrMapping/>
+  </p:clrMapOvr>
+  <p:timing>
+    <p:tnLst>
+      <p:par>
+        <p:cTn id="1" dur="indefinite" restart="never" nodeType="tmRoot"/>
+      </p:par>
+    </p:tnLst>
+  </p:timing>
+</p:sld>
+</file>
+
+<file path=ppt/slides/slide25.xml><?xml version="1.0" encoding="utf-8"?>
+<p:sld xmlns:a="http://schemas.openxmlformats.org/drawingml/2006/main" xmlns:r="http://schemas.openxmlformats.org/officeDocument/2006/relationships" xmlns:p="http://schemas.openxmlformats.org/presentationml/2006/main">
+  <p:cSld>
+    <p:spTree>
+      <p:nvGrpSpPr>
+        <p:cNvPr id="1" name=""/>
+        <p:cNvGrpSpPr/>
+        <p:nvPr/>
+      </p:nvGrpSpPr>
+      <p:grpSpPr>
+        <a:xfrm>
+          <a:off x="0" y="0"/>
+          <a:ext cx="0" cy="0"/>
+          <a:chOff x="0" y="0"/>
+          <a:chExt cx="0" cy="0"/>
+        </a:xfrm>
+      </p:grpSpPr>
+      <p:sp>
+        <p:nvSpPr>
+          <p:cNvPr id="2" name="Title 1"/>
+          <p:cNvSpPr>
+            <a:spLocks noGrp="1"/>
+          </p:cNvSpPr>
+          <p:nvPr>
+            <p:ph type="title"/>
+          </p:nvPr>
+        </p:nvSpPr>
+        <p:spPr/>
+        <p:txBody>
+          <a:bodyPr/>
+          <a:lstStyle/>
+          <a:p>
+            <a:r>
+              <a:rPr lang="en-US" dirty="0" smtClean="0"/>
               <a:t>Review Questions</a:t>
             </a:r>
             <a:endParaRPr lang="en-US" dirty="0"/>
@@ -11991,7 +12096,7 @@
 </p:sld>
 </file>
 
-<file path=ppt/slides/slide25.xml><?xml version="1.0" encoding="utf-8"?>
+<file path=ppt/slides/slide26.xml><?xml version="1.0" encoding="utf-8"?>
 <p:sld xmlns:a="http://schemas.openxmlformats.org/drawingml/2006/main" xmlns:r="http://schemas.openxmlformats.org/officeDocument/2006/relationships" xmlns:p="http://schemas.openxmlformats.org/presentationml/2006/main">
   <p:cSld>
     <p:spTree>
@@ -12613,7 +12718,7 @@
 </p:sld>
 </file>
 
-<file path=ppt/slides/slide26.xml><?xml version="1.0" encoding="utf-8"?>
+<file path=ppt/slides/slide27.xml><?xml version="1.0" encoding="utf-8"?>
 <p:sld xmlns:a="http://schemas.openxmlformats.org/drawingml/2006/main" xmlns:r="http://schemas.openxmlformats.org/officeDocument/2006/relationships" xmlns:p="http://schemas.openxmlformats.org/presentationml/2006/main">
   <p:cSld>
     <p:spTree>
@@ -12653,8 +12758,8 @@
           </a:p>
         </p:txBody>
       </p:sp>
-      <mc:AlternateContent xmlns:mc="http://schemas.openxmlformats.org/markup-compatibility/2006">
-        <mc:Choice xmlns:a14="http://schemas.microsoft.com/office/drawing/2010/main" Requires="a14">
+      <mc:AlternateContent xmlns:mc="http://schemas.openxmlformats.org/markup-compatibility/2006" xmlns:a14="http://schemas.microsoft.com/office/drawing/2010/main">
+        <mc:Choice Requires="a14">
           <p:sp>
             <p:nvSpPr>
               <p:cNvPr id="3" name="Content Placeholder 2"/>
@@ -12717,11 +12822,7 @@
                 </a:pPr>
                 <a:r>
                   <a:rPr lang="en-US" altLang="en-US" sz="2200" dirty="0" smtClean="0"/>
-                  <a:t>Root </a:t>
-                </a:r>
-                <a:r>
-                  <a:rPr lang="en-US" altLang="en-US" sz="2200" dirty="0" smtClean="0"/>
-                  <a:t>Mean Square Error = </a:t>
+                  <a:t>Root Mean Square Error = </a:t>
                 </a:r>
               </a:p>
               <a:p>
@@ -12998,7 +13099,7 @@
             </p:txBody>
           </p:sp>
         </mc:Choice>
-        <mc:Fallback>
+        <mc:Fallback xmlns="">
           <p:sp>
             <p:nvSpPr>
               <p:cNvPr id="3" name="Content Placeholder 2"/>
@@ -13039,8 +13140,8 @@
           </p:sp>
         </mc:Fallback>
       </mc:AlternateContent>
-      <mc:AlternateContent xmlns:mc="http://schemas.openxmlformats.org/markup-compatibility/2006">
-        <mc:Choice xmlns:a14="http://schemas.microsoft.com/office/drawing/2010/main" Requires="a14">
+      <mc:AlternateContent xmlns:mc="http://schemas.openxmlformats.org/markup-compatibility/2006" xmlns:a14="http://schemas.microsoft.com/office/drawing/2010/main">
+        <mc:Choice Requires="a14">
           <p:sp>
             <p:nvSpPr>
               <p:cNvPr id="4" name="Rectangle 3"/>
@@ -13096,7 +13197,7 @@
             </p:txBody>
           </p:sp>
         </mc:Choice>
-        <mc:Fallback>
+        <mc:Fallback xmlns="">
           <p:sp>
             <p:nvSpPr>
               <p:cNvPr id="4" name="Rectangle 3"/>
@@ -13135,8 +13236,8 @@
           </p:sp>
         </mc:Fallback>
       </mc:AlternateContent>
-      <mc:AlternateContent xmlns:mc="http://schemas.openxmlformats.org/markup-compatibility/2006">
-        <mc:Choice xmlns:a14="http://schemas.microsoft.com/office/drawing/2010/main" Requires="a14">
+      <mc:AlternateContent xmlns:mc="http://schemas.openxmlformats.org/markup-compatibility/2006" xmlns:a14="http://schemas.microsoft.com/office/drawing/2010/main">
+        <mc:Choice Requires="a14">
           <p:sp>
             <p:nvSpPr>
               <p:cNvPr id="18" name="Rectangle 17"/>
@@ -13198,7 +13299,7 @@
             </p:txBody>
           </p:sp>
         </mc:Choice>
-        <mc:Fallback>
+        <mc:Fallback xmlns="">
           <p:sp>
             <p:nvSpPr>
               <p:cNvPr id="18" name="Rectangle 17"/>
@@ -13237,8 +13338,8 @@
           </p:sp>
         </mc:Fallback>
       </mc:AlternateContent>
-      <mc:AlternateContent xmlns:mc="http://schemas.openxmlformats.org/markup-compatibility/2006">
-        <mc:Choice xmlns:a14="http://schemas.microsoft.com/office/drawing/2010/main" Requires="a14">
+      <mc:AlternateContent xmlns:mc="http://schemas.openxmlformats.org/markup-compatibility/2006" xmlns:a14="http://schemas.microsoft.com/office/drawing/2010/main">
+        <mc:Choice Requires="a14">
           <p:sp>
             <p:nvSpPr>
               <p:cNvPr id="11" name="Rectangle 10"/>
@@ -13282,15 +13383,7 @@
                 </a:pPr>
                 <a:r>
                   <a:rPr lang="en-US" altLang="en-US" dirty="0" smtClean="0"/>
-                  <a:t>N </a:t>
-                </a:r>
-                <a:r>
-                  <a:rPr lang="en-US" altLang="en-US" dirty="0" smtClean="0"/>
-                  <a:t>= </a:t>
-                </a:r>
-                <a:r>
-                  <a:rPr lang="en-US" altLang="en-US" dirty="0" smtClean="0"/>
-                  <a:t>number of observations  </a:t>
+                  <a:t>N = number of observations  </a:t>
                 </a:r>
               </a:p>
               <a:p>
@@ -13333,7 +13426,7 @@
             </p:txBody>
           </p:sp>
         </mc:Choice>
-        <mc:Fallback>
+        <mc:Fallback xmlns="">
           <p:sp>
             <p:nvSpPr>
               <p:cNvPr id="11" name="Rectangle 10"/>
@@ -13373,8 +13466,8 @@
           </p:sp>
         </mc:Fallback>
       </mc:AlternateContent>
-      <mc:AlternateContent xmlns:mc="http://schemas.openxmlformats.org/markup-compatibility/2006">
-        <mc:Choice xmlns:a14="http://schemas.microsoft.com/office/drawing/2010/main" Requires="a14">
+      <mc:AlternateContent xmlns:mc="http://schemas.openxmlformats.org/markup-compatibility/2006" xmlns:a14="http://schemas.microsoft.com/office/drawing/2010/main">
+        <mc:Choice Requires="a14">
           <p:sp>
             <p:nvSpPr>
               <p:cNvPr id="12" name="TextBox 11"/>
@@ -13462,7 +13555,7 @@
             </p:txBody>
           </p:sp>
         </mc:Choice>
-        <mc:Fallback>
+        <mc:Fallback xmlns="">
           <p:sp>
             <p:nvSpPr>
               <p:cNvPr id="12" name="TextBox 11"/>
@@ -13521,7 +13614,7 @@
 </p:sld>
 </file>
 
-<file path=ppt/slides/slide27.xml><?xml version="1.0" encoding="utf-8"?>
+<file path=ppt/slides/slide28.xml><?xml version="1.0" encoding="utf-8"?>
 <p:sld xmlns:a="http://schemas.openxmlformats.org/drawingml/2006/main" xmlns:r="http://schemas.openxmlformats.org/officeDocument/2006/relationships" xmlns:p="http://schemas.openxmlformats.org/presentationml/2006/main">
   <p:cSld>
     <p:spTree>
@@ -13555,11 +13648,7 @@
           <a:p>
             <a:r>
               <a:rPr lang="en-US" dirty="0" smtClean="0"/>
-              <a:t>Additional </a:t>
-            </a:r>
-            <a:r>
-              <a:rPr lang="en-US" dirty="0" smtClean="0"/>
-              <a:t>Resources - ANOVA</a:t>
+              <a:t>Additional Resources - ANOVA</a:t>
             </a:r>
             <a:endParaRPr lang="en-US" dirty="0"/>
           </a:p>
@@ -13649,15 +13738,7 @@
             </a:r>
             <a:r>
               <a:rPr lang="en-US" altLang="en-US" dirty="0" smtClean="0"/>
-              <a:t>N </a:t>
-            </a:r>
-            <a:r>
-              <a:rPr lang="en-US" altLang="en-US" dirty="0" smtClean="0"/>
-              <a:t>= </a:t>
-            </a:r>
-            <a:r>
-              <a:rPr lang="en-US" altLang="en-US" dirty="0" smtClean="0"/>
-              <a:t>number of observations             K = number of variables</a:t>
+              <a:t>N = number of observations             K = number of variables</a:t>
             </a:r>
             <a:endParaRPr lang="en-US" altLang="en-US" dirty="0"/>
           </a:p>
@@ -13711,7 +13792,7 @@
 </p:sld>
 </file>
 
-<file path=ppt/slides/slide28.xml><?xml version="1.0" encoding="utf-8"?>
+<file path=ppt/slides/slide29.xml><?xml version="1.0" encoding="utf-8"?>
 <p:sld xmlns:a="http://schemas.openxmlformats.org/drawingml/2006/main" xmlns:r="http://schemas.openxmlformats.org/officeDocument/2006/relationships" xmlns:p="http://schemas.openxmlformats.org/presentationml/2006/main">
   <p:cSld>
     <p:spTree>
@@ -18412,7 +18493,7 @@
         <p:spPr>
           <a:xfrm>
             <a:off x="5870321" y="2413221"/>
-            <a:ext cx="1866217" cy="646331"/>
+            <a:ext cx="2417650" cy="646331"/>
           </a:xfrm>
           <a:prstGeom prst="rect">
             <a:avLst/>
@@ -18432,8 +18513,16 @@
           </a:p>
           <a:p>
             <a:r>
+              <a:rPr lang="en-US" dirty="0"/>
+              <a:t>s</a:t>
+            </a:r>
+            <a:r>
               <a:rPr lang="en-US" dirty="0" smtClean="0"/>
-              <a:t>sum of squares</a:t>
+              <a:t>um of s</a:t>
+            </a:r>
+            <a:r>
+              <a:rPr lang="en-US" dirty="0" smtClean="0"/>
+              <a:t>quared error</a:t>
             </a:r>
             <a:endParaRPr lang="en-US" dirty="0"/>
           </a:p>
@@ -18888,7 +18977,6 @@
               <a:rPr lang="en-US" sz="2200" dirty="0" smtClean="0"/>
               <a:t>Simple linear regression (SLR): </a:t>
             </a:r>
-            <a:endParaRPr lang="en-US" sz="2200" dirty="0" smtClean="0"/>
           </a:p>
           <a:p>
             <a:pPr marL="274320" lvl="2" indent="0">
@@ -18899,11 +18987,7 @@
             </a:pPr>
             <a:r>
               <a:rPr lang="en-US" sz="2000" dirty="0" smtClean="0"/>
-              <a:t>Y </a:t>
-            </a:r>
-            <a:r>
-              <a:rPr lang="en-US" sz="2000" dirty="0" smtClean="0"/>
-              <a:t>is predicted from </a:t>
+              <a:t>Y is predicted from </a:t>
             </a:r>
             <a:r>
               <a:rPr lang="en-US" sz="2000" b="1" u="sng" dirty="0" smtClean="0"/>
@@ -18911,13 +18995,8 @@
             </a:r>
             <a:r>
               <a:rPr lang="en-US" sz="2000" dirty="0" smtClean="0"/>
-              <a:t> independent variable (X</a:t>
-            </a:r>
-            <a:r>
-              <a:rPr lang="en-US" sz="2000" dirty="0" smtClean="0"/>
-              <a:t>)</a:t>
-            </a:r>
-            <a:endParaRPr lang="en-US" sz="2000" dirty="0" smtClean="0"/>
+              <a:t> independent variable (X)</a:t>
+            </a:r>
           </a:p>
           <a:p>
             <a:pPr marL="182563" lvl="1" indent="-182563"/>
@@ -18925,7 +19004,6 @@
               <a:rPr lang="en-US" sz="2200" dirty="0" smtClean="0"/>
               <a:t>Multiple linear regression (MLR): </a:t>
             </a:r>
-            <a:endParaRPr lang="en-US" sz="2200" dirty="0" smtClean="0"/>
           </a:p>
           <a:p>
             <a:pPr marL="274320" lvl="2" indent="0">
@@ -18933,11 +19011,7 @@
             </a:pPr>
             <a:r>
               <a:rPr lang="en-US" sz="2000" dirty="0" smtClean="0"/>
-              <a:t>Y </a:t>
-            </a:r>
-            <a:r>
-              <a:rPr lang="en-US" sz="2000" dirty="0" smtClean="0"/>
-              <a:t>is </a:t>
+              <a:t>Y is </a:t>
             </a:r>
             <a:r>
               <a:rPr lang="en-US" sz="2000" dirty="0"/>
@@ -18965,11 +19039,7 @@
             </a:r>
             <a:r>
               <a:rPr lang="en-US" sz="2000" dirty="0" smtClean="0"/>
-              <a:t>, </a:t>
-            </a:r>
-            <a:r>
-              <a:rPr lang="en-US" sz="2000" dirty="0" smtClean="0"/>
-              <a:t>X</a:t>
+              <a:t>, X</a:t>
             </a:r>
             <a:r>
               <a:rPr lang="en-US" sz="2000" baseline="-25000" dirty="0" smtClean="0"/>
@@ -18979,7 +19049,6 @@
               <a:rPr lang="en-US" sz="2000" dirty="0" smtClean="0"/>
               <a:t>) </a:t>
             </a:r>
-            <a:endParaRPr lang="en-US" sz="2000" dirty="0" smtClean="0"/>
           </a:p>
           <a:p>
             <a:pPr marL="182563" lvl="1" indent="-182563"/>
@@ -19396,11 +19465,7 @@
             </a:r>
             <a:r>
               <a:rPr lang="en-US" altLang="en-US" sz="3000" dirty="0" smtClean="0"/>
-              <a:t>0.86(</a:t>
-            </a:r>
-            <a:r>
-              <a:rPr lang="en-US" altLang="en-US" sz="3000" dirty="0" smtClean="0"/>
-              <a:t>OC</a:t>
+              <a:t>0.86(OC</a:t>
             </a:r>
             <a:r>
               <a:rPr lang="en-US" altLang="en-US" sz="3000" baseline="-25000" dirty="0" smtClean="0"/>
@@ -19463,11 +19528,7 @@
             </a:r>
             <a:r>
               <a:rPr lang="en-US" altLang="en-US" sz="2000" baseline="-25000" dirty="0" smtClean="0"/>
-              <a:t>wc</a:t>
-            </a:r>
-            <a:r>
-              <a:rPr lang="en-US" altLang="en-US" sz="2000" baseline="-25000" dirty="0" smtClean="0"/>
-              <a:t>  </a:t>
+              <a:t>wc  </a:t>
             </a:r>
             <a:r>
               <a:rPr lang="en-US" altLang="en-US" sz="2000" dirty="0"/>
@@ -20059,45 +20120,191 @@
           <a:chExt cx="0" cy="0"/>
         </a:xfrm>
       </p:grpSpPr>
-      <p:pic>
-        <p:nvPicPr>
-          <p:cNvPr id="8" name="Picture 2" descr="https://mathcoachblog.files.wordpress.com/2014/10/paranormal.jpg"/>
-          <p:cNvPicPr>
-            <a:picLocks noChangeAspect="1" noChangeArrowheads="1"/>
-          </p:cNvPicPr>
-          <p:nvPr/>
-        </p:nvPicPr>
-        <p:blipFill rotWithShape="1">
-          <a:blip r:embed="rId2">
-            <a:extLst>
-              <a:ext uri="{28A0092B-C50C-407E-A947-70E740481C1C}">
-                <a14:useLocalDpi xmlns:a14="http://schemas.microsoft.com/office/drawing/2010/main" val="0"/>
-              </a:ext>
-            </a:extLst>
-          </a:blip>
-          <a:srcRect l="14500" t="46712" r="13625" b="6413"/>
-          <a:stretch/>
-        </p:blipFill>
-        <p:spPr bwMode="auto">
-          <a:xfrm>
-            <a:off x="4464856" y="4046890"/>
-            <a:ext cx="3505200" cy="2286000"/>
-          </a:xfrm>
-          <a:prstGeom prst="rect">
-            <a:avLst/>
-          </a:prstGeom>
+      <p:sp>
+        <p:nvSpPr>
+          <p:cNvPr id="3" name="Content Placeholder 2"/>
+          <p:cNvSpPr>
+            <a:spLocks noGrp="1"/>
+          </p:cNvSpPr>
+          <p:nvPr>
+            <p:ph idx="1"/>
+          </p:nvPr>
+        </p:nvSpPr>
+        <p:spPr>
           <a:noFill/>
-          <a:extLst>
-            <a:ext uri="{909E8E84-426E-40DD-AFC4-6F175D3DCCD1}">
-              <a14:hiddenFill xmlns:a14="http://schemas.microsoft.com/office/drawing/2010/main">
-                <a:solidFill>
-                  <a:srgbClr val="FFFFFF"/>
-                </a:solidFill>
-              </a14:hiddenFill>
-            </a:ext>
-          </a:extLst>
+          <a:ln>
+            <a:solidFill>
+              <a:schemeClr val="bg1"/>
+            </a:solidFill>
+          </a:ln>
         </p:spPr>
-      </p:pic>
+        <p:txBody>
+          <a:bodyPr>
+            <a:normAutofit/>
+          </a:bodyPr>
+          <a:lstStyle/>
+          <a:p>
+            <a:pPr>
+              <a:lnSpc>
+                <a:spcPct val="90000"/>
+              </a:lnSpc>
+              <a:buClr>
+                <a:schemeClr val="tx1">
+                  <a:lumMod val="65000"/>
+                  <a:lumOff val="35000"/>
+                </a:schemeClr>
+              </a:buClr>
+            </a:pPr>
+            <a:r>
+              <a:rPr lang="en-US" altLang="en-US" sz="2400" b="1" dirty="0" smtClean="0"/>
+              <a:t>Linearity</a:t>
+            </a:r>
+            <a:r>
+              <a:rPr lang="en-US" altLang="en-US" sz="3200" b="1" dirty="0" smtClean="0"/>
+              <a:t> </a:t>
+            </a:r>
+            <a:r>
+              <a:rPr lang="en-US" altLang="en-US" sz="3200" b="1" dirty="0"/>
+              <a:t>- </a:t>
+            </a:r>
+            <a:r>
+              <a:rPr lang="en-US" altLang="en-US" sz="2200" dirty="0" smtClean="0"/>
+              <a:t>Y is </a:t>
+            </a:r>
+            <a:r>
+              <a:rPr lang="en-US" altLang="en-US" sz="2200" b="1" i="1" dirty="0"/>
+              <a:t>linearly</a:t>
+            </a:r>
+            <a:r>
+              <a:rPr lang="en-US" altLang="en-US" sz="2200" b="1" dirty="0"/>
+              <a:t> </a:t>
+            </a:r>
+            <a:r>
+              <a:rPr lang="en-US" altLang="en-US" sz="2200" dirty="0"/>
+              <a:t>related to </a:t>
+            </a:r>
+            <a:r>
+              <a:rPr lang="en-US" altLang="en-US" sz="2200" dirty="0" smtClean="0"/>
+              <a:t>X. </a:t>
+            </a:r>
+            <a:endParaRPr lang="en-US" altLang="en-US" sz="2200" dirty="0"/>
+          </a:p>
+          <a:p>
+            <a:pPr>
+              <a:lnSpc>
+                <a:spcPct val="90000"/>
+              </a:lnSpc>
+              <a:buClr>
+                <a:schemeClr val="tx1">
+                  <a:lumMod val="65000"/>
+                  <a:lumOff val="35000"/>
+                </a:schemeClr>
+              </a:buClr>
+            </a:pPr>
+            <a:r>
+              <a:rPr lang="en-US" altLang="en-US" sz="2400" b="1" dirty="0"/>
+              <a:t>Independence of Error - </a:t>
+            </a:r>
+            <a:r>
+              <a:rPr lang="en-US" altLang="en-US" sz="2200" dirty="0"/>
+              <a:t>the error (residual) is </a:t>
+            </a:r>
+            <a:r>
+              <a:rPr lang="en-US" altLang="en-US" sz="2200" b="1" i="1" dirty="0"/>
+              <a:t>independent</a:t>
+            </a:r>
+            <a:r>
+              <a:rPr lang="en-US" altLang="en-US" sz="2200" dirty="0"/>
+              <a:t> for each value of X.</a:t>
+            </a:r>
+          </a:p>
+          <a:p>
+            <a:pPr>
+              <a:lnSpc>
+                <a:spcPct val="90000"/>
+              </a:lnSpc>
+              <a:buClr>
+                <a:schemeClr val="tx1">
+                  <a:lumMod val="65000"/>
+                  <a:lumOff val="35000"/>
+                </a:schemeClr>
+              </a:buClr>
+            </a:pPr>
+            <a:r>
+              <a:rPr lang="en-US" altLang="en-US" sz="2400" b="1" dirty="0"/>
+              <a:t>Homoscedasticity - </a:t>
+            </a:r>
+            <a:r>
+              <a:rPr lang="en-US" altLang="en-US" sz="2200" dirty="0"/>
+              <a:t>the </a:t>
+            </a:r>
+            <a:r>
+              <a:rPr lang="en-US" altLang="en-US" sz="2200" b="1" i="1" dirty="0"/>
+              <a:t>variation </a:t>
+            </a:r>
+            <a:r>
+              <a:rPr lang="en-US" altLang="en-US" sz="2200" dirty="0"/>
+              <a:t>around the </a:t>
+            </a:r>
+            <a:r>
+              <a:rPr lang="en-US" altLang="en-US" sz="2200" dirty="0" smtClean="0"/>
+              <a:t>regression line is </a:t>
+            </a:r>
+            <a:r>
+              <a:rPr lang="en-US" altLang="en-US" sz="2200" b="1" i="1" dirty="0"/>
+              <a:t>constant</a:t>
+            </a:r>
+            <a:r>
+              <a:rPr lang="en-US" altLang="en-US" sz="2200" dirty="0"/>
+              <a:t> for all values of X.</a:t>
+            </a:r>
+          </a:p>
+          <a:p>
+            <a:pPr>
+              <a:lnSpc>
+                <a:spcPct val="90000"/>
+              </a:lnSpc>
+              <a:buClr>
+                <a:schemeClr val="tx1">
+                  <a:lumMod val="65000"/>
+                  <a:lumOff val="35000"/>
+                </a:schemeClr>
+              </a:buClr>
+            </a:pPr>
+            <a:r>
+              <a:rPr lang="en-US" altLang="en-US" sz="2400" b="1" dirty="0"/>
+              <a:t>Normality</a:t>
+            </a:r>
+            <a:r>
+              <a:rPr lang="en-US" altLang="en-US" sz="2000" b="1" dirty="0"/>
+              <a:t> - </a:t>
+            </a:r>
+            <a:r>
+              <a:rPr lang="en-US" altLang="en-US" sz="2200" dirty="0"/>
+              <a:t>the values of Y </a:t>
+            </a:r>
+            <a:r>
+              <a:rPr lang="en-US" altLang="en-US" sz="2200" dirty="0" smtClean="0"/>
+              <a:t>are </a:t>
+            </a:r>
+            <a:r>
+              <a:rPr lang="en-US" altLang="en-US" sz="2200" b="1" i="1" dirty="0"/>
+              <a:t>normally</a:t>
+            </a:r>
+            <a:r>
+              <a:rPr lang="en-US" altLang="en-US" sz="2200" dirty="0"/>
+              <a:t> distributed at each value of X.</a:t>
+            </a:r>
+          </a:p>
+          <a:p>
+            <a:pPr marL="0" indent="0">
+              <a:buClrTx/>
+              <a:buNone/>
+            </a:pPr>
+            <a:endParaRPr lang="en-US" sz="2200" dirty="0"/>
+          </a:p>
+        </p:txBody>
+      </p:sp>
       <p:sp>
         <p:nvSpPr>
           <p:cNvPr id="2" name="Title 1"/>
@@ -20123,158 +20330,102 @@
       </p:sp>
       <p:sp>
         <p:nvSpPr>
-          <p:cNvPr id="3" name="Content Placeholder 2"/>
-          <p:cNvSpPr>
-            <a:spLocks noGrp="1"/>
-          </p:cNvSpPr>
-          <p:nvPr>
-            <p:ph idx="1"/>
-          </p:nvPr>
-        </p:nvSpPr>
-        <p:spPr/>
+          <p:cNvPr id="6" name="Rectangle 5"/>
+          <p:cNvSpPr/>
+          <p:nvPr/>
+        </p:nvSpPr>
+        <p:spPr>
+          <a:xfrm>
+            <a:off x="0" y="6519446"/>
+            <a:ext cx="4572000" cy="338554"/>
+          </a:xfrm>
+          <a:prstGeom prst="rect">
+            <a:avLst/>
+          </a:prstGeom>
+        </p:spPr>
         <p:txBody>
           <a:bodyPr>
-            <a:normAutofit/>
+            <a:spAutoFit/>
           </a:bodyPr>
           <a:lstStyle/>
           <a:p>
-            <a:pPr marL="457200" indent="-457200">
-              <a:buFont typeface="+mj-lt"/>
-              <a:buAutoNum type="arabicPeriod"/>
-            </a:pPr>
-            <a:r>
-              <a:rPr lang="en-US" altLang="en-US" sz="2200" dirty="0" smtClean="0"/>
-              <a:t>Observations are representative of the population.</a:t>
-            </a:r>
-          </a:p>
-          <a:p>
-            <a:pPr marL="457200" indent="-457200">
-              <a:buFont typeface="+mj-lt"/>
-              <a:buAutoNum type="arabicPeriod"/>
-            </a:pPr>
-            <a:r>
-              <a:rPr lang="en-US" altLang="en-US" sz="2200" dirty="0" smtClean="0"/>
-              <a:t>Model errors follow a </a:t>
-            </a:r>
-            <a:r>
-              <a:rPr lang="en-US" altLang="en-US" sz="2200" b="1" u="sng" dirty="0" smtClean="0"/>
-              <a:t>normal distribution </a:t>
-            </a:r>
-            <a:r>
-              <a:rPr lang="en-US" altLang="en-US" sz="2200" dirty="0" smtClean="0"/>
-              <a:t>(</a:t>
-            </a:r>
-            <a:r>
-              <a:rPr lang="el-GR" altLang="en-US" sz="2200" dirty="0" smtClean="0"/>
-              <a:t>μ</a:t>
-            </a:r>
-            <a:r>
-              <a:rPr lang="en-US" altLang="en-US" sz="2200" dirty="0" smtClean="0"/>
-              <a:t>=0) with a </a:t>
-            </a:r>
-            <a:r>
-              <a:rPr lang="en-US" altLang="en-US" sz="2200" b="1" u="sng" dirty="0" smtClean="0"/>
-              <a:t>common variance</a:t>
-            </a:r>
-            <a:r>
-              <a:rPr lang="en-US" altLang="en-US" sz="2200" dirty="0" smtClean="0"/>
-              <a:t> (h</a:t>
-            </a:r>
-            <a:r>
-              <a:rPr lang="en-US" sz="2200" dirty="0" smtClean="0"/>
-              <a:t>omoscedasticity). </a:t>
-            </a:r>
-          </a:p>
-          <a:p>
-            <a:pPr marL="457200" indent="-457200">
-              <a:buFont typeface="+mj-lt"/>
-              <a:buAutoNum type="arabicPeriod"/>
-            </a:pPr>
-            <a:r>
-              <a:rPr lang="en-US" sz="2200" dirty="0" smtClean="0"/>
-              <a:t>Model errors are </a:t>
-            </a:r>
-            <a:r>
-              <a:rPr lang="en-US" sz="2200" b="1" u="sng" dirty="0" smtClean="0"/>
-              <a:t>independent</a:t>
-            </a:r>
-            <a:r>
-              <a:rPr lang="en-US" sz="2200" dirty="0" smtClean="0"/>
-              <a:t> of             one another.</a:t>
-            </a:r>
-          </a:p>
-          <a:p>
-            <a:pPr marL="0" indent="0">
-              <a:buNone/>
-            </a:pPr>
-            <a:endParaRPr lang="en-US" sz="2200" dirty="0"/>
+            <a:r>
+              <a:rPr lang="en-US" sz="800" dirty="0"/>
+              <a:t>https://</a:t>
+            </a:r>
+            <a:r>
+              <a:rPr lang="en-US" sz="800" dirty="0" smtClean="0"/>
+              <a:t>mathcoachblog.files.wordpress.com/2014/10/paranormal.jpg</a:t>
+            </a:r>
+          </a:p>
+          <a:p>
+            <a:r>
+              <a:rPr lang="en-US" sz="800" dirty="0"/>
+              <a:t>www.csus.edu/indiv/h/hopfem/multiple.ppt</a:t>
+            </a:r>
+            <a:endParaRPr lang="en-US" sz="800" dirty="0"/>
           </a:p>
         </p:txBody>
       </p:sp>
       <p:pic>
         <p:nvPicPr>
-          <p:cNvPr id="1026" name="Picture 2" descr="https://mathcoachblog.files.wordpress.com/2014/10/paranormal.jpg"/>
+          <p:cNvPr id="4" name="Picture 3"/>
           <p:cNvPicPr>
-            <a:picLocks noChangeAspect="1" noChangeArrowheads="1"/>
+            <a:picLocks noChangeAspect="1"/>
           </p:cNvPicPr>
           <p:nvPr/>
         </p:nvPicPr>
-        <p:blipFill rotWithShape="1">
-          <a:blip r:embed="rId2">
-            <a:extLst>
-              <a:ext uri="{28A0092B-C50C-407E-A947-70E740481C1C}">
-                <a14:useLocalDpi xmlns:a14="http://schemas.microsoft.com/office/drawing/2010/main" val="0"/>
-              </a:ext>
-            </a:extLst>
-          </a:blip>
-          <a:srcRect l="14500" t="6087" r="13625" b="57975"/>
-          <a:stretch/>
+        <p:blipFill>
+          <a:blip r:embed="rId2"/>
+          <a:stretch>
+            <a:fillRect/>
+          </a:stretch>
         </p:blipFill>
-        <p:spPr bwMode="auto">
+        <p:spPr>
           <a:xfrm>
-            <a:off x="943091" y="4580290"/>
-            <a:ext cx="3505200" cy="1752600"/>
+            <a:off x="381000" y="1828801"/>
+            <a:ext cx="7933653" cy="2590800"/>
+          </a:xfrm>
+          <a:prstGeom prst="rect">
+            <a:avLst/>
+          </a:prstGeom>
+        </p:spPr>
+      </p:pic>
+      <p:sp>
+        <p:nvSpPr>
+          <p:cNvPr id="10" name="TextBox 9"/>
+          <p:cNvSpPr txBox="1"/>
+          <p:nvPr/>
+        </p:nvSpPr>
+        <p:spPr>
+          <a:xfrm>
+            <a:off x="4724400" y="2429129"/>
+            <a:ext cx="731290" cy="369332"/>
           </a:xfrm>
           <a:prstGeom prst="rect">
             <a:avLst/>
           </a:prstGeom>
           <a:noFill/>
-          <a:extLst>
-            <a:ext uri="{909E8E84-426E-40DD-AFC4-6F175D3DCCD1}">
-              <a14:hiddenFill xmlns:a14="http://schemas.microsoft.com/office/drawing/2010/main">
-                <a:solidFill>
-                  <a:srgbClr val="FFFFFF"/>
-                </a:solidFill>
-              </a14:hiddenFill>
-            </a:ext>
-          </a:extLst>
         </p:spPr>
-      </p:pic>
-      <p:sp>
-        <p:nvSpPr>
-          <p:cNvPr id="6" name="Rectangle 5"/>
-          <p:cNvSpPr/>
-          <p:nvPr/>
-        </p:nvSpPr>
-        <p:spPr>
-          <a:xfrm>
-            <a:off x="-23191" y="6642556"/>
-            <a:ext cx="4572000" cy="215444"/>
-          </a:xfrm>
-          <a:prstGeom prst="rect">
-            <a:avLst/>
-          </a:prstGeom>
-        </p:spPr>
-        <p:txBody>
-          <a:bodyPr>
+        <p:txBody>
+          <a:bodyPr wrap="none" rtlCol="0">
             <a:spAutoFit/>
           </a:bodyPr>
           <a:lstStyle/>
           <a:p>
             <a:r>
-              <a:rPr lang="en-US" sz="800" dirty="0"/>
-              <a:t>https://mathcoachblog.files.wordpress.com/2014/10/paranormal.jpg</a:t>
-            </a:r>
+              <a:rPr lang="en-US" b="1" dirty="0" smtClean="0">
+                <a:solidFill>
+                  <a:srgbClr val="FF0000"/>
+                </a:solidFill>
+              </a:rPr>
+              <a:t>BAD</a:t>
+            </a:r>
+            <a:endParaRPr lang="en-US" b="1" dirty="0">
+              <a:solidFill>
+                <a:srgbClr val="FF0000"/>
+              </a:solidFill>
+            </a:endParaRPr>
           </a:p>
         </p:txBody>
       </p:sp>
@@ -20286,7 +20437,7 @@
         </p:nvSpPr>
         <p:spPr>
           <a:xfrm>
-            <a:off x="926526" y="4580290"/>
+            <a:off x="762000" y="2429129"/>
             <a:ext cx="954107" cy="369332"/>
           </a:xfrm>
           <a:prstGeom prst="rect">
@@ -20311,44 +20462,6 @@
             <a:endParaRPr lang="en-US" b="1" dirty="0">
               <a:solidFill>
                 <a:srgbClr val="00B050"/>
-              </a:solidFill>
-            </a:endParaRPr>
-          </a:p>
-        </p:txBody>
-      </p:sp>
-      <p:sp>
-        <p:nvSpPr>
-          <p:cNvPr id="10" name="TextBox 9"/>
-          <p:cNvSpPr txBox="1"/>
-          <p:nvPr/>
-        </p:nvSpPr>
-        <p:spPr>
-          <a:xfrm>
-            <a:off x="4554640" y="4580290"/>
-            <a:ext cx="731290" cy="369332"/>
-          </a:xfrm>
-          <a:prstGeom prst="rect">
-            <a:avLst/>
-          </a:prstGeom>
-          <a:noFill/>
-        </p:spPr>
-        <p:txBody>
-          <a:bodyPr wrap="none" rtlCol="0">
-            <a:spAutoFit/>
-          </a:bodyPr>
-          <a:lstStyle/>
-          <a:p>
-            <a:r>
-              <a:rPr lang="en-US" b="1" dirty="0" smtClean="0">
-                <a:solidFill>
-                  <a:srgbClr val="FF0000"/>
-                </a:solidFill>
-              </a:rPr>
-              <a:t>BAD</a:t>
-            </a:r>
-            <a:endParaRPr lang="en-US" b="1" dirty="0">
-              <a:solidFill>
-                <a:srgbClr val="FF0000"/>
               </a:solidFill>
             </a:endParaRPr>
           </a:p>
@@ -20400,7 +20513,7 @@
                                         <p:tgtEl>
                                           <p:spTgt spid="3">
                                             <p:txEl>
-                                              <p:pRg st="1" end="1"/>
+                                              <p:pRg st="0" end="0"/>
                                             </p:txEl>
                                           </p:spTgt>
                                         </p:tgtEl>
@@ -20418,7 +20531,7 @@
                                         <p:tgtEl>
                                           <p:spTgt spid="3">
                                             <p:txEl>
-                                              <p:pRg st="1" end="1"/>
+                                              <p:pRg st="0" end="0"/>
                                             </p:txEl>
                                           </p:spTgt>
                                         </p:tgtEl>
@@ -20461,7 +20574,7 @@
                                         <p:tgtEl>
                                           <p:spTgt spid="3">
                                             <p:txEl>
-                                              <p:pRg st="2" end="2"/>
+                                              <p:pRg st="1" end="1"/>
                                             </p:txEl>
                                           </p:spTgt>
                                         </p:tgtEl>
@@ -20479,7 +20592,7 @@
                                         <p:tgtEl>
                                           <p:spTgt spid="3">
                                             <p:txEl>
-                                              <p:pRg st="2" end="2"/>
+                                              <p:pRg st="1" end="1"/>
                                             </p:txEl>
                                           </p:spTgt>
                                         </p:tgtEl>
@@ -20520,7 +20633,11 @@
                                           </p:stCondLst>
                                         </p:cTn>
                                         <p:tgtEl>
-                                          <p:spTgt spid="1026"/>
+                                          <p:spTgt spid="3">
+                                            <p:txEl>
+                                              <p:pRg st="2" end="2"/>
+                                            </p:txEl>
+                                          </p:spTgt>
                                         </p:tgtEl>
                                         <p:attrNameLst>
                                           <p:attrName>style.visibility</p:attrName>
@@ -20534,7 +20651,125 @@
                                       <p:cBhvr>
                                         <p:cTn id="17" dur="500"/>
                                         <p:tgtEl>
-                                          <p:spTgt spid="1026"/>
+                                          <p:spTgt spid="3">
+                                            <p:txEl>
+                                              <p:pRg st="2" end="2"/>
+                                            </p:txEl>
+                                          </p:spTgt>
+                                        </p:tgtEl>
+                                      </p:cBhvr>
+                                    </p:animEffect>
+                                  </p:childTnLst>
+                                </p:cTn>
+                              </p:par>
+                            </p:childTnLst>
+                          </p:cTn>
+                        </p:par>
+                      </p:childTnLst>
+                    </p:cTn>
+                  </p:par>
+                  <p:par>
+                    <p:cTn id="18" fill="hold">
+                      <p:stCondLst>
+                        <p:cond delay="indefinite"/>
+                      </p:stCondLst>
+                      <p:childTnLst>
+                        <p:par>
+                          <p:cTn id="19" fill="hold">
+                            <p:stCondLst>
+                              <p:cond delay="0"/>
+                            </p:stCondLst>
+                            <p:childTnLst>
+                              <p:par>
+                                <p:cTn id="20" presetID="10" presetClass="entr" presetSubtype="0" fill="hold" nodeType="clickEffect">
+                                  <p:stCondLst>
+                                    <p:cond delay="0"/>
+                                  </p:stCondLst>
+                                  <p:childTnLst>
+                                    <p:set>
+                                      <p:cBhvr>
+                                        <p:cTn id="21" dur="1" fill="hold">
+                                          <p:stCondLst>
+                                            <p:cond delay="0"/>
+                                          </p:stCondLst>
+                                        </p:cTn>
+                                        <p:tgtEl>
+                                          <p:spTgt spid="3">
+                                            <p:txEl>
+                                              <p:pRg st="3" end="3"/>
+                                            </p:txEl>
+                                          </p:spTgt>
+                                        </p:tgtEl>
+                                        <p:attrNameLst>
+                                          <p:attrName>style.visibility</p:attrName>
+                                        </p:attrNameLst>
+                                      </p:cBhvr>
+                                      <p:to>
+                                        <p:strVal val="visible"/>
+                                      </p:to>
+                                    </p:set>
+                                    <p:animEffect transition="in" filter="fade">
+                                      <p:cBhvr>
+                                        <p:cTn id="22" dur="500"/>
+                                        <p:tgtEl>
+                                          <p:spTgt spid="3">
+                                            <p:txEl>
+                                              <p:pRg st="3" end="3"/>
+                                            </p:txEl>
+                                          </p:spTgt>
+                                        </p:tgtEl>
+                                      </p:cBhvr>
+                                    </p:animEffect>
+                                  </p:childTnLst>
+                                </p:cTn>
+                              </p:par>
+                            </p:childTnLst>
+                          </p:cTn>
+                        </p:par>
+                      </p:childTnLst>
+                    </p:cTn>
+                  </p:par>
+                  <p:par>
+                    <p:cTn id="23" fill="hold">
+                      <p:stCondLst>
+                        <p:cond delay="indefinite"/>
+                      </p:stCondLst>
+                      <p:childTnLst>
+                        <p:par>
+                          <p:cTn id="24" fill="hold">
+                            <p:stCondLst>
+                              <p:cond delay="0"/>
+                            </p:stCondLst>
+                            <p:childTnLst>
+                              <p:par>
+                                <p:cTn id="25" presetID="14" presetClass="entr" presetSubtype="10" fill="hold" nodeType="clickEffect">
+                                  <p:stCondLst>
+                                    <p:cond delay="0"/>
+                                  </p:stCondLst>
+                                  <p:childTnLst>
+                                    <p:set>
+                                      <p:cBhvr>
+                                        <p:cTn id="26" dur="1" fill="hold">
+                                          <p:stCondLst>
+                                            <p:cond delay="0"/>
+                                          </p:stCondLst>
+                                        </p:cTn>
+                                        <p:tgtEl>
+                                          <p:spTgt spid="4"/>
+                                        </p:tgtEl>
+                                        <p:attrNameLst>
+                                          <p:attrName>style.visibility</p:attrName>
+                                        </p:attrNameLst>
+                                      </p:cBhvr>
+                                      <p:to>
+                                        <p:strVal val="visible"/>
+                                      </p:to>
+                                    </p:set>
+                                    <p:animEffect transition="in" filter="randombar(horizontal)">
+                                      <p:cBhvr>
+                                        <p:cTn id="27" dur="1000"/>
+                                        <p:tgtEl>
+                                          <p:spTgt spid="4"/>
                                         </p:tgtEl>
                                       </p:cBhvr>
                                     </p:animEffect>
@@ -20542,14 +20777,14 @@
                                 </p:cTn>
                               </p:par>
                               <p:par>
-                                <p:cTn id="18" presetID="10" presetClass="entr" presetSubtype="0" fill="hold" grpId="0" nodeType="withEffect">
+                                <p:cTn id="28" presetID="10" presetClass="entr" presetSubtype="0" fill="hold" grpId="0" nodeType="withEffect">
                                   <p:stCondLst>
                                     <p:cond delay="0"/>
                                   </p:stCondLst>
                                   <p:childTnLst>
                                     <p:set>
                                       <p:cBhvr>
-                                        <p:cTn id="19" dur="1" fill="hold">
+                                        <p:cTn id="29" dur="1" fill="hold">
                                           <p:stCondLst>
                                             <p:cond delay="0"/>
                                           </p:stCondLst>
@@ -20567,7 +20802,7 @@
                                     </p:set>
                                     <p:animEffect transition="in" filter="fade">
                                       <p:cBhvr>
-                                        <p:cTn id="20" dur="500"/>
+                                        <p:cTn id="30" dur="500"/>
                                         <p:tgtEl>
                                           <p:spTgt spid="7"/>
                                         </p:tgtEl>
@@ -20576,68 +20811,15 @@
                                   </p:childTnLst>
                                 </p:cTn>
                               </p:par>
-                            </p:childTnLst>
-                          </p:cTn>
-                        </p:par>
-                      </p:childTnLst>
-                    </p:cTn>
-                  </p:par>
-                  <p:par>
-                    <p:cTn id="21" fill="hold">
-                      <p:stCondLst>
-                        <p:cond delay="indefinite"/>
-                      </p:stCondLst>
-                      <p:childTnLst>
-                        <p:par>
-                          <p:cTn id="22" fill="hold">
-                            <p:stCondLst>
-                              <p:cond delay="0"/>
-                            </p:stCondLst>
-                            <p:childTnLst>
                               <p:par>
-                                <p:cTn id="23" presetID="10" presetClass="entr" presetSubtype="0" fill="hold" nodeType="clickEffect">
+                                <p:cTn id="31" presetID="10" presetClass="entr" presetSubtype="0" fill="hold" grpId="0" nodeType="withEffect">
                                   <p:stCondLst>
                                     <p:cond delay="0"/>
                                   </p:stCondLst>
                                   <p:childTnLst>
                                     <p:set>
                                       <p:cBhvr>
-                                        <p:cTn id="24" dur="1" fill="hold">
-                                          <p:stCondLst>
-                                            <p:cond delay="0"/>
-                                          </p:stCondLst>
-                                        </p:cTn>
-                                        <p:tgtEl>
-                                          <p:spTgt spid="8"/>
-                                        </p:tgtEl>
-                                        <p:attrNameLst>
-                                          <p:attrName>style.visibility</p:attrName>
-                                        </p:attrNameLst>
-                                      </p:cBhvr>
-                                      <p:to>
-                                        <p:strVal val="visible"/>
-                                      </p:to>
-                                    </p:set>
-                                    <p:animEffect transition="in" filter="fade">
-                                      <p:cBhvr>
-                                        <p:cTn id="25" dur="500"/>
-                                        <p:tgtEl>
-                                          <p:spTgt spid="8"/>
-                                        </p:tgtEl>
-                                      </p:cBhvr>
-                                    </p:animEffect>
-                                  </p:childTnLst>
-                                </p:cTn>
-                              </p:par>
-                              <p:par>
-                                <p:cTn id="26" presetID="10" presetClass="entr" presetSubtype="0" fill="hold" grpId="0" nodeType="withEffect">
-                                  <p:stCondLst>
-                                    <p:cond delay="0"/>
-                                  </p:stCondLst>
-                                  <p:childTnLst>
-                                    <p:set>
-                                      <p:cBhvr>
-                                        <p:cTn id="27" dur="1" fill="hold">
+                                        <p:cTn id="32" dur="1" fill="hold">
                                           <p:stCondLst>
                                             <p:cond delay="0"/>
                                           </p:stCondLst>
@@ -20655,7 +20837,7 @@
                                     </p:set>
                                     <p:animEffect transition="in" filter="fade">
                                       <p:cBhvr>
-                                        <p:cTn id="28" dur="500"/>
+                                        <p:cTn id="33" dur="500"/>
                                         <p:tgtEl>
                                           <p:spTgt spid="10"/>
                                         </p:tgtEl>
@@ -20692,8 +20874,8 @@
       </p:par>
     </p:tnLst>
     <p:bldLst>
+      <p:bldP spid="10" grpId="0"/>
       <p:bldP spid="7" grpId="0"/>
-      <p:bldP spid="10" grpId="0"/>
     </p:bldLst>
   </p:timing>
 </p:sld>

</xml_diff>

<commit_message>
minor edits to linear regression ppt
</commit_message>
<xml_diff>
--- a/presentations/linear_regression/Linear_regression.pptx
+++ b/presentations/linear_regression/Linear_regression.pptx
@@ -850,11 +850,7 @@
           <a:p>
             <a:r>
               <a:rPr lang="en-US" dirty="0" smtClean="0"/>
-              <a:t>Unlike the other plots, this time patterns are irrelevant. </a:t>
-            </a:r>
-            <a:r>
-              <a:rPr lang="en-US" dirty="0" smtClean="0"/>
-              <a:t>Leverage is a measure of how much each data point influences the regression. Because the regression must pass through the centroid, points that lie far from the centroid have greater leverage, and their leverage increases if there are fewer points nearby. As a result, leverage reflects both the distance from the centroid and the isolation of a point. The plot also shows values of Cook’s distance, which measures how much the regression would change if a point was deleted. Cook’s distance is increased by leverage and by large residuals: a point far from the centroid with a large residual can severely alter the regression. On this plot, you want to see that the red smoothed line stays close to the horizontal gray dashed line and that no points have a large Cook’s distance (</a:t>
+              <a:t>Unlike the other plots, this time patterns are irrelevant. Leverage is a measure of how much each data point influences the regression. Because the regression must pass through the centroid, points that lie far from the centroid have greater leverage, and their leverage increases if there are fewer points nearby. As a result, leverage reflects both the distance from the centroid and the isolation of a point. The plot also shows values of Cook’s distance, which measures how much the regression would change if a point was deleted. Cook’s distance is increased by leverage and by large residuals: a point far from the centroid with a large residual can severely alter the regression. On this plot, you want to see that the red smoothed line stays close to the horizontal gray dashed line and that no points have a large Cook’s distance (</a:t>
             </a:r>
             <a:r>
               <a:rPr lang="en-US" dirty="0" err="1" smtClean="0"/>
@@ -10837,7 +10833,12 @@
             <p:ph idx="1"/>
           </p:nvPr>
         </p:nvSpPr>
-        <p:spPr/>
+        <p:spPr>
+          <a:xfrm>
+            <a:off x="946404" y="1828801"/>
+            <a:ext cx="6446520" cy="4495799"/>
+          </a:xfrm>
+        </p:spPr>
         <p:txBody>
           <a:bodyPr>
             <a:normAutofit/>
@@ -10854,11 +10855,7 @@
             </a:r>
             <a:r>
               <a:rPr lang="en-US" sz="2000" dirty="0" smtClean="0"/>
-              <a:t>t</a:t>
-            </a:r>
-            <a:r>
-              <a:rPr lang="en-US" sz="2000" dirty="0" smtClean="0"/>
-              <a:t>ypically </a:t>
+              <a:t>typically </a:t>
             </a:r>
             <a:r>
               <a:rPr lang="en-US" sz="2000" dirty="0"/>
@@ -10874,22 +10871,52 @@
             </a:r>
             <a:r>
               <a:rPr lang="en-US" sz="2000" dirty="0" smtClean="0"/>
-              <a:t>predictors; </a:t>
+              <a:t>predictors; not recommended for modeling due to its unreliability </a:t>
+            </a:r>
+            <a:r>
+              <a:rPr lang="en-US" sz="1400" dirty="0" smtClean="0"/>
+              <a:t>(Whittingham et al., 2006</a:t>
+            </a:r>
+            <a:r>
+              <a:rPr lang="en-US" sz="1400" dirty="0"/>
+              <a:t>) </a:t>
+            </a:r>
+            <a:r>
+              <a:rPr lang="en-US" sz="2000" dirty="0"/>
+              <a:t>. </a:t>
+            </a:r>
+          </a:p>
+          <a:p>
+            <a:r>
+              <a:rPr lang="en-US" sz="2200" b="1" dirty="0" smtClean="0"/>
+              <a:t>Weighted </a:t>
+            </a:r>
+            <a:r>
+              <a:rPr lang="en-US" sz="2200" b="1" dirty="0" smtClean="0"/>
+              <a:t>least squares regression </a:t>
             </a:r>
             <a:r>
               <a:rPr lang="en-US" sz="2000" dirty="0" smtClean="0"/>
-              <a:t>not recommended for modeling due to its unreliability </a:t>
-            </a:r>
-            <a:r>
-              <a:rPr lang="en-US" sz="1600" dirty="0" smtClean="0"/>
-              <a:t>(Whittingham et al., 2006)</a:t>
-            </a:r>
-            <a:endParaRPr lang="en-US" sz="1600" dirty="0" smtClean="0"/>
-          </a:p>
-          <a:p>
+              <a:t>– potentially useful when the </a:t>
+            </a:r>
+            <a:r>
+              <a:rPr lang="en-US" sz="2000" dirty="0" err="1" smtClean="0"/>
+              <a:t>homoskedasticity</a:t>
+            </a:r>
+            <a:r>
+              <a:rPr lang="en-US" sz="2000" dirty="0" smtClean="0"/>
+              <a:t> assumption is violated in OLS; gives more weight to observations with small error variance. WLS is not recommended unless the variance structure is known. </a:t>
+            </a:r>
+            <a:endParaRPr lang="en-US" sz="2000" dirty="0" smtClean="0"/>
+          </a:p>
+          <a:p>
+            <a:r>
+              <a:rPr lang="en-US" sz="2200" b="1" dirty="0" smtClean="0"/>
+              <a:t>Logistic </a:t>
+            </a:r>
             <a:r>
               <a:rPr lang="en-US" sz="2200" b="1" dirty="0"/>
-              <a:t>Logistic regression </a:t>
+              <a:t>regression </a:t>
             </a:r>
             <a:r>
               <a:rPr lang="en-US" b="1" dirty="0"/>
@@ -10901,38 +10928,10 @@
             </a:r>
             <a:r>
               <a:rPr lang="en-US" sz="2000" dirty="0"/>
-              <a:t>useful when </a:t>
-            </a:r>
-            <a:r>
-              <a:rPr lang="en-US" sz="2000" dirty="0" smtClean="0"/>
-              <a:t>predicting </a:t>
-            </a:r>
-            <a:r>
-              <a:rPr lang="en-US" sz="2000" dirty="0"/>
-              <a:t>a binary outcome from a set of continuous predictor variables</a:t>
-            </a:r>
-            <a:r>
-              <a:rPr lang="en-US" sz="2000" dirty="0" smtClean="0"/>
-              <a:t>.</a:t>
-            </a:r>
-          </a:p>
-          <a:p>
-            <a:r>
-              <a:rPr lang="en-US" sz="2000" b="1" dirty="0" smtClean="0"/>
-              <a:t>Weighted least squares regression </a:t>
-            </a:r>
-            <a:r>
-              <a:rPr lang="en-US" sz="2000" dirty="0" smtClean="0"/>
-              <a:t>– potentially useful when the </a:t>
-            </a:r>
-            <a:r>
-              <a:rPr lang="en-US" sz="2000" dirty="0" err="1" smtClean="0"/>
-              <a:t>homoskedasticity</a:t>
-            </a:r>
-            <a:r>
-              <a:rPr lang="en-US" sz="2000" dirty="0" smtClean="0"/>
-              <a:t> assumption is violated in OLS; gives more weight to observations with small error variance. WLS is not recommended unless the variance structure is known. </a:t>
-            </a:r>
+              <a:t>useful when predicting a binary outcome from a set of continuous predictor variables.</a:t>
+            </a:r>
+          </a:p>
+          <a:p>
             <a:endParaRPr lang="en-US" dirty="0"/>
           </a:p>
         </p:txBody>
@@ -14074,7 +14073,15 @@
             </a:r>
             <a:r>
               <a:rPr lang="en-US" altLang="en-US" sz="1500" dirty="0"/>
-              <a:t> using R. &lt; https://cran.r-project.org/doc/contrib/Faraway-PRA.pdf</a:t>
+              <a:t> using R. </a:t>
+            </a:r>
+            <a:r>
+              <a:rPr lang="en-US" altLang="en-US" sz="1500" dirty="0" smtClean="0"/>
+              <a:t> &lt;https</a:t>
+            </a:r>
+            <a:r>
+              <a:rPr lang="en-US" altLang="en-US" sz="1500" dirty="0"/>
+              <a:t>://cran.r-project.org/doc/contrib/Faraway-PRA.pdf</a:t>
             </a:r>
             <a:r>
               <a:rPr lang="en-US" altLang="en-US" sz="1500" dirty="0" smtClean="0"/>
@@ -14153,7 +14160,6 @@
               <a:rPr lang="en-US" sz="1500" dirty="0" smtClean="0"/>
               <a:t>. 2006. Why do we still use stepwise modelling in ecology and behavior? Journal of Animal Ecology. 75: 1182-1189.</a:t>
             </a:r>
-            <a:endParaRPr lang="en-US" sz="1500" dirty="0" smtClean="0"/>
           </a:p>
           <a:p>
             <a:pPr marL="0" indent="0">
@@ -14181,7 +14187,15 @@
             </a:r>
             <a:r>
               <a:rPr lang="en-US" sz="1500" dirty="0"/>
-              <a:t>, and L. West. 2013. Quantifying tacit knowledge about soil SOC stocks using soil taxa and official soil series descriptions. Soil Science Society of America Journal. 77, 1711-1723</a:t>
+              <a:t>, and L. West. 2013. Quantifying tacit knowledge about soil SOC stocks using soil taxa and official soil series descriptions. Soil Science Society of America Journal. </a:t>
+            </a:r>
+            <a:r>
+              <a:rPr lang="en-US" sz="1500" dirty="0" smtClean="0"/>
+              <a:t>77: </a:t>
+            </a:r>
+            <a:r>
+              <a:rPr lang="en-US" sz="1500" dirty="0"/>
+              <a:t>1711-1723</a:t>
             </a:r>
             <a:r>
               <a:rPr lang="en-US" sz="1500" dirty="0" smtClean="0"/>
@@ -14308,7 +14322,15 @@
             <a:pPr lvl="0"/>
             <a:r>
               <a:rPr lang="en-US" sz="2400" dirty="0" smtClean="0"/>
-              <a:t>Used in soil survey since the early 1900s </a:t>
+              <a:t>Used in soil </a:t>
+            </a:r>
+            <a:r>
+              <a:rPr lang="en-US" sz="2400" dirty="0" smtClean="0"/>
+              <a:t>science </a:t>
+            </a:r>
+            <a:r>
+              <a:rPr lang="en-US" sz="2400" dirty="0" smtClean="0"/>
+              <a:t>since the early 1900s </a:t>
             </a:r>
           </a:p>
           <a:p>
@@ -19227,13 +19249,8 @@
             </a:r>
             <a:r>
               <a:rPr lang="en-US" sz="2200" dirty="0" smtClean="0"/>
-              <a:t> independent variable (X</a:t>
-            </a:r>
-            <a:r>
-              <a:rPr lang="en-US" sz="2200" dirty="0" smtClean="0"/>
-              <a:t>).</a:t>
-            </a:r>
-            <a:endParaRPr lang="en-US" sz="2200" dirty="0" smtClean="0"/>
+              <a:t> independent variable (X).</a:t>
+            </a:r>
           </a:p>
           <a:p>
             <a:pPr marL="182563" lvl="1" indent="-182563"/>
@@ -19290,7 +19307,6 @@
               <a:rPr lang="en-US" sz="2200" dirty="0" smtClean="0"/>
               <a:t>). </a:t>
             </a:r>
-            <a:endParaRPr lang="en-US" sz="2200" dirty="0" smtClean="0"/>
           </a:p>
           <a:p>
             <a:pPr marL="182563" lvl="1" indent="-182563"/>
@@ -20616,16 +20632,38 @@
           </p:cNvPicPr>
           <p:nvPr/>
         </p:nvPicPr>
-        <p:blipFill>
+        <p:blipFill rotWithShape="1">
           <a:blip r:embed="rId2"/>
-          <a:stretch>
-            <a:fillRect/>
-          </a:stretch>
+          <a:srcRect r="50056"/>
+          <a:stretch/>
         </p:blipFill>
         <p:spPr>
           <a:xfrm>
-            <a:off x="381000" y="1828801"/>
-            <a:ext cx="7933653" cy="2590800"/>
+            <a:off x="381001" y="1828801"/>
+            <a:ext cx="3962400" cy="2590800"/>
+          </a:xfrm>
+          <a:prstGeom prst="rect">
+            <a:avLst/>
+          </a:prstGeom>
+        </p:spPr>
+      </p:pic>
+      <p:pic>
+        <p:nvPicPr>
+          <p:cNvPr id="8" name="Picture 7"/>
+          <p:cNvPicPr>
+            <a:picLocks noChangeAspect="1"/>
+          </p:cNvPicPr>
+          <p:nvPr/>
+        </p:nvPicPr>
+        <p:blipFill rotWithShape="1">
+          <a:blip r:embed="rId2"/>
+          <a:srcRect l="49546"/>
+          <a:stretch/>
+        </p:blipFill>
+        <p:spPr>
+          <a:xfrm>
+            <a:off x="4342229" y="1828801"/>
+            <a:ext cx="4002829" cy="2590800"/>
           </a:xfrm>
           <a:prstGeom prst="rect">
             <a:avLst/>
@@ -20983,7 +21021,7 @@
                             </p:stCondLst>
                             <p:childTnLst>
                               <p:par>
-                                <p:cTn id="25" presetID="14" presetClass="entr" presetSubtype="10" fill="hold" nodeType="clickEffect">
+                                <p:cTn id="25" presetID="10" presetClass="entr" presetSubtype="0" fill="hold" nodeType="clickEffect">
                                   <p:stCondLst>
                                     <p:cond delay="0"/>
                                   </p:stCondLst>
@@ -21006,9 +21044,9 @@
                                         <p:strVal val="visible"/>
                                       </p:to>
                                     </p:set>
-                                    <p:animEffect transition="in" filter="randombar(horizontal)">
+                                    <p:animEffect transition="in" filter="fade">
                                       <p:cBhvr>
-                                        <p:cTn id="27" dur="1000"/>
+                                        <p:cTn id="27" dur="500"/>
                                         <p:tgtEl>
                                           <p:spTgt spid="4"/>
                                         </p:tgtEl>
@@ -21052,15 +21090,68 @@
                                   </p:childTnLst>
                                 </p:cTn>
                               </p:par>
+                            </p:childTnLst>
+                          </p:cTn>
+                        </p:par>
+                      </p:childTnLst>
+                    </p:cTn>
+                  </p:par>
+                  <p:par>
+                    <p:cTn id="31" fill="hold">
+                      <p:stCondLst>
+                        <p:cond delay="indefinite"/>
+                      </p:stCondLst>
+                      <p:childTnLst>
+                        <p:par>
+                          <p:cTn id="32" fill="hold">
+                            <p:stCondLst>
+                              <p:cond delay="0"/>
+                            </p:stCondLst>
+                            <p:childTnLst>
                               <p:par>
-                                <p:cTn id="31" presetID="10" presetClass="entr" presetSubtype="0" fill="hold" grpId="0" nodeType="withEffect">
+                                <p:cTn id="33" presetID="14" presetClass="entr" presetSubtype="10" fill="hold" nodeType="clickEffect">
                                   <p:stCondLst>
                                     <p:cond delay="0"/>
                                   </p:stCondLst>
                                   <p:childTnLst>
                                     <p:set>
                                       <p:cBhvr>
-                                        <p:cTn id="32" dur="1" fill="hold">
+                                        <p:cTn id="34" dur="1" fill="hold">
+                                          <p:stCondLst>
+                                            <p:cond delay="0"/>
+                                          </p:stCondLst>
+                                        </p:cTn>
+                                        <p:tgtEl>
+                                          <p:spTgt spid="8"/>
+                                        </p:tgtEl>
+                                        <p:attrNameLst>
+                                          <p:attrName>style.visibility</p:attrName>
+                                        </p:attrNameLst>
+                                      </p:cBhvr>
+                                      <p:to>
+                                        <p:strVal val="visible"/>
+                                      </p:to>
+                                    </p:set>
+                                    <p:animEffect transition="in" filter="randombar(horizontal)">
+                                      <p:cBhvr>
+                                        <p:cTn id="35" dur="1000"/>
+                                        <p:tgtEl>
+                                          <p:spTgt spid="8"/>
+                                        </p:tgtEl>
+                                      </p:cBhvr>
+                                    </p:animEffect>
+                                  </p:childTnLst>
+                                </p:cTn>
+                              </p:par>
+                              <p:par>
+                                <p:cTn id="36" presetID="10" presetClass="entr" presetSubtype="0" fill="hold" grpId="0" nodeType="withEffect">
+                                  <p:stCondLst>
+                                    <p:cond delay="0"/>
+                                  </p:stCondLst>
+                                  <p:childTnLst>
+                                    <p:set>
+                                      <p:cBhvr>
+                                        <p:cTn id="37" dur="1" fill="hold">
                                           <p:stCondLst>
                                             <p:cond delay="0"/>
                                           </p:stCondLst>
@@ -21078,7 +21169,7 @@
                                     </p:set>
                                     <p:animEffect transition="in" filter="fade">
                                       <p:cBhvr>
-                                        <p:cTn id="33" dur="500"/>
+                                        <p:cTn id="38" dur="500"/>
                                         <p:tgtEl>
                                           <p:spTgt spid="10"/>
                                         </p:tgtEl>

</xml_diff>